<commit_message>
Updated github links in talk
</commit_message>
<xml_diff>
--- a/rc_new_user_seminar_2017.pptx
+++ b/rc_new_user_seminar_2017.pptx
@@ -255,7 +255,7 @@
           <a:p>
             <a:fld id="{C649942D-A542-EE42-A1CF-1E4FFF53ED67}" type="datetimeFigureOut">
               <a:rPr lang="en-US" smtClean="0"/>
-              <a:t>5/1/17</a:t>
+              <a:t>5/3/17</a:t>
             </a:fld>
             <a:endParaRPr lang="en-US"/>
           </a:p>
@@ -1496,14 +1496,14 @@
               <ma14:placeholderFlag xmlns:ma14="http://schemas.microsoft.com/office/mac/drawingml/2011/main" val="1"/>
             </a:ext>
             <a:ext uri="{909E8E84-426E-40dd-AFC4-6F175D3DCCD1}">
-              <a14:hiddenFill xmlns="" xmlns:a14="http://schemas.microsoft.com/office/drawing/2010/main">
+              <a14:hiddenFill xmlns:a14="http://schemas.microsoft.com/office/drawing/2010/main" xmlns="">
                 <a:solidFill>
                   <a:srgbClr val="FFFFFF"/>
                 </a:solidFill>
               </a14:hiddenFill>
             </a:ext>
             <a:ext uri="{91240B29-F687-4f45-9708-019B960494DF}">
-              <a14:hiddenLine xmlns="" xmlns:a14="http://schemas.microsoft.com/office/drawing/2010/main" w="9525">
+              <a14:hiddenLine xmlns:a14="http://schemas.microsoft.com/office/drawing/2010/main" xmlns="" w="9525">
                 <a:solidFill>
                   <a:srgbClr val="000000"/>
                 </a:solidFill>
@@ -1541,14 +1541,14 @@
           <a:ln/>
           <a:extLst>
             <a:ext uri="{909E8E84-426E-40dd-AFC4-6F175D3DCCD1}">
-              <a14:hiddenFill xmlns="" xmlns:a14="http://schemas.microsoft.com/office/drawing/2010/main">
+              <a14:hiddenFill xmlns:a14="http://schemas.microsoft.com/office/drawing/2010/main" xmlns="">
                 <a:solidFill>
                   <a:srgbClr val="FFFFFF"/>
                 </a:solidFill>
               </a14:hiddenFill>
             </a:ext>
             <a:ext uri="{91240B29-F687-4f45-9708-019B960494DF}">
-              <a14:hiddenLine xmlns="" xmlns:a14="http://schemas.microsoft.com/office/drawing/2010/main" w="9525">
+              <a14:hiddenLine xmlns:a14="http://schemas.microsoft.com/office/drawing/2010/main" xmlns="" w="9525">
                 <a:solidFill>
                   <a:srgbClr val="000000"/>
                 </a:solidFill>
@@ -2669,7 +2669,7 @@
           <a:p>
             <a:fld id="{ECD68DE7-8E14-F140-9BF8-7DF505A7EC71}" type="datetime1">
               <a:rPr lang="en-US" smtClean="0"/>
-              <a:t>5/1/17</a:t>
+              <a:t>5/3/17</a:t>
             </a:fld>
             <a:endParaRPr lang="en-US"/>
           </a:p>
@@ -2859,7 +2859,7 @@
           <a:p>
             <a:fld id="{1D9E6949-9996-6743-8CFF-FA3A56E13506}" type="datetime1">
               <a:rPr lang="en-US" smtClean="0"/>
-              <a:t>5/1/17</a:t>
+              <a:t>5/3/17</a:t>
             </a:fld>
             <a:endParaRPr lang="en-US"/>
           </a:p>
@@ -3059,7 +3059,7 @@
           <a:p>
             <a:fld id="{B889D5DF-D410-3845-BB2F-EEB43AAD8F50}" type="datetime1">
               <a:rPr lang="en-US" smtClean="0"/>
-              <a:t>5/1/17</a:t>
+              <a:t>5/3/17</a:t>
             </a:fld>
             <a:endParaRPr lang="en-US"/>
           </a:p>
@@ -3346,7 +3346,7 @@
           <a:p>
             <a:fld id="{150E7F26-8C30-8C48-992C-4605BCF373C1}" type="datetime1">
               <a:rPr lang="en-US" smtClean="0"/>
-              <a:t>5/1/17</a:t>
+              <a:t>5/3/17</a:t>
             </a:fld>
             <a:endParaRPr lang="en-US"/>
           </a:p>
@@ -3601,7 +3601,7 @@
           <a:p>
             <a:fld id="{5989D8A3-9E0D-F746-B178-BE7AAD7E1D08}" type="datetime1">
               <a:rPr lang="en-US" smtClean="0"/>
-              <a:t>5/1/17</a:t>
+              <a:t>5/3/17</a:t>
             </a:fld>
             <a:endParaRPr lang="en-US"/>
           </a:p>
@@ -3791,7 +3791,7 @@
           <a:p>
             <a:fld id="{FBFD08B6-FF5B-084B-9D71-755657184AD2}" type="datetime1">
               <a:rPr lang="en-US" smtClean="0"/>
-              <a:t>5/1/17</a:t>
+              <a:t>5/3/17</a:t>
             </a:fld>
             <a:endParaRPr lang="en-US"/>
           </a:p>
@@ -4057,7 +4057,7 @@
           <a:p>
             <a:fld id="{22D37D1D-20E9-C347-9D59-D2454D21F9A1}" type="datetime1">
               <a:rPr lang="en-US" smtClean="0"/>
-              <a:t>5/1/17</a:t>
+              <a:t>5/3/17</a:t>
             </a:fld>
             <a:endParaRPr lang="en-US"/>
           </a:p>
@@ -4365,7 +4365,7 @@
           <a:p>
             <a:fld id="{2BE6509E-27A0-AE45-874D-A23ED8FF69C7}" type="datetime1">
               <a:rPr lang="en-US" smtClean="0"/>
-              <a:t>5/1/17</a:t>
+              <a:t>5/3/17</a:t>
             </a:fld>
             <a:endParaRPr lang="en-US"/>
           </a:p>
@@ -4819,7 +4819,7 @@
           <a:p>
             <a:fld id="{18E1633D-FD18-3048-98AE-ADC6C06803FD}" type="datetime1">
               <a:rPr lang="en-US" smtClean="0"/>
-              <a:t>5/1/17</a:t>
+              <a:t>5/3/17</a:t>
             </a:fld>
             <a:endParaRPr lang="en-US"/>
           </a:p>
@@ -4957,7 +4957,7 @@
           <a:p>
             <a:fld id="{0EABE0D9-D7EF-244F-A413-7BCAE9FD1206}" type="datetime1">
               <a:rPr lang="en-US" smtClean="0"/>
-              <a:t>5/1/17</a:t>
+              <a:t>5/3/17</a:t>
             </a:fld>
             <a:endParaRPr lang="en-US"/>
           </a:p>
@@ -5072,7 +5072,7 @@
           <a:p>
             <a:fld id="{12CB383F-6B5B-B842-A0F8-40DE7F828464}" type="datetime1">
               <a:rPr lang="en-US" smtClean="0"/>
-              <a:t>5/1/17</a:t>
+              <a:t>5/3/17</a:t>
             </a:fld>
             <a:endParaRPr lang="en-US"/>
           </a:p>
@@ -5262,7 +5262,7 @@
           <a:p>
             <a:fld id="{043D7B85-D040-214F-9303-7FDDADF77F95}" type="datetime1">
               <a:rPr lang="en-US" smtClean="0"/>
-              <a:t>5/1/17</a:t>
+              <a:t>5/3/17</a:t>
             </a:fld>
             <a:endParaRPr lang="en-US"/>
           </a:p>
@@ -5476,7 +5476,7 @@
           <a:p>
             <a:fld id="{CF06330F-2863-B244-A889-A6416C2F2863}" type="datetime1">
               <a:rPr lang="en-US" smtClean="0"/>
-              <a:t>5/1/17</a:t>
+              <a:t>5/3/17</a:t>
             </a:fld>
             <a:endParaRPr lang="en-US"/>
           </a:p>
@@ -5819,7 +5819,7 @@
           <a:p>
             <a:fld id="{C888A1B5-C673-8A47-9843-5DDFB797488F}" type="datetime1">
               <a:rPr lang="en-US" smtClean="0"/>
-              <a:t>5/1/17</a:t>
+              <a:t>5/3/17</a:t>
             </a:fld>
             <a:endParaRPr lang="en-US"/>
           </a:p>
@@ -6009,7 +6009,7 @@
           <a:p>
             <a:fld id="{44904425-5295-D94B-8D1F-FB45FDBC9752}" type="datetime1">
               <a:rPr lang="en-US" smtClean="0"/>
-              <a:t>5/1/17</a:t>
+              <a:t>5/3/17</a:t>
             </a:fld>
             <a:endParaRPr lang="en-US"/>
           </a:p>
@@ -6209,7 +6209,7 @@
           <a:p>
             <a:fld id="{58F37EF9-201A-B744-A0C8-0105F4C9414D}" type="datetime1">
               <a:rPr lang="en-US" smtClean="0"/>
-              <a:t>5/1/17</a:t>
+              <a:t>5/3/17</a:t>
             </a:fld>
             <a:endParaRPr lang="en-US"/>
           </a:p>
@@ -6496,7 +6496,7 @@
           <a:p>
             <a:fld id="{91FD8EB4-D581-F048-88ED-A64D6EB3CFAB}" type="datetime1">
               <a:rPr lang="en-US" smtClean="0"/>
-              <a:t>5/1/17</a:t>
+              <a:t>5/3/17</a:t>
             </a:fld>
             <a:endParaRPr lang="en-US"/>
           </a:p>
@@ -6742,7 +6742,7 @@
           <a:p>
             <a:fld id="{77B1075F-B81A-5940-A68D-45596C356335}" type="datetime1">
               <a:rPr lang="en-US" smtClean="0"/>
-              <a:t>5/1/17</a:t>
+              <a:t>5/3/17</a:t>
             </a:fld>
             <a:endParaRPr lang="en-US"/>
           </a:p>
@@ -7050,7 +7050,7 @@
           <a:p>
             <a:fld id="{39113FC0-C6F8-6E40-8D7A-F2A1A22961FE}" type="datetime1">
               <a:rPr lang="en-US" smtClean="0"/>
-              <a:t>5/1/17</a:t>
+              <a:t>5/3/17</a:t>
             </a:fld>
             <a:endParaRPr lang="en-US"/>
           </a:p>
@@ -7504,7 +7504,7 @@
           <a:p>
             <a:fld id="{37F32D73-5A99-464A-8594-B551FF72C9D9}" type="datetime1">
               <a:rPr lang="en-US" smtClean="0"/>
-              <a:t>5/1/17</a:t>
+              <a:t>5/3/17</a:t>
             </a:fld>
             <a:endParaRPr lang="en-US"/>
           </a:p>
@@ -7642,7 +7642,7 @@
           <a:p>
             <a:fld id="{E82BF7D7-27C3-CF45-B820-FC005A5F8688}" type="datetime1">
               <a:rPr lang="en-US" smtClean="0"/>
-              <a:t>5/1/17</a:t>
+              <a:t>5/3/17</a:t>
             </a:fld>
             <a:endParaRPr lang="en-US"/>
           </a:p>
@@ -7757,7 +7757,7 @@
           <a:p>
             <a:fld id="{9555053E-C274-C74C-A284-88F22C581203}" type="datetime1">
               <a:rPr lang="en-US" smtClean="0"/>
-              <a:t>5/1/17</a:t>
+              <a:t>5/3/17</a:t>
             </a:fld>
             <a:endParaRPr lang="en-US"/>
           </a:p>
@@ -7971,7 +7971,7 @@
           <a:p>
             <a:fld id="{7A689FF8-7D69-1D41-AF80-D980840BCB23}" type="datetime1">
               <a:rPr lang="en-US" smtClean="0"/>
-              <a:t>5/1/17</a:t>
+              <a:t>5/3/17</a:t>
             </a:fld>
             <a:endParaRPr lang="en-US"/>
           </a:p>
@@ -8314,7 +8314,7 @@
           <a:p>
             <a:fld id="{B2055EBF-49EC-E44B-96CA-4F8E3FBF2465}" type="datetime1">
               <a:rPr lang="en-US" smtClean="0"/>
-              <a:t>5/1/17</a:t>
+              <a:t>5/3/17</a:t>
             </a:fld>
             <a:endParaRPr lang="en-US"/>
           </a:p>
@@ -8677,7 +8677,7 @@
           <a:p>
             <a:fld id="{96D7D345-C39C-A44C-AF4E-9524445B1337}" type="datetime1">
               <a:rPr lang="en-US" smtClean="0"/>
-              <a:t>5/1/17</a:t>
+              <a:t>5/3/17</a:t>
             </a:fld>
             <a:endParaRPr lang="en-US"/>
           </a:p>
@@ -9380,7 +9380,7 @@
           <a:p>
             <a:fld id="{8C5F0DC5-6EC3-034C-8486-0300E89E16FC}" type="datetime1">
               <a:rPr lang="en-US" smtClean="0"/>
-              <a:t>5/1/17</a:t>
+              <a:t>5/3/17</a:t>
             </a:fld>
             <a:endParaRPr lang="en-US"/>
           </a:p>
@@ -9865,7 +9865,7 @@
         </p:spPr>
         <p:txBody>
           <a:bodyPr>
-            <a:normAutofit fontScale="92500" lnSpcReduction="20000"/>
+            <a:normAutofit/>
           </a:bodyPr>
           <a:lstStyle/>
           <a:p>
@@ -9920,24 +9920,35 @@
                   <a:schemeClr val="tx1"/>
                 </a:solidFill>
               </a:rPr>
-              <a:t>Slides:  </a:t>
+              <a:t>Slides: </a:t>
+            </a:r>
+            <a:r>
+              <a:rPr lang="en-US" dirty="0">
+                <a:solidFill>
+                  <a:schemeClr val="tx1"/>
+                </a:solidFill>
+                <a:hlinkClick r:id="rId5"/>
+              </a:rPr>
+              <a:t>https://</a:t>
             </a:r>
             <a:r>
               <a:rPr lang="en-US" dirty="0" smtClean="0">
+                <a:solidFill>
+                  <a:schemeClr val="tx1"/>
+                </a:solidFill>
                 <a:hlinkClick r:id="rId5"/>
               </a:rPr>
-              <a:t>https</a:t>
-            </a:r>
-            <a:r>
-              <a:rPr lang="en-US" dirty="0">
-                <a:hlinkClick r:id="rId5"/>
-              </a:rPr>
-              <a:t>://github.com/ResearchComputing/Final_Tutorials/tree/master/RC_Access_Specific_Topics/New_User_Seminar</a:t>
-            </a:r>
-            <a:r>
-              <a:rPr lang="en-US" dirty="0"/>
+              <a:t>github.com/ResearchComputing/New_User_Seminar</a:t>
+            </a:r>
+            <a:r>
+              <a:rPr lang="en-US" dirty="0" smtClean="0">
+                <a:solidFill>
+                  <a:schemeClr val="tx1"/>
+                </a:solidFill>
+              </a:rPr>
               <a:t> </a:t>
             </a:r>
+            <a:endParaRPr lang="en-US" dirty="0"/>
           </a:p>
           <a:p>
             <a:pPr algn="ctr"/>
@@ -9962,7 +9973,7 @@
           <a:p>
             <a:fld id="{BD3E17D7-4415-0A45-8086-1E9B50478751}" type="datetime1">
               <a:rPr lang="en-US" smtClean="0"/>
-              <a:t>5/1/17</a:t>
+              <a:t>5/3/17</a:t>
             </a:fld>
             <a:endParaRPr lang="en-US" dirty="0"/>
           </a:p>
@@ -10144,7 +10155,7 @@
           <a:p>
             <a:fld id="{4676C52D-A00D-2248-AAC1-94BD55906AAC}" type="datetime1">
               <a:rPr lang="en-US" smtClean="0"/>
-              <a:t>5/1/17</a:t>
+              <a:t>5/3/17</a:t>
             </a:fld>
             <a:endParaRPr lang="en-US"/>
           </a:p>
@@ -10327,7 +10338,7 @@
           <a:p>
             <a:fld id="{446EC888-7CFD-C641-9F44-9678633359F5}" type="datetime1">
               <a:rPr lang="en-US" smtClean="0"/>
-              <a:t>5/1/17</a:t>
+              <a:t>5/3/17</a:t>
             </a:fld>
             <a:endParaRPr lang="en-US"/>
           </a:p>
@@ -10526,7 +10537,7 @@
           <a:p>
             <a:fld id="{9DCF056C-E28A-E84B-82B5-F09CA8CCF7AA}" type="datetime1">
               <a:rPr lang="en-US" smtClean="0"/>
-              <a:t>5/1/17</a:t>
+              <a:t>5/3/17</a:t>
             </a:fld>
             <a:endParaRPr lang="en-US" dirty="0"/>
           </a:p>
@@ -10720,7 +10731,7 @@
           <a:p>
             <a:fld id="{F20BFDB3-A603-BF47-BB0C-9DB4A86B14A1}" type="datetime1">
               <a:rPr lang="en-US" smtClean="0"/>
-              <a:t>5/1/17</a:t>
+              <a:t>5/3/17</a:t>
             </a:fld>
             <a:endParaRPr lang="en-US" dirty="0"/>
           </a:p>
@@ -10896,7 +10907,7 @@
           <a:p>
             <a:fld id="{C74A8494-43BC-5246-A5F8-7C026E3A2506}" type="datetime1">
               <a:rPr lang="en-US" smtClean="0"/>
-              <a:t>5/1/17</a:t>
+              <a:t>5/3/17</a:t>
             </a:fld>
             <a:endParaRPr lang="en-US" dirty="0"/>
           </a:p>
@@ -11080,7 +11091,7 @@
           <a:p>
             <a:fld id="{565D631E-63D9-2946-A4FB-64ADF73B9F46}" type="datetime1">
               <a:rPr lang="en-US" smtClean="0"/>
-              <a:t>5/1/17</a:t>
+              <a:t>5/3/17</a:t>
             </a:fld>
             <a:endParaRPr lang="en-US" dirty="0"/>
           </a:p>
@@ -11262,7 +11273,7 @@
           <a:p>
             <a:fld id="{D6A24DE9-2A38-9F4F-9441-F5E45DF3B582}" type="datetime1">
               <a:rPr lang="en-US" smtClean="0"/>
-              <a:t>5/1/17</a:t>
+              <a:t>5/3/17</a:t>
             </a:fld>
             <a:endParaRPr lang="en-US" dirty="0"/>
           </a:p>
@@ -11437,7 +11448,7 @@
           <a:p>
             <a:fld id="{14C7FEA5-DE78-1148-84A0-7BFCB44B4D67}" type="datetime1">
               <a:rPr lang="en-US" smtClean="0"/>
-              <a:t>5/1/17</a:t>
+              <a:t>5/3/17</a:t>
             </a:fld>
             <a:endParaRPr lang="en-US"/>
           </a:p>
@@ -11764,7 +11775,7 @@
           <a:p>
             <a:fld id="{8885B798-E31F-EF48-B899-212976AF87DE}" type="datetime1">
               <a:rPr lang="en-US" smtClean="0"/>
-              <a:t>5/1/17</a:t>
+              <a:t>5/3/17</a:t>
             </a:fld>
             <a:endParaRPr lang="en-US" dirty="0"/>
           </a:p>
@@ -11951,7 +11962,7 @@
           <a:p>
             <a:fld id="{BFB05F3F-E948-DD41-9031-1B2AF49AD76C}" type="datetime1">
               <a:rPr lang="en-US" smtClean="0"/>
-              <a:t>5/1/17</a:t>
+              <a:t>5/3/17</a:t>
             </a:fld>
             <a:endParaRPr lang="en-US"/>
           </a:p>
@@ -12164,7 +12175,7 @@
           <a:p>
             <a:fld id="{771A8861-859A-A949-A7D3-0A76732EE9EB}" type="datetime1">
               <a:rPr lang="en-US" smtClean="0"/>
-              <a:t>5/1/17</a:t>
+              <a:t>5/3/17</a:t>
             </a:fld>
             <a:endParaRPr lang="en-US" dirty="0"/>
           </a:p>
@@ -12383,7 +12394,7 @@
           <a:p>
             <a:fld id="{D5EAB504-1A42-5949-AE07-2AC2FB9C6C54}" type="datetime1">
               <a:rPr lang="en-US" smtClean="0"/>
-              <a:t>5/1/17</a:t>
+              <a:t>5/3/17</a:t>
             </a:fld>
             <a:endParaRPr lang="en-US" dirty="0"/>
           </a:p>
@@ -12620,7 +12631,7 @@
           <a:p>
             <a:fld id="{79168923-96D4-8249-9655-376DD4AC8146}" type="datetime1">
               <a:rPr lang="en-US" smtClean="0"/>
-              <a:t>5/1/17</a:t>
+              <a:t>5/3/17</a:t>
             </a:fld>
             <a:endParaRPr lang="en-US"/>
           </a:p>
@@ -13119,7 +13130,7 @@
           <a:p>
             <a:fld id="{F92F4056-9118-9A49-8EA1-59B389654B04}" type="datetime1">
               <a:rPr lang="en-US" smtClean="0"/>
-              <a:t>5/1/17</a:t>
+              <a:t>5/3/17</a:t>
             </a:fld>
             <a:endParaRPr lang="en-US"/>
           </a:p>
@@ -13340,7 +13351,7 @@
           <a:p>
             <a:fld id="{6A2AF87B-5DE4-7242-B926-81C627D286DE}" type="datetime1">
               <a:rPr lang="en-US" smtClean="0"/>
-              <a:t>5/1/17</a:t>
+              <a:t>5/3/17</a:t>
             </a:fld>
             <a:endParaRPr lang="en-US"/>
           </a:p>
@@ -13564,7 +13575,7 @@
           <a:p>
             <a:fld id="{C409689E-59C4-3149-BC30-04475534628F}" type="datetime1">
               <a:rPr lang="en-US" smtClean="0"/>
-              <a:t>5/1/17</a:t>
+              <a:t>5/3/17</a:t>
             </a:fld>
             <a:endParaRPr lang="en-US"/>
           </a:p>
@@ -13767,7 +13778,7 @@
           <a:p>
             <a:fld id="{A4F0CB77-59E8-AA4B-8AF0-F960A2371B83}" type="datetime1">
               <a:rPr lang="en-US" smtClean="0"/>
-              <a:t>5/1/17</a:t>
+              <a:t>5/3/17</a:t>
             </a:fld>
             <a:endParaRPr lang="en-US"/>
           </a:p>
@@ -14040,7 +14051,7 @@
           <a:p>
             <a:fld id="{2CB1BB01-A22C-0E44-AE14-9BA42F328388}" type="datetime1">
               <a:rPr lang="en-US" smtClean="0"/>
-              <a:t>5/1/17</a:t>
+              <a:t>5/3/17</a:t>
             </a:fld>
             <a:endParaRPr lang="en-US" dirty="0"/>
           </a:p>
@@ -14168,7 +14179,7 @@
           <a:p>
             <a:fld id="{EF2E92D6-81C2-2349-8DFB-1F1A7DD82F92}" type="datetime1">
               <a:rPr lang="en-US" smtClean="0"/>
-              <a:t>5/1/17</a:t>
+              <a:t>5/3/17</a:t>
             </a:fld>
             <a:endParaRPr lang="en-US"/>
           </a:p>
@@ -14364,7 +14375,7 @@
           <a:p>
             <a:fld id="{8C1A9D32-265E-194F-AF93-71B2043231E0}" type="datetime1">
               <a:rPr lang="en-US" smtClean="0"/>
-              <a:t>5/1/17</a:t>
+              <a:t>5/3/17</a:t>
             </a:fld>
             <a:endParaRPr lang="en-US"/>
           </a:p>
@@ -14590,7 +14601,7 @@
           <a:p>
             <a:fld id="{4ACF55D2-6E15-324D-A853-3288224DF348}" type="datetime1">
               <a:rPr lang="en-US" smtClean="0"/>
-              <a:t>5/1/17</a:t>
+              <a:t>5/3/17</a:t>
             </a:fld>
             <a:endParaRPr lang="en-US" dirty="0"/>
           </a:p>
@@ -14807,7 +14818,7 @@
           <a:p>
             <a:fld id="{2BF9B4AA-B499-8C4E-9B8E-811BDC42AB72}" type="datetime1">
               <a:rPr lang="en-US" smtClean="0"/>
-              <a:t>5/1/17</a:t>
+              <a:t>5/3/17</a:t>
             </a:fld>
             <a:endParaRPr lang="en-US"/>
           </a:p>
@@ -15025,7 +15036,7 @@
           <a:p>
             <a:fld id="{09667844-52C5-454C-91DA-DA641038CED4}" type="datetime1">
               <a:rPr lang="en-US" smtClean="0"/>
-              <a:t>5/1/17</a:t>
+              <a:t>5/3/17</a:t>
             </a:fld>
             <a:endParaRPr lang="en-US"/>
           </a:p>
@@ -15197,7 +15208,7 @@
           <a:p>
             <a:fld id="{D07D67D9-0F25-3A44-BD87-1123755F3EE6}" type="datetime1">
               <a:rPr lang="en-US" smtClean="0"/>
-              <a:t>5/1/17</a:t>
+              <a:t>5/3/17</a:t>
             </a:fld>
             <a:endParaRPr lang="en-US"/>
           </a:p>
@@ -15414,7 +15425,7 @@
           <a:p>
             <a:fld id="{D20DA3BF-08CB-8A4B-9523-EAB60681977A}" type="datetime1">
               <a:rPr lang="en-US" smtClean="0"/>
-              <a:t>5/1/17</a:t>
+              <a:t>5/3/17</a:t>
             </a:fld>
             <a:endParaRPr lang="en-US"/>
           </a:p>
@@ -17349,7 +17360,7 @@
           <a:p>
             <a:fld id="{A3C9C1BB-C1E4-004E-B76B-8C60A87CB160}" type="datetime1">
               <a:rPr lang="en-US" smtClean="0"/>
-              <a:t>5/1/17</a:t>
+              <a:t>5/3/17</a:t>
             </a:fld>
             <a:endParaRPr lang="en-US"/>
           </a:p>
@@ -19478,15 +19489,7 @@
                 <a:ea typeface="Courier New" charset="0"/>
                 <a:cs typeface="Courier New" charset="0"/>
               </a:rPr>
-              <a:t> </a:t>
-            </a:r>
-            <a:r>
-              <a:rPr lang="en-US" dirty="0" smtClean="0">
-                <a:latin typeface="Courier New" charset="0"/>
-                <a:ea typeface="Courier New" charset="0"/>
-                <a:cs typeface="Courier New" charset="0"/>
-              </a:rPr>
-              <a:t>--partition=</a:t>
+              <a:t> --partition=</a:t>
             </a:r>
             <a:r>
               <a:rPr lang="en-US" dirty="0" err="1" smtClean="0">
@@ -19537,7 +19540,7 @@
           <a:p>
             <a:fld id="{D7C17083-DB9E-DF40-9FF1-3C3BBD3126F3}" type="datetime1">
               <a:rPr lang="en-US" smtClean="0"/>
-              <a:t>5/1/17</a:t>
+              <a:t>5/3/17</a:t>
             </a:fld>
             <a:endParaRPr lang="en-US" dirty="0"/>
           </a:p>
@@ -19770,11 +19773,7 @@
           <a:p>
             <a:r>
               <a:rPr lang="en-US" dirty="0" smtClean="0"/>
-              <a:t>Allocation</a:t>
-            </a:r>
-            <a:r>
-              <a:rPr lang="en-US" dirty="0" smtClean="0"/>
-              <a:t>:		</a:t>
+              <a:t>Allocation:		</a:t>
             </a:r>
             <a:r>
               <a:rPr lang="en-US" sz="2200" dirty="0" smtClean="0">
@@ -19812,11 +19811,7 @@
           <a:p>
             <a:r>
               <a:rPr lang="en-US" dirty="0" smtClean="0"/>
-              <a:t>Partition</a:t>
-            </a:r>
-            <a:r>
-              <a:rPr lang="en-US" dirty="0" smtClean="0"/>
-              <a:t>:		</a:t>
+              <a:t>Partition:		</a:t>
             </a:r>
             <a:r>
               <a:rPr lang="en-US" dirty="0" smtClean="0">
@@ -19847,11 +19842,7 @@
           <a:p>
             <a:r>
               <a:rPr lang="en-US" dirty="0" smtClean="0"/>
-              <a:t>Sending emails</a:t>
-            </a:r>
-            <a:r>
-              <a:rPr lang="en-US" dirty="0" smtClean="0"/>
-              <a:t>:	</a:t>
+              <a:t>Sending emails:	</a:t>
             </a:r>
             <a:r>
               <a:rPr lang="en-US" sz="2200" dirty="0" smtClean="0">
@@ -19873,11 +19864,7 @@
           <a:p>
             <a:r>
               <a:rPr lang="en-US" dirty="0" smtClean="0"/>
-              <a:t>Email address</a:t>
-            </a:r>
-            <a:r>
-              <a:rPr lang="en-US" dirty="0" smtClean="0"/>
-              <a:t>:	</a:t>
+              <a:t>Email address:	</a:t>
             </a:r>
             <a:r>
               <a:rPr lang="en-US" sz="2200" dirty="0" smtClean="0">
@@ -19899,11 +19886,7 @@
           <a:p>
             <a:r>
               <a:rPr lang="en-US" dirty="0" smtClean="0"/>
-              <a:t>Number of nodes</a:t>
-            </a:r>
-            <a:r>
-              <a:rPr lang="en-US" dirty="0" smtClean="0"/>
-              <a:t>:	</a:t>
+              <a:t>Number of nodes:	</a:t>
             </a:r>
             <a:r>
               <a:rPr lang="en-US" sz="2200" dirty="0" smtClean="0">
@@ -19925,11 +19908,7 @@
           <a:p>
             <a:r>
               <a:rPr lang="en-US" dirty="0" smtClean="0"/>
-              <a:t>Quality of service</a:t>
-            </a:r>
-            <a:r>
-              <a:rPr lang="en-US" dirty="0" smtClean="0"/>
-              <a:t>:	</a:t>
+              <a:t>Quality of service:	</a:t>
             </a:r>
             <a:r>
               <a:rPr lang="en-US" sz="2200" dirty="0" smtClean="0">
@@ -19975,11 +19954,7 @@
           <a:p>
             <a:r>
               <a:rPr lang="en-US" dirty="0" smtClean="0"/>
-              <a:t>Reservation</a:t>
-            </a:r>
-            <a:r>
-              <a:rPr lang="en-US" dirty="0" smtClean="0"/>
-              <a:t>:	</a:t>
+              <a:t>Reservation:	</a:t>
             </a:r>
             <a:r>
               <a:rPr lang="en-US" sz="2200" dirty="0" smtClean="0">
@@ -20001,11 +19976,7 @@
           <a:p>
             <a:r>
               <a:rPr lang="en-US" dirty="0" smtClean="0"/>
-              <a:t>Wall time</a:t>
-            </a:r>
-            <a:r>
-              <a:rPr lang="en-US" dirty="0" smtClean="0"/>
-              <a:t>:		</a:t>
+              <a:t>Wall time:		</a:t>
             </a:r>
             <a:r>
               <a:rPr lang="en-US" sz="2200" dirty="0" smtClean="0">
@@ -20027,11 +19998,7 @@
           <a:p>
             <a:r>
               <a:rPr lang="en-US" dirty="0" smtClean="0"/>
-              <a:t>Job Name</a:t>
-            </a:r>
-            <a:r>
-              <a:rPr lang="en-US" dirty="0" smtClean="0"/>
-              <a:t>:		</a:t>
+              <a:t>Job Name:		</a:t>
             </a:r>
             <a:r>
               <a:rPr lang="en-US" sz="2200" dirty="0" smtClean="0">
@@ -20102,7 +20069,7 @@
           <a:p>
             <a:fld id="{F1062F58-FDE1-BA4D-BB8C-2264A72B5428}" type="datetime1">
               <a:rPr lang="en-US" smtClean="0"/>
-              <a:t>5/1/17</a:t>
+              <a:t>5/3/17</a:t>
             </a:fld>
             <a:endParaRPr lang="en-US" dirty="0"/>
           </a:p>
@@ -20286,15 +20253,7 @@
           <a:p>
             <a:r>
               <a:rPr lang="en-US" dirty="0" smtClean="0"/>
-              <a:t>To ensure </a:t>
-            </a:r>
-            <a:r>
-              <a:rPr lang="en-US" dirty="0" smtClean="0"/>
-              <a:t>this, </a:t>
-            </a:r>
-            <a:r>
-              <a:rPr lang="en-US" dirty="0" smtClean="0"/>
-              <a:t>make sure you load the </a:t>
+              <a:t>To ensure this, make sure you load the </a:t>
             </a:r>
             <a:r>
               <a:rPr lang="en-US" dirty="0" err="1" smtClean="0"/>
@@ -20408,7 +20367,7 @@
           <a:p>
             <a:fld id="{57D010C4-F61A-344B-ACB4-6FFCD098ACFF}" type="datetime1">
               <a:rPr lang="en-US" smtClean="0"/>
-              <a:t>5/1/17</a:t>
+              <a:t>5/3/17</a:t>
             </a:fld>
             <a:endParaRPr lang="en-US"/>
           </a:p>
@@ -20629,7 +20588,7 @@
           <a:p>
             <a:fld id="{36D94695-4FE4-B74D-9FEF-603C469ABA33}" type="datetime1">
               <a:rPr lang="en-US" smtClean="0"/>
-              <a:t>5/1/17</a:t>
+              <a:t>5/3/17</a:t>
             </a:fld>
             <a:endParaRPr lang="en-US"/>
           </a:p>
@@ -20875,7 +20834,7 @@
           <a:p>
             <a:fld id="{A2DD7857-83C0-944C-808D-7EBD666BA1C5}" type="datetime1">
               <a:rPr lang="en-US" smtClean="0"/>
-              <a:t>5/1/17</a:t>
+              <a:t>5/3/17</a:t>
             </a:fld>
             <a:endParaRPr lang="en-US"/>
           </a:p>
@@ -21003,7 +20962,7 @@
           <a:p>
             <a:fld id="{D0F1EC55-3BF6-B94A-A8A8-ECF9B2E6E6A5}" type="datetime1">
               <a:rPr lang="en-US" smtClean="0"/>
-              <a:t>5/1/17</a:t>
+              <a:t>5/3/17</a:t>
             </a:fld>
             <a:endParaRPr lang="en-US" dirty="0"/>
           </a:p>
@@ -21219,7 +21178,7 @@
           <a:p>
             <a:fld id="{157FD4B1-436B-5B42-B797-4F45D1B6B6A9}" type="datetime1">
               <a:rPr lang="en-US" smtClean="0"/>
-              <a:t>5/1/17</a:t>
+              <a:t>5/3/17</a:t>
             </a:fld>
             <a:endParaRPr lang="en-US" dirty="0"/>
           </a:p>
@@ -21441,11 +21400,7 @@
             </a:pPr>
             <a:r>
               <a:rPr lang="en-US" dirty="0" smtClean="0"/>
-              <a:t>User </a:t>
-            </a:r>
-            <a:r>
-              <a:rPr lang="en-US" dirty="0" smtClean="0"/>
-              <a:t>the </a:t>
+              <a:t>User the </a:t>
             </a:r>
             <a:r>
               <a:rPr lang="en-US" dirty="0" err="1" smtClean="0"/>
@@ -21496,7 +21451,7 @@
           <a:p>
             <a:fld id="{50F15D87-D865-834D-8095-85B47E5D857D}" type="datetime1">
               <a:rPr lang="en-US" smtClean="0"/>
-              <a:t>5/1/17</a:t>
+              <a:t>5/3/17</a:t>
             </a:fld>
             <a:endParaRPr lang="en-US"/>
           </a:p>
@@ -21906,15 +21861,7 @@
                 <a:ea typeface="Courier" charset="0"/>
                 <a:cs typeface="Courier" charset="0"/>
               </a:rPr>
-              <a:t>           </a:t>
-            </a:r>
-            <a:r>
-              <a:rPr lang="en-US" sz="2000" dirty="0">
-                <a:latin typeface="Courier" charset="0"/>
-                <a:ea typeface="Courier" charset="0"/>
-                <a:cs typeface="Courier" charset="0"/>
-              </a:rPr>
-              <a:t> </a:t>
+              <a:t>            </a:t>
             </a:r>
             <a:r>
               <a:rPr lang="en-US" sz="2000" dirty="0" smtClean="0">
@@ -22431,7 +22378,7 @@
           <a:p>
             <a:fld id="{F595C32F-4FDD-1845-9DAD-BF783B30F4EA}" type="datetime1">
               <a:rPr lang="en-US" smtClean="0"/>
-              <a:t>5/1/17</a:t>
+              <a:t>5/3/17</a:t>
             </a:fld>
             <a:endParaRPr lang="en-US"/>
           </a:p>
@@ -22630,11 +22577,7 @@
             <a:pPr lvl="1"/>
             <a:r>
               <a:rPr lang="en-US" dirty="0" smtClean="0"/>
-              <a:t>Queues: </a:t>
-            </a:r>
-            <a:r>
-              <a:rPr lang="en-US" dirty="0" smtClean="0"/>
-              <a:t> </a:t>
+              <a:t>Queues:  </a:t>
             </a:r>
             <a:r>
               <a:rPr lang="en-US" dirty="0" smtClean="0">
@@ -22771,7 +22714,7 @@
           <a:p>
             <a:fld id="{7A593D67-D80B-D341-95C2-D8FD019BB686}" type="datetime1">
               <a:rPr lang="en-US" smtClean="0"/>
-              <a:t>5/1/17</a:t>
+              <a:t>5/3/17</a:t>
             </a:fld>
             <a:endParaRPr lang="en-US" dirty="0"/>
           </a:p>
@@ -23097,7 +23040,7 @@
           <a:p>
             <a:fld id="{26A447B6-DA76-2941-9271-7615FCF773C3}" type="datetime1">
               <a:rPr lang="en-US" smtClean="0"/>
-              <a:t>5/1/17</a:t>
+              <a:t>5/3/17</a:t>
             </a:fld>
             <a:endParaRPr lang="en-US"/>
           </a:p>
@@ -23334,11 +23277,7 @@
             </a:pPr>
             <a:r>
               <a:rPr lang="en-US" dirty="0" smtClean="0"/>
-              <a:t>Request </a:t>
-            </a:r>
-            <a:r>
-              <a:rPr lang="en-US" dirty="0" smtClean="0"/>
-              <a:t>a 1 minute wall time</a:t>
+              <a:t>Request a 1 minute wall time</a:t>
             </a:r>
           </a:p>
           <a:p>
@@ -23386,24 +23325,15 @@
             </a:pPr>
             <a:r>
               <a:rPr lang="en-US" dirty="0" smtClean="0"/>
-              <a:t>Email </a:t>
-            </a:r>
-            <a:r>
-              <a:rPr lang="en-US" dirty="0" smtClean="0"/>
-              <a:t>yourself the results at the end of the job run</a:t>
+              <a:t>Email yourself the results at the end of the job run</a:t>
             </a:r>
           </a:p>
           <a:p>
             <a:pPr lvl="1"/>
             <a:r>
               <a:rPr lang="en-US" dirty="0" smtClean="0"/>
-              <a:t>Hint:  Requires two SBATCH options to do </a:t>
-            </a:r>
-            <a:r>
-              <a:rPr lang="en-US" dirty="0" smtClean="0"/>
-              <a:t>this – see link at top of this slide</a:t>
-            </a:r>
-            <a:endParaRPr lang="en-US" dirty="0" smtClean="0"/>
+              <a:t>Hint:  Requires two SBATCH options to do this – see link at top of this slide</a:t>
+            </a:r>
           </a:p>
           <a:p>
             <a:pPr marL="571500" indent="-457200">
@@ -23462,7 +23392,7 @@
           <a:p>
             <a:fld id="{38B2C89D-A2C7-BC4F-80C2-CF46C745D9C4}" type="datetime1">
               <a:rPr lang="en-US" smtClean="0"/>
-              <a:t>5/1/17</a:t>
+              <a:t>5/3/17</a:t>
             </a:fld>
             <a:endParaRPr lang="en-US"/>
           </a:p>
@@ -24342,7 +24272,7 @@
           <a:p>
             <a:fld id="{58476822-42A8-164F-A773-7C6D2A6A81DB}" type="datetime1">
               <a:rPr lang="en-US" smtClean="0"/>
-              <a:t>5/1/17</a:t>
+              <a:t>5/3/17</a:t>
             </a:fld>
             <a:endParaRPr lang="en-US" dirty="0"/>
           </a:p>
@@ -24556,11 +24486,7 @@
           <a:p>
             <a:r>
               <a:rPr lang="en-US" dirty="0" smtClean="0"/>
-              <a:t>Check </a:t>
-            </a:r>
-            <a:r>
-              <a:rPr lang="en-US" dirty="0" smtClean="0"/>
-              <a:t>output</a:t>
+              <a:t>Check output</a:t>
             </a:r>
             <a:endParaRPr lang="en-US" sz="1900" dirty="0">
               <a:latin typeface="Courier New" charset="0"/>
@@ -24599,7 +24525,7 @@
           <a:p>
             <a:fld id="{743333A5-8F5B-BA46-B1A8-D091CAAF002B}" type="datetime1">
               <a:rPr lang="en-US" smtClean="0"/>
-              <a:t>5/1/17</a:t>
+              <a:t>5/3/17</a:t>
             </a:fld>
             <a:endParaRPr lang="en-US"/>
           </a:p>
@@ -25486,7 +25412,7 @@
           <a:p>
             <a:fld id="{406683BE-7CE6-C246-A895-91EACBC36081}" type="datetime1">
               <a:rPr lang="en-US" smtClean="0"/>
-              <a:t>5/1/17</a:t>
+              <a:t>5/3/17</a:t>
             </a:fld>
             <a:endParaRPr lang="en-US" dirty="0"/>
           </a:p>
@@ -25828,11 +25754,7 @@
             </a:pPr>
             <a:r>
               <a:rPr lang="en-US" dirty="0" smtClean="0"/>
-              <a:t>We will request a 1 minute wall </a:t>
-            </a:r>
-            <a:r>
-              <a:rPr lang="en-US" dirty="0" smtClean="0"/>
-              <a:t>time</a:t>
+              <a:t>We will request a 1 minute wall time</a:t>
             </a:r>
           </a:p>
           <a:p>
@@ -25871,11 +25793,7 @@
             </a:pPr>
             <a:r>
               <a:rPr lang="en-US" dirty="0" smtClean="0"/>
-              <a:t>The output will be put in a file called </a:t>
-            </a:r>
-            <a:r>
-              <a:rPr lang="en-US" dirty="0" smtClean="0"/>
-              <a:t>R_code_%</a:t>
+              <a:t>The output will be put in a file called R_code_%</a:t>
             </a:r>
             <a:r>
               <a:rPr lang="en-US" dirty="0" err="1" smtClean="0"/>
@@ -26715,7 +26633,7 @@
           <a:p>
             <a:fld id="{9890B64F-BD66-014F-8385-76577B03EE8A}" type="datetime1">
               <a:rPr lang="en-US" smtClean="0"/>
-              <a:t>5/1/17</a:t>
+              <a:t>5/3/17</a:t>
             </a:fld>
             <a:endParaRPr lang="en-US"/>
           </a:p>
@@ -26898,7 +26816,7 @@
           <a:p>
             <a:fld id="{24EAC218-805B-5942-9D1C-1CAF707EFBDF}" type="datetime1">
               <a:rPr lang="en-US" smtClean="0"/>
-              <a:t>5/1/17</a:t>
+              <a:t>5/3/17</a:t>
             </a:fld>
             <a:endParaRPr lang="en-US" dirty="0"/>
           </a:p>
@@ -27080,7 +26998,7 @@
           <a:p>
             <a:fld id="{AB9B9C8A-8339-1843-AA8F-761CADDDACEE}" type="datetime1">
               <a:rPr lang="en-US" smtClean="0"/>
-              <a:t>5/1/17</a:t>
+              <a:t>5/3/17</a:t>
             </a:fld>
             <a:endParaRPr lang="en-US" dirty="0"/>
           </a:p>
@@ -27396,7 +27314,7 @@
           <a:p>
             <a:fld id="{E12727D1-4C82-404C-B300-E3C9ED3E7415}" type="datetime1">
               <a:rPr lang="en-US" smtClean="0"/>
-              <a:t>5/1/17</a:t>
+              <a:t>5/3/17</a:t>
             </a:fld>
             <a:endParaRPr lang="en-US" dirty="0"/>
           </a:p>
@@ -27565,15 +27483,7 @@
                 <a:ea typeface="Courier" charset="0"/>
                 <a:cs typeface="Courier" charset="0"/>
               </a:rPr>
-              <a:t>	</a:t>
-            </a:r>
-            <a:r>
-              <a:rPr lang="en-US" dirty="0" smtClean="0">
-                <a:latin typeface="Courier" charset="0"/>
-                <a:ea typeface="Courier" charset="0"/>
-                <a:cs typeface="Courier" charset="0"/>
-              </a:rPr>
-              <a:t>module load </a:t>
+              <a:t>	module load </a:t>
             </a:r>
             <a:r>
               <a:rPr lang="en-US" dirty="0" err="1" smtClean="0">
@@ -27748,7 +27658,7 @@
           <a:p>
             <a:fld id="{F21DF42F-4BC7-1E4D-B4C7-33A7E30F56D4}" type="datetime1">
               <a:rPr lang="en-US" smtClean="0"/>
-              <a:t>5/1/17</a:t>
+              <a:t>5/3/17</a:t>
             </a:fld>
             <a:endParaRPr lang="en-US" dirty="0"/>
           </a:p>
@@ -27963,7 +27873,7 @@
           <a:p>
             <a:fld id="{1638A253-D0BE-0C4F-8900-127DDEBDCF84}" type="datetime1">
               <a:rPr lang="en-US" smtClean="0"/>
-              <a:t>5/1/17</a:t>
+              <a:t>5/3/17</a:t>
             </a:fld>
             <a:endParaRPr lang="en-US"/>
           </a:p>
@@ -28147,7 +28057,11 @@
           <a:p>
             <a:r>
               <a:rPr lang="en-US" dirty="0"/>
-              <a:t>Slides: </a:t>
+              <a:t>Slides</a:t>
+            </a:r>
+            <a:r>
+              <a:rPr lang="en-US" dirty="0"/>
+              <a:t>: </a:t>
             </a:r>
             <a:r>
               <a:rPr lang="en-US" dirty="0">
@@ -28159,10 +28073,10 @@
               <a:rPr lang="en-US" dirty="0" smtClean="0">
                 <a:hlinkClick r:id="rId4"/>
               </a:rPr>
-              <a:t>github.com/ResearchComputing/Final_Tutorials/tree/master/RC_Access_Specific_Topics/New_User_Seminar</a:t>
-            </a:r>
-            <a:r>
-              <a:rPr lang="en-US" dirty="0" smtClean="0"/>
+              <a:t>github.com/ResearchComputing/New_User_Seminar</a:t>
+            </a:r>
+            <a:r>
+              <a:rPr lang="en-US" smtClean="0"/>
               <a:t> </a:t>
             </a:r>
             <a:endParaRPr lang="en-US" dirty="0"/>
@@ -28186,7 +28100,7 @@
           <a:p>
             <a:fld id="{F176B5BB-6C1E-4446-A4B5-BF7D661481E8}" type="datetime1">
               <a:rPr lang="en-US" smtClean="0"/>
-              <a:t>5/1/17</a:t>
+              <a:t>5/3/17</a:t>
             </a:fld>
             <a:endParaRPr lang="en-US" dirty="0"/>
           </a:p>
@@ -28383,7 +28297,7 @@
           <a:p>
             <a:fld id="{2C3A7136-6CD9-1F44-BF87-1F02B022DD38}" type="datetime1">
               <a:rPr lang="en-US" smtClean="0"/>
-              <a:t>5/1/17</a:t>
+              <a:t>5/3/17</a:t>
             </a:fld>
             <a:endParaRPr lang="en-US"/>
           </a:p>
@@ -28611,7 +28525,7 @@
           <a:p>
             <a:fld id="{DD60739B-9381-D348-A54C-084428A1CE83}" type="datetime1">
               <a:rPr lang="en-US" smtClean="0"/>
-              <a:t>5/1/17</a:t>
+              <a:t>5/3/17</a:t>
             </a:fld>
             <a:endParaRPr lang="en-US"/>
           </a:p>
@@ -28838,7 +28752,7 @@
           <a:p>
             <a:fld id="{E4C2F9E9-0335-9F43-85CD-6D5AFF0B589E}" type="datetime1">
               <a:rPr lang="en-US" smtClean="0"/>
-              <a:t>5/1/17</a:t>
+              <a:t>5/3/17</a:t>
             </a:fld>
             <a:endParaRPr lang="en-US"/>
           </a:p>
@@ -29023,7 +28937,7 @@
           <a:p>
             <a:fld id="{CE5BD4CA-09B4-E54C-901B-62D7687F59E7}" type="datetime1">
               <a:rPr lang="en-US" smtClean="0"/>
-              <a:t>5/1/17</a:t>
+              <a:t>5/3/17</a:t>
             </a:fld>
             <a:endParaRPr lang="en-US"/>
           </a:p>

</xml_diff>

<commit_message>
Updated some content in the talks to be more consistent with other content
</commit_message>
<xml_diff>
--- a/rc_new_user_seminar_2017.pptx
+++ b/rc_new_user_seminar_2017.pptx
@@ -6,7 +6,7 @@
     <p:sldMasterId id="2147483673" r:id="rId2"/>
   </p:sldMasterIdLst>
   <p:notesMasterIdLst>
-    <p:notesMasterId r:id="rId61"/>
+    <p:notesMasterId r:id="rId59"/>
   </p:notesMasterIdLst>
   <p:sldIdLst>
     <p:sldId id="257" r:id="rId3"/>
@@ -62,11 +62,9 @@
     <p:sldId id="283" r:id="rId53"/>
     <p:sldId id="284" r:id="rId54"/>
     <p:sldId id="321" r:id="rId55"/>
-    <p:sldId id="322" r:id="rId56"/>
-    <p:sldId id="323" r:id="rId57"/>
-    <p:sldId id="324" r:id="rId58"/>
-    <p:sldId id="307" r:id="rId59"/>
-    <p:sldId id="285" r:id="rId60"/>
+    <p:sldId id="323" r:id="rId56"/>
+    <p:sldId id="324" r:id="rId57"/>
+    <p:sldId id="285" r:id="rId58"/>
   </p:sldIdLst>
   <p:sldSz cx="12192000" cy="6858000"/>
   <p:notesSz cx="6858000" cy="9144000"/>
@@ -255,7 +253,7 @@
           <a:p>
             <a:fld id="{C649942D-A542-EE42-A1CF-1E4FFF53ED67}" type="datetimeFigureOut">
               <a:rPr lang="en-US" smtClean="0"/>
-              <a:t>5/3/17</a:t>
+              <a:t>5/4/17</a:t>
             </a:fld>
             <a:endParaRPr lang="en-US"/>
           </a:p>
@@ -1496,14 +1494,14 @@
               <ma14:placeholderFlag xmlns:ma14="http://schemas.microsoft.com/office/mac/drawingml/2011/main" val="1"/>
             </a:ext>
             <a:ext uri="{909E8E84-426E-40dd-AFC4-6F175D3DCCD1}">
-              <a14:hiddenFill xmlns:a14="http://schemas.microsoft.com/office/drawing/2010/main" xmlns="">
+              <a14:hiddenFill xmlns="" xmlns:a14="http://schemas.microsoft.com/office/drawing/2010/main">
                 <a:solidFill>
                   <a:srgbClr val="FFFFFF"/>
                 </a:solidFill>
               </a14:hiddenFill>
             </a:ext>
             <a:ext uri="{91240B29-F687-4f45-9708-019B960494DF}">
-              <a14:hiddenLine xmlns:a14="http://schemas.microsoft.com/office/drawing/2010/main" xmlns="" w="9525">
+              <a14:hiddenLine xmlns="" xmlns:a14="http://schemas.microsoft.com/office/drawing/2010/main" w="9525">
                 <a:solidFill>
                   <a:srgbClr val="000000"/>
                 </a:solidFill>
@@ -1541,14 +1539,14 @@
           <a:ln/>
           <a:extLst>
             <a:ext uri="{909E8E84-426E-40dd-AFC4-6F175D3DCCD1}">
-              <a14:hiddenFill xmlns:a14="http://schemas.microsoft.com/office/drawing/2010/main" xmlns="">
+              <a14:hiddenFill xmlns="" xmlns:a14="http://schemas.microsoft.com/office/drawing/2010/main">
                 <a:solidFill>
                   <a:srgbClr val="FFFFFF"/>
                 </a:solidFill>
               </a14:hiddenFill>
             </a:ext>
             <a:ext uri="{91240B29-F687-4f45-9708-019B960494DF}">
-              <a14:hiddenLine xmlns:a14="http://schemas.microsoft.com/office/drawing/2010/main" xmlns="" w="9525">
+              <a14:hiddenLine xmlns="" xmlns:a14="http://schemas.microsoft.com/office/drawing/2010/main" w="9525">
                 <a:solidFill>
                   <a:srgbClr val="000000"/>
                 </a:solidFill>
@@ -2669,7 +2667,7 @@
           <a:p>
             <a:fld id="{ECD68DE7-8E14-F140-9BF8-7DF505A7EC71}" type="datetime1">
               <a:rPr lang="en-US" smtClean="0"/>
-              <a:t>5/3/17</a:t>
+              <a:t>5/4/17</a:t>
             </a:fld>
             <a:endParaRPr lang="en-US"/>
           </a:p>
@@ -2859,7 +2857,7 @@
           <a:p>
             <a:fld id="{1D9E6949-9996-6743-8CFF-FA3A56E13506}" type="datetime1">
               <a:rPr lang="en-US" smtClean="0"/>
-              <a:t>5/3/17</a:t>
+              <a:t>5/4/17</a:t>
             </a:fld>
             <a:endParaRPr lang="en-US"/>
           </a:p>
@@ -3059,7 +3057,7 @@
           <a:p>
             <a:fld id="{B889D5DF-D410-3845-BB2F-EEB43AAD8F50}" type="datetime1">
               <a:rPr lang="en-US" smtClean="0"/>
-              <a:t>5/3/17</a:t>
+              <a:t>5/4/17</a:t>
             </a:fld>
             <a:endParaRPr lang="en-US"/>
           </a:p>
@@ -3346,7 +3344,7 @@
           <a:p>
             <a:fld id="{150E7F26-8C30-8C48-992C-4605BCF373C1}" type="datetime1">
               <a:rPr lang="en-US" smtClean="0"/>
-              <a:t>5/3/17</a:t>
+              <a:t>5/4/17</a:t>
             </a:fld>
             <a:endParaRPr lang="en-US"/>
           </a:p>
@@ -3601,7 +3599,7 @@
           <a:p>
             <a:fld id="{5989D8A3-9E0D-F746-B178-BE7AAD7E1D08}" type="datetime1">
               <a:rPr lang="en-US" smtClean="0"/>
-              <a:t>5/3/17</a:t>
+              <a:t>5/4/17</a:t>
             </a:fld>
             <a:endParaRPr lang="en-US"/>
           </a:p>
@@ -3791,7 +3789,7 @@
           <a:p>
             <a:fld id="{FBFD08B6-FF5B-084B-9D71-755657184AD2}" type="datetime1">
               <a:rPr lang="en-US" smtClean="0"/>
-              <a:t>5/3/17</a:t>
+              <a:t>5/4/17</a:t>
             </a:fld>
             <a:endParaRPr lang="en-US"/>
           </a:p>
@@ -4057,7 +4055,7 @@
           <a:p>
             <a:fld id="{22D37D1D-20E9-C347-9D59-D2454D21F9A1}" type="datetime1">
               <a:rPr lang="en-US" smtClean="0"/>
-              <a:t>5/3/17</a:t>
+              <a:t>5/4/17</a:t>
             </a:fld>
             <a:endParaRPr lang="en-US"/>
           </a:p>
@@ -4365,7 +4363,7 @@
           <a:p>
             <a:fld id="{2BE6509E-27A0-AE45-874D-A23ED8FF69C7}" type="datetime1">
               <a:rPr lang="en-US" smtClean="0"/>
-              <a:t>5/3/17</a:t>
+              <a:t>5/4/17</a:t>
             </a:fld>
             <a:endParaRPr lang="en-US"/>
           </a:p>
@@ -4819,7 +4817,7 @@
           <a:p>
             <a:fld id="{18E1633D-FD18-3048-98AE-ADC6C06803FD}" type="datetime1">
               <a:rPr lang="en-US" smtClean="0"/>
-              <a:t>5/3/17</a:t>
+              <a:t>5/4/17</a:t>
             </a:fld>
             <a:endParaRPr lang="en-US"/>
           </a:p>
@@ -4957,7 +4955,7 @@
           <a:p>
             <a:fld id="{0EABE0D9-D7EF-244F-A413-7BCAE9FD1206}" type="datetime1">
               <a:rPr lang="en-US" smtClean="0"/>
-              <a:t>5/3/17</a:t>
+              <a:t>5/4/17</a:t>
             </a:fld>
             <a:endParaRPr lang="en-US"/>
           </a:p>
@@ -5072,7 +5070,7 @@
           <a:p>
             <a:fld id="{12CB383F-6B5B-B842-A0F8-40DE7F828464}" type="datetime1">
               <a:rPr lang="en-US" smtClean="0"/>
-              <a:t>5/3/17</a:t>
+              <a:t>5/4/17</a:t>
             </a:fld>
             <a:endParaRPr lang="en-US"/>
           </a:p>
@@ -5262,7 +5260,7 @@
           <a:p>
             <a:fld id="{043D7B85-D040-214F-9303-7FDDADF77F95}" type="datetime1">
               <a:rPr lang="en-US" smtClean="0"/>
-              <a:t>5/3/17</a:t>
+              <a:t>5/4/17</a:t>
             </a:fld>
             <a:endParaRPr lang="en-US"/>
           </a:p>
@@ -5476,7 +5474,7 @@
           <a:p>
             <a:fld id="{CF06330F-2863-B244-A889-A6416C2F2863}" type="datetime1">
               <a:rPr lang="en-US" smtClean="0"/>
-              <a:t>5/3/17</a:t>
+              <a:t>5/4/17</a:t>
             </a:fld>
             <a:endParaRPr lang="en-US"/>
           </a:p>
@@ -5819,7 +5817,7 @@
           <a:p>
             <a:fld id="{C888A1B5-C673-8A47-9843-5DDFB797488F}" type="datetime1">
               <a:rPr lang="en-US" smtClean="0"/>
-              <a:t>5/3/17</a:t>
+              <a:t>5/4/17</a:t>
             </a:fld>
             <a:endParaRPr lang="en-US"/>
           </a:p>
@@ -6009,7 +6007,7 @@
           <a:p>
             <a:fld id="{44904425-5295-D94B-8D1F-FB45FDBC9752}" type="datetime1">
               <a:rPr lang="en-US" smtClean="0"/>
-              <a:t>5/3/17</a:t>
+              <a:t>5/4/17</a:t>
             </a:fld>
             <a:endParaRPr lang="en-US"/>
           </a:p>
@@ -6209,7 +6207,7 @@
           <a:p>
             <a:fld id="{58F37EF9-201A-B744-A0C8-0105F4C9414D}" type="datetime1">
               <a:rPr lang="en-US" smtClean="0"/>
-              <a:t>5/3/17</a:t>
+              <a:t>5/4/17</a:t>
             </a:fld>
             <a:endParaRPr lang="en-US"/>
           </a:p>
@@ -6496,7 +6494,7 @@
           <a:p>
             <a:fld id="{91FD8EB4-D581-F048-88ED-A64D6EB3CFAB}" type="datetime1">
               <a:rPr lang="en-US" smtClean="0"/>
-              <a:t>5/3/17</a:t>
+              <a:t>5/4/17</a:t>
             </a:fld>
             <a:endParaRPr lang="en-US"/>
           </a:p>
@@ -6742,7 +6740,7 @@
           <a:p>
             <a:fld id="{77B1075F-B81A-5940-A68D-45596C356335}" type="datetime1">
               <a:rPr lang="en-US" smtClean="0"/>
-              <a:t>5/3/17</a:t>
+              <a:t>5/4/17</a:t>
             </a:fld>
             <a:endParaRPr lang="en-US"/>
           </a:p>
@@ -7050,7 +7048,7 @@
           <a:p>
             <a:fld id="{39113FC0-C6F8-6E40-8D7A-F2A1A22961FE}" type="datetime1">
               <a:rPr lang="en-US" smtClean="0"/>
-              <a:t>5/3/17</a:t>
+              <a:t>5/4/17</a:t>
             </a:fld>
             <a:endParaRPr lang="en-US"/>
           </a:p>
@@ -7504,7 +7502,7 @@
           <a:p>
             <a:fld id="{37F32D73-5A99-464A-8594-B551FF72C9D9}" type="datetime1">
               <a:rPr lang="en-US" smtClean="0"/>
-              <a:t>5/3/17</a:t>
+              <a:t>5/4/17</a:t>
             </a:fld>
             <a:endParaRPr lang="en-US"/>
           </a:p>
@@ -7642,7 +7640,7 @@
           <a:p>
             <a:fld id="{E82BF7D7-27C3-CF45-B820-FC005A5F8688}" type="datetime1">
               <a:rPr lang="en-US" smtClean="0"/>
-              <a:t>5/3/17</a:t>
+              <a:t>5/4/17</a:t>
             </a:fld>
             <a:endParaRPr lang="en-US"/>
           </a:p>
@@ -7757,7 +7755,7 @@
           <a:p>
             <a:fld id="{9555053E-C274-C74C-A284-88F22C581203}" type="datetime1">
               <a:rPr lang="en-US" smtClean="0"/>
-              <a:t>5/3/17</a:t>
+              <a:t>5/4/17</a:t>
             </a:fld>
             <a:endParaRPr lang="en-US"/>
           </a:p>
@@ -7971,7 +7969,7 @@
           <a:p>
             <a:fld id="{7A689FF8-7D69-1D41-AF80-D980840BCB23}" type="datetime1">
               <a:rPr lang="en-US" smtClean="0"/>
-              <a:t>5/3/17</a:t>
+              <a:t>5/4/17</a:t>
             </a:fld>
             <a:endParaRPr lang="en-US"/>
           </a:p>
@@ -8314,7 +8312,7 @@
           <a:p>
             <a:fld id="{B2055EBF-49EC-E44B-96CA-4F8E3FBF2465}" type="datetime1">
               <a:rPr lang="en-US" smtClean="0"/>
-              <a:t>5/3/17</a:t>
+              <a:t>5/4/17</a:t>
             </a:fld>
             <a:endParaRPr lang="en-US"/>
           </a:p>
@@ -8677,7 +8675,7 @@
           <a:p>
             <a:fld id="{96D7D345-C39C-A44C-AF4E-9524445B1337}" type="datetime1">
               <a:rPr lang="en-US" smtClean="0"/>
-              <a:t>5/3/17</a:t>
+              <a:t>5/4/17</a:t>
             </a:fld>
             <a:endParaRPr lang="en-US"/>
           </a:p>
@@ -9380,7 +9378,7 @@
           <a:p>
             <a:fld id="{8C5F0DC5-6EC3-034C-8486-0300E89E16FC}" type="datetime1">
               <a:rPr lang="en-US" smtClean="0"/>
-              <a:t>5/3/17</a:t>
+              <a:t>5/4/17</a:t>
             </a:fld>
             <a:endParaRPr lang="en-US"/>
           </a:p>
@@ -9973,7 +9971,7 @@
           <a:p>
             <a:fld id="{BD3E17D7-4415-0A45-8086-1E9B50478751}" type="datetime1">
               <a:rPr lang="en-US" smtClean="0"/>
-              <a:t>5/3/17</a:t>
+              <a:t>5/4/17</a:t>
             </a:fld>
             <a:endParaRPr lang="en-US" dirty="0"/>
           </a:p>
@@ -10155,7 +10153,7 @@
           <a:p>
             <a:fld id="{4676C52D-A00D-2248-AAC1-94BD55906AAC}" type="datetime1">
               <a:rPr lang="en-US" smtClean="0"/>
-              <a:t>5/3/17</a:t>
+              <a:t>5/4/17</a:t>
             </a:fld>
             <a:endParaRPr lang="en-US"/>
           </a:p>
@@ -10217,6 +10215,13 @@
   <p:clrMapOvr>
     <a:masterClrMapping/>
   </p:clrMapOvr>
+  <p:timing>
+    <p:tnLst>
+      <p:par>
+        <p:cTn id="1" dur="indefinite" restart="never" nodeType="tmRoot"/>
+      </p:par>
+    </p:tnLst>
+  </p:timing>
 </p:sld>
 </file>
 
@@ -10338,7 +10343,7 @@
           <a:p>
             <a:fld id="{446EC888-7CFD-C641-9F44-9678633359F5}" type="datetime1">
               <a:rPr lang="en-US" smtClean="0"/>
-              <a:t>5/3/17</a:t>
+              <a:t>5/4/17</a:t>
             </a:fld>
             <a:endParaRPr lang="en-US"/>
           </a:p>
@@ -10400,6 +10405,13 @@
   <p:clrMapOvr>
     <a:masterClrMapping/>
   </p:clrMapOvr>
+  <p:timing>
+    <p:tnLst>
+      <p:par>
+        <p:cTn id="1" dur="indefinite" restart="never" nodeType="tmRoot"/>
+      </p:par>
+    </p:tnLst>
+  </p:timing>
 </p:sld>
 </file>
 
@@ -10495,8 +10507,13 @@
             </a:r>
             <a:r>
               <a:rPr lang="en-US" dirty="0" smtClean="0"/>
-              <a:t> and ask for a General account</a:t>
-            </a:r>
+              <a:t> and ask for a General </a:t>
+            </a:r>
+            <a:r>
+              <a:rPr lang="en-US" dirty="0" smtClean="0"/>
+              <a:t>allocation</a:t>
+            </a:r>
+            <a:endParaRPr lang="en-US" dirty="0" smtClean="0"/>
           </a:p>
           <a:p>
             <a:pPr lvl="1"/>
@@ -10537,7 +10554,7 @@
           <a:p>
             <a:fld id="{9DCF056C-E28A-E84B-82B5-F09CA8CCF7AA}" type="datetime1">
               <a:rPr lang="en-US" smtClean="0"/>
-              <a:t>5/3/17</a:t>
+              <a:t>5/4/17</a:t>
             </a:fld>
             <a:endParaRPr lang="en-US" dirty="0"/>
           </a:p>
@@ -10599,6 +10616,13 @@
   <p:clrMapOvr>
     <a:masterClrMapping/>
   </p:clrMapOvr>
+  <p:timing>
+    <p:tnLst>
+      <p:par>
+        <p:cTn id="1" dur="indefinite" restart="never" nodeType="tmRoot"/>
+      </p:par>
+    </p:tnLst>
+  </p:timing>
 </p:sld>
 </file>
 
@@ -10731,7 +10755,7 @@
           <a:p>
             <a:fld id="{F20BFDB3-A603-BF47-BB0C-9DB4A86B14A1}" type="datetime1">
               <a:rPr lang="en-US" smtClean="0"/>
-              <a:t>5/3/17</a:t>
+              <a:t>5/4/17</a:t>
             </a:fld>
             <a:endParaRPr lang="en-US" dirty="0"/>
           </a:p>
@@ -10793,6 +10817,13 @@
   <p:clrMapOvr>
     <a:masterClrMapping/>
   </p:clrMapOvr>
+  <p:timing>
+    <p:tnLst>
+      <p:par>
+        <p:cTn id="1" dur="indefinite" restart="never" nodeType="tmRoot"/>
+      </p:par>
+    </p:tnLst>
+  </p:timing>
 </p:sld>
 </file>
 
@@ -10907,7 +10938,7 @@
           <a:p>
             <a:fld id="{C74A8494-43BC-5246-A5F8-7C026E3A2506}" type="datetime1">
               <a:rPr lang="en-US" smtClean="0"/>
-              <a:t>5/3/17</a:t>
+              <a:t>5/4/17</a:t>
             </a:fld>
             <a:endParaRPr lang="en-US" dirty="0"/>
           </a:p>
@@ -10969,6 +11000,13 @@
   <p:clrMapOvr>
     <a:masterClrMapping/>
   </p:clrMapOvr>
+  <p:timing>
+    <p:tnLst>
+      <p:par>
+        <p:cTn id="1" dur="indefinite" restart="never" nodeType="tmRoot"/>
+      </p:par>
+    </p:tnLst>
+  </p:timing>
 </p:sld>
 </file>
 
@@ -11091,7 +11129,7 @@
           <a:p>
             <a:fld id="{565D631E-63D9-2946-A4FB-64ADF73B9F46}" type="datetime1">
               <a:rPr lang="en-US" smtClean="0"/>
-              <a:t>5/3/17</a:t>
+              <a:t>5/4/17</a:t>
             </a:fld>
             <a:endParaRPr lang="en-US" dirty="0"/>
           </a:p>
@@ -11153,6 +11191,13 @@
   <p:clrMapOvr>
     <a:masterClrMapping/>
   </p:clrMapOvr>
+  <p:timing>
+    <p:tnLst>
+      <p:par>
+        <p:cTn id="1" dur="indefinite" restart="never" nodeType="tmRoot"/>
+      </p:par>
+    </p:tnLst>
+  </p:timing>
 </p:sld>
 </file>
 
@@ -11273,7 +11318,7 @@
           <a:p>
             <a:fld id="{D6A24DE9-2A38-9F4F-9441-F5E45DF3B582}" type="datetime1">
               <a:rPr lang="en-US" smtClean="0"/>
-              <a:t>5/3/17</a:t>
+              <a:t>5/4/17</a:t>
             </a:fld>
             <a:endParaRPr lang="en-US" dirty="0"/>
           </a:p>
@@ -11335,6 +11380,13 @@
   <p:clrMapOvr>
     <a:masterClrMapping/>
   </p:clrMapOvr>
+  <p:timing>
+    <p:tnLst>
+      <p:par>
+        <p:cTn id="1" dur="indefinite" restart="never" nodeType="tmRoot"/>
+      </p:par>
+    </p:tnLst>
+  </p:timing>
 </p:sld>
 </file>
 
@@ -11448,7 +11500,7 @@
           <a:p>
             <a:fld id="{14C7FEA5-DE78-1148-84A0-7BFCB44B4D67}" type="datetime1">
               <a:rPr lang="en-US" smtClean="0"/>
-              <a:t>5/3/17</a:t>
+              <a:t>5/4/17</a:t>
             </a:fld>
             <a:endParaRPr lang="en-US"/>
           </a:p>
@@ -11510,6 +11562,13 @@
   <p:clrMapOvr>
     <a:masterClrMapping/>
   </p:clrMapOvr>
+  <p:timing>
+    <p:tnLst>
+      <p:par>
+        <p:cTn id="1" dur="indefinite" restart="never" nodeType="tmRoot"/>
+      </p:par>
+    </p:tnLst>
+  </p:timing>
 </p:sld>
 </file>
 
@@ -11775,7 +11834,7 @@
           <a:p>
             <a:fld id="{8885B798-E31F-EF48-B899-212976AF87DE}" type="datetime1">
               <a:rPr lang="en-US" smtClean="0"/>
-              <a:t>5/3/17</a:t>
+              <a:t>5/4/17</a:t>
             </a:fld>
             <a:endParaRPr lang="en-US" dirty="0"/>
           </a:p>
@@ -11962,7 +12021,7 @@
           <a:p>
             <a:fld id="{BFB05F3F-E948-DD41-9031-1B2AF49AD76C}" type="datetime1">
               <a:rPr lang="en-US" smtClean="0"/>
-              <a:t>5/3/17</a:t>
+              <a:t>5/4/17</a:t>
             </a:fld>
             <a:endParaRPr lang="en-US"/>
           </a:p>
@@ -12024,6 +12083,13 @@
   <p:clrMapOvr>
     <a:masterClrMapping/>
   </p:clrMapOvr>
+  <p:timing>
+    <p:tnLst>
+      <p:par>
+        <p:cTn id="1" dur="indefinite" restart="never" nodeType="tmRoot"/>
+      </p:par>
+    </p:tnLst>
+  </p:timing>
 </p:sld>
 </file>
 
@@ -12175,7 +12241,7 @@
           <a:p>
             <a:fld id="{771A8861-859A-A949-A7D3-0A76732EE9EB}" type="datetime1">
               <a:rPr lang="en-US" smtClean="0"/>
-              <a:t>5/3/17</a:t>
+              <a:t>5/4/17</a:t>
             </a:fld>
             <a:endParaRPr lang="en-US" dirty="0"/>
           </a:p>
@@ -12394,7 +12460,7 @@
           <a:p>
             <a:fld id="{D5EAB504-1A42-5949-AE07-2AC2FB9C6C54}" type="datetime1">
               <a:rPr lang="en-US" smtClean="0"/>
-              <a:t>5/3/17</a:t>
+              <a:t>5/4/17</a:t>
             </a:fld>
             <a:endParaRPr lang="en-US" dirty="0"/>
           </a:p>
@@ -12631,7 +12697,7 @@
           <a:p>
             <a:fld id="{79168923-96D4-8249-9655-376DD4AC8146}" type="datetime1">
               <a:rPr lang="en-US" smtClean="0"/>
-              <a:t>5/3/17</a:t>
+              <a:t>5/4/17</a:t>
             </a:fld>
             <a:endParaRPr lang="en-US"/>
           </a:p>
@@ -12867,12 +12933,16 @@
             <a:pPr lvl="1"/>
             <a:r>
               <a:rPr lang="en-US" dirty="0" smtClean="0"/>
-              <a:t>Much </a:t>
-            </a:r>
-            <a:r>
-              <a:rPr lang="en-US" dirty="0"/>
-              <a:t>larger – depends on system</a:t>
-            </a:r>
+              <a:t>10 TB</a:t>
+            </a:r>
+          </a:p>
+          <a:p>
+            <a:pPr lvl="2"/>
+            <a:r>
+              <a:rPr lang="en-US" dirty="0" smtClean="0"/>
+              <a:t>Can ask for more if needed</a:t>
+            </a:r>
+            <a:endParaRPr lang="en-US" dirty="0"/>
           </a:p>
           <a:p>
             <a:pPr lvl="1"/>
@@ -13130,7 +13200,7 @@
           <a:p>
             <a:fld id="{F92F4056-9118-9A49-8EA1-59B389654B04}" type="datetime1">
               <a:rPr lang="en-US" smtClean="0"/>
-              <a:t>5/3/17</a:t>
+              <a:t>5/4/17</a:t>
             </a:fld>
             <a:endParaRPr lang="en-US"/>
           </a:p>
@@ -13192,6 +13262,13 @@
   <p:clrMapOvr>
     <a:masterClrMapping/>
   </p:clrMapOvr>
+  <p:timing>
+    <p:tnLst>
+      <p:par>
+        <p:cTn id="1" dur="indefinite" restart="never" nodeType="tmRoot"/>
+      </p:par>
+    </p:tnLst>
+  </p:timing>
 </p:sld>
 </file>
 
@@ -13351,7 +13428,7 @@
           <a:p>
             <a:fld id="{6A2AF87B-5DE4-7242-B926-81C627D286DE}" type="datetime1">
               <a:rPr lang="en-US" smtClean="0"/>
-              <a:t>5/3/17</a:t>
+              <a:t>5/4/17</a:t>
             </a:fld>
             <a:endParaRPr lang="en-US"/>
           </a:p>
@@ -13413,6 +13490,13 @@
   <p:clrMapOvr>
     <a:masterClrMapping/>
   </p:clrMapOvr>
+  <p:timing>
+    <p:tnLst>
+      <p:par>
+        <p:cTn id="1" dur="indefinite" restart="never" nodeType="tmRoot"/>
+      </p:par>
+    </p:tnLst>
+  </p:timing>
 </p:sld>
 </file>
 
@@ -13575,7 +13659,7 @@
           <a:p>
             <a:fld id="{C409689E-59C4-3149-BC30-04475534628F}" type="datetime1">
               <a:rPr lang="en-US" smtClean="0"/>
-              <a:t>5/3/17</a:t>
+              <a:t>5/4/17</a:t>
             </a:fld>
             <a:endParaRPr lang="en-US"/>
           </a:p>
@@ -13637,6 +13721,13 @@
   <p:clrMapOvr>
     <a:masterClrMapping/>
   </p:clrMapOvr>
+  <p:timing>
+    <p:tnLst>
+      <p:par>
+        <p:cTn id="1" dur="indefinite" restart="never" nodeType="tmRoot"/>
+      </p:par>
+    </p:tnLst>
+  </p:timing>
 </p:sld>
 </file>
 
@@ -13778,7 +13869,7 @@
           <a:p>
             <a:fld id="{A4F0CB77-59E8-AA4B-8AF0-F960A2371B83}" type="datetime1">
               <a:rPr lang="en-US" smtClean="0"/>
-              <a:t>5/3/17</a:t>
+              <a:t>5/4/17</a:t>
             </a:fld>
             <a:endParaRPr lang="en-US"/>
           </a:p>
@@ -13840,6 +13931,13 @@
   <p:clrMapOvr>
     <a:masterClrMapping/>
   </p:clrMapOvr>
+  <p:timing>
+    <p:tnLst>
+      <p:par>
+        <p:cTn id="1" dur="indefinite" restart="never" nodeType="tmRoot"/>
+      </p:par>
+    </p:tnLst>
+  </p:timing>
 </p:sld>
 </file>
 
@@ -13924,21 +14022,7 @@
                 <a:ea typeface="Courier" charset="0"/>
                 <a:cs typeface="Courier" charset="0"/>
               </a:rPr>
-              <a:t>ml R/3.3.0</a:t>
-            </a:r>
-          </a:p>
-          <a:p>
-            <a:pPr lvl="1"/>
-            <a:r>
-              <a:rPr lang="en-US" dirty="0" smtClean="0"/>
-              <a:t>For other modules, you may be able to be more generic</a:t>
-            </a:r>
-          </a:p>
-          <a:p>
-            <a:pPr lvl="2"/>
-            <a:r>
-              <a:rPr lang="en-US" dirty="0" smtClean="0"/>
-              <a:t>For example, </a:t>
+              <a:t>module load </a:t>
             </a:r>
             <a:r>
               <a:rPr lang="en-US" b="1" dirty="0" smtClean="0">
@@ -13946,7 +14030,29 @@
                 <a:ea typeface="Courier" charset="0"/>
                 <a:cs typeface="Courier" charset="0"/>
               </a:rPr>
-              <a:t>ml </a:t>
+              <a:t>R/3.3.0</a:t>
+            </a:r>
+          </a:p>
+          <a:p>
+            <a:pPr lvl="1"/>
+            <a:r>
+              <a:rPr lang="en-US" dirty="0" smtClean="0"/>
+              <a:t>For other modules, you may be able to be more generic</a:t>
+            </a:r>
+          </a:p>
+          <a:p>
+            <a:pPr lvl="2"/>
+            <a:r>
+              <a:rPr lang="en-US" dirty="0" smtClean="0"/>
+              <a:t>For example, </a:t>
+            </a:r>
+            <a:r>
+              <a:rPr lang="en-US" b="1" dirty="0" smtClean="0">
+                <a:latin typeface="Courier" charset="0"/>
+                <a:ea typeface="Courier" charset="0"/>
+                <a:cs typeface="Courier" charset="0"/>
+              </a:rPr>
+              <a:t>module load </a:t>
             </a:r>
             <a:r>
               <a:rPr lang="en-US" b="1" dirty="0" err="1" smtClean="0">
@@ -13996,7 +14102,7 @@
                 <a:ea typeface="Courier" charset="0"/>
                 <a:cs typeface="Courier" charset="0"/>
               </a:rPr>
-              <a:t>ml </a:t>
+              <a:t>module load </a:t>
             </a:r>
             <a:r>
               <a:rPr lang="en-US" b="1" dirty="0">
@@ -14018,7 +14124,7 @@
                 <a:ea typeface="Courier" charset="0"/>
                 <a:cs typeface="Courier" charset="0"/>
               </a:rPr>
-              <a:t>ml </a:t>
+              <a:t>module load </a:t>
             </a:r>
             <a:r>
               <a:rPr lang="en-US" b="1" dirty="0">
@@ -14051,7 +14157,7 @@
           <a:p>
             <a:fld id="{2CB1BB01-A22C-0E44-AE14-9BA42F328388}" type="datetime1">
               <a:rPr lang="en-US" smtClean="0"/>
-              <a:t>5/3/17</a:t>
+              <a:t>5/4/17</a:t>
             </a:fld>
             <a:endParaRPr lang="en-US" dirty="0"/>
           </a:p>
@@ -14113,6 +14219,13 @@
   <p:clrMapOvr>
     <a:masterClrMapping/>
   </p:clrMapOvr>
+  <p:timing>
+    <p:tnLst>
+      <p:par>
+        <p:cTn id="1" dur="indefinite" restart="never" nodeType="tmRoot"/>
+      </p:par>
+    </p:tnLst>
+  </p:timing>
 </p:sld>
 </file>
 
@@ -14179,7 +14292,7 @@
           <a:p>
             <a:fld id="{EF2E92D6-81C2-2349-8DFB-1F1A7DD82F92}" type="datetime1">
               <a:rPr lang="en-US" smtClean="0"/>
-              <a:t>5/3/17</a:t>
+              <a:t>5/4/17</a:t>
             </a:fld>
             <a:endParaRPr lang="en-US"/>
           </a:p>
@@ -14241,6 +14354,13 @@
   <p:clrMapOvr>
     <a:masterClrMapping/>
   </p:clrMapOvr>
+  <p:timing>
+    <p:tnLst>
+      <p:par>
+        <p:cTn id="1" dur="indefinite" restart="never" nodeType="tmRoot"/>
+      </p:par>
+    </p:tnLst>
+  </p:timing>
 </p:sld>
 </file>
 
@@ -14375,7 +14495,7 @@
           <a:p>
             <a:fld id="{8C1A9D32-265E-194F-AF93-71B2043231E0}" type="datetime1">
               <a:rPr lang="en-US" smtClean="0"/>
-              <a:t>5/3/17</a:t>
+              <a:t>5/4/17</a:t>
             </a:fld>
             <a:endParaRPr lang="en-US"/>
           </a:p>
@@ -14601,7 +14721,7 @@
           <a:p>
             <a:fld id="{4ACF55D2-6E15-324D-A853-3288224DF348}" type="datetime1">
               <a:rPr lang="en-US" smtClean="0"/>
-              <a:t>5/3/17</a:t>
+              <a:t>5/4/17</a:t>
             </a:fld>
             <a:endParaRPr lang="en-US" dirty="0"/>
           </a:p>
@@ -14818,7 +14938,7 @@
           <a:p>
             <a:fld id="{2BF9B4AA-B499-8C4E-9B8E-811BDC42AB72}" type="datetime1">
               <a:rPr lang="en-US" smtClean="0"/>
-              <a:t>5/3/17</a:t>
+              <a:t>5/4/17</a:t>
             </a:fld>
             <a:endParaRPr lang="en-US"/>
           </a:p>
@@ -14880,6 +15000,13 @@
   <p:clrMapOvr>
     <a:masterClrMapping/>
   </p:clrMapOvr>
+  <p:timing>
+    <p:tnLst>
+      <p:par>
+        <p:cTn id="1" dur="indefinite" restart="never" nodeType="tmRoot"/>
+      </p:par>
+    </p:tnLst>
+  </p:timing>
 </p:sld>
 </file>
 
@@ -15036,7 +15163,7 @@
           <a:p>
             <a:fld id="{09667844-52C5-454C-91DA-DA641038CED4}" type="datetime1">
               <a:rPr lang="en-US" smtClean="0"/>
-              <a:t>5/3/17</a:t>
+              <a:t>5/4/17</a:t>
             </a:fld>
             <a:endParaRPr lang="en-US"/>
           </a:p>
@@ -15179,7 +15306,15 @@
           <a:p>
             <a:r>
               <a:rPr lang="en-US" dirty="0" smtClean="0"/>
-              <a:t>Do this using the -p partition flag</a:t>
+              <a:t>Do this using </a:t>
+            </a:r>
+            <a:r>
+              <a:rPr lang="en-US" dirty="0" smtClean="0"/>
+              <a:t>the </a:t>
+            </a:r>
+            <a:r>
+              <a:rPr lang="en-US" dirty="0" smtClean="0"/>
+              <a:t>partition flag</a:t>
             </a:r>
           </a:p>
           <a:p>
@@ -15208,7 +15343,7 @@
           <a:p>
             <a:fld id="{D07D67D9-0F25-3A44-BD87-1123755F3EE6}" type="datetime1">
               <a:rPr lang="en-US" smtClean="0"/>
-              <a:t>5/3/17</a:t>
+              <a:t>5/4/17</a:t>
             </a:fld>
             <a:endParaRPr lang="en-US"/>
           </a:p>
@@ -15425,7 +15560,7 @@
           <a:p>
             <a:fld id="{D20DA3BF-08CB-8A4B-9523-EAB60681977A}" type="datetime1">
               <a:rPr lang="en-US" smtClean="0"/>
-              <a:t>5/3/17</a:t>
+              <a:t>5/4/17</a:t>
             </a:fld>
             <a:endParaRPr lang="en-US"/>
           </a:p>
@@ -17360,7 +17495,7 @@
           <a:p>
             <a:fld id="{A3C9C1BB-C1E4-004E-B76B-8C60A87CB160}" type="datetime1">
               <a:rPr lang="en-US" smtClean="0"/>
-              <a:t>5/3/17</a:t>
+              <a:t>5/4/17</a:t>
             </a:fld>
             <a:endParaRPr lang="en-US"/>
           </a:p>
@@ -19540,7 +19675,7 @@
           <a:p>
             <a:fld id="{D7C17083-DB9E-DF40-9FF1-3C3BBD3126F3}" type="datetime1">
               <a:rPr lang="en-US" smtClean="0"/>
-              <a:t>5/3/17</a:t>
+              <a:t>5/4/17</a:t>
             </a:fld>
             <a:endParaRPr lang="en-US" dirty="0"/>
           </a:p>
@@ -19652,6 +19787,13 @@
       <p:transition spd="slow"/>
     </mc:Fallback>
   </mc:AlternateContent>
+  <p:timing>
+    <p:tnLst>
+      <p:par>
+        <p:cTn id="1" dur="indefinite" restart="never" nodeType="tmRoot"/>
+      </p:par>
+    </p:tnLst>
+  </p:timing>
 </p:sld>
 </file>
 
@@ -20069,7 +20211,7 @@
           <a:p>
             <a:fld id="{F1062F58-FDE1-BA4D-BB8C-2264A72B5428}" type="datetime1">
               <a:rPr lang="en-US" smtClean="0"/>
-              <a:t>5/3/17</a:t>
+              <a:t>5/4/17</a:t>
             </a:fld>
             <a:endParaRPr lang="en-US" dirty="0"/>
           </a:p>
@@ -20181,6 +20323,13 @@
       <p:transition spd="slow"/>
     </mc:Fallback>
   </mc:AlternateContent>
+  <p:timing>
+    <p:tnLst>
+      <p:par>
+        <p:cTn id="1" dur="indefinite" restart="never" nodeType="tmRoot"/>
+      </p:par>
+    </p:tnLst>
+  </p:timing>
 </p:sld>
 </file>
 
@@ -20288,7 +20437,7 @@
                 <a:ea typeface="Courier" charset="0"/>
                 <a:cs typeface="Courier" charset="0"/>
               </a:rPr>
-              <a:t>ml </a:t>
+              <a:t>module load </a:t>
             </a:r>
             <a:r>
               <a:rPr lang="en-US" dirty="0" err="1" smtClean="0">
@@ -20367,7 +20516,7 @@
           <a:p>
             <a:fld id="{57D010C4-F61A-344B-ACB4-6FFCD098ACFF}" type="datetime1">
               <a:rPr lang="en-US" smtClean="0"/>
-              <a:t>5/3/17</a:t>
+              <a:t>5/4/17</a:t>
             </a:fld>
             <a:endParaRPr lang="en-US"/>
           </a:p>
@@ -20429,6 +20578,13 @@
   <p:clrMapOvr>
     <a:masterClrMapping/>
   </p:clrMapOvr>
+  <p:timing>
+    <p:tnLst>
+      <p:par>
+        <p:cTn id="1" dur="indefinite" restart="never" nodeType="tmRoot"/>
+      </p:par>
+    </p:tnLst>
+  </p:timing>
 </p:sld>
 </file>
 
@@ -20519,7 +20675,15 @@
                 <a:ea typeface="Courier" charset="0"/>
                 <a:cs typeface="Courier" charset="0"/>
               </a:rPr>
-              <a:t> ml </a:t>
+              <a:t> </a:t>
+            </a:r>
+            <a:r>
+              <a:rPr lang="en-US" dirty="0" smtClean="0">
+                <a:latin typeface="Courier" charset="0"/>
+                <a:ea typeface="Courier" charset="0"/>
+                <a:cs typeface="Courier" charset="0"/>
+              </a:rPr>
+              <a:t>module load </a:t>
             </a:r>
             <a:r>
               <a:rPr lang="en-US" dirty="0" err="1" smtClean="0">
@@ -20588,7 +20752,7 @@
           <a:p>
             <a:fld id="{36D94695-4FE4-B74D-9FEF-603C469ABA33}" type="datetime1">
               <a:rPr lang="en-US" smtClean="0"/>
-              <a:t>5/3/17</a:t>
+              <a:t>5/4/17</a:t>
             </a:fld>
             <a:endParaRPr lang="en-US"/>
           </a:p>
@@ -20650,6 +20814,13 @@
   <p:clrMapOvr>
     <a:masterClrMapping/>
   </p:clrMapOvr>
+  <p:timing>
+    <p:tnLst>
+      <p:par>
+        <p:cTn id="1" dur="indefinite" restart="never" nodeType="tmRoot"/>
+      </p:par>
+    </p:tnLst>
+  </p:timing>
 </p:sld>
 </file>
 
@@ -20834,7 +21005,7 @@
           <a:p>
             <a:fld id="{A2DD7857-83C0-944C-808D-7EBD666BA1C5}" type="datetime1">
               <a:rPr lang="en-US" smtClean="0"/>
-              <a:t>5/3/17</a:t>
+              <a:t>5/4/17</a:t>
             </a:fld>
             <a:endParaRPr lang="en-US"/>
           </a:p>
@@ -20896,6 +21067,13 @@
   <p:clrMapOvr>
     <a:masterClrMapping/>
   </p:clrMapOvr>
+  <p:timing>
+    <p:tnLst>
+      <p:par>
+        <p:cTn id="1" dur="indefinite" restart="never" nodeType="tmRoot"/>
+      </p:par>
+    </p:tnLst>
+  </p:timing>
 </p:sld>
 </file>
 
@@ -20962,7 +21140,7 @@
           <a:p>
             <a:fld id="{D0F1EC55-3BF6-B94A-A8A8-ECF9B2E6E6A5}" type="datetime1">
               <a:rPr lang="en-US" smtClean="0"/>
-              <a:t>5/3/17</a:t>
+              <a:t>5/4/17</a:t>
             </a:fld>
             <a:endParaRPr lang="en-US" dirty="0"/>
           </a:p>
@@ -21178,7 +21356,7 @@
           <a:p>
             <a:fld id="{157FD4B1-436B-5B42-B797-4F45D1B6B6A9}" type="datetime1">
               <a:rPr lang="en-US" smtClean="0"/>
-              <a:t>5/3/17</a:t>
+              <a:t>5/4/17</a:t>
             </a:fld>
             <a:endParaRPr lang="en-US" dirty="0"/>
           </a:p>
@@ -21240,6 +21418,13 @@
   <p:clrMapOvr>
     <a:masterClrMapping/>
   </p:clrMapOvr>
+  <p:timing>
+    <p:tnLst>
+      <p:par>
+        <p:cTn id="1" dur="indefinite" restart="never" nodeType="tmRoot"/>
+      </p:par>
+    </p:tnLst>
+  </p:timing>
 </p:sld>
 </file>
 
@@ -21451,7 +21636,7 @@
           <a:p>
             <a:fld id="{50F15D87-D865-834D-8095-85B47E5D857D}" type="datetime1">
               <a:rPr lang="en-US" smtClean="0"/>
-              <a:t>5/3/17</a:t>
+              <a:t>5/4/17</a:t>
             </a:fld>
             <a:endParaRPr lang="en-US"/>
           </a:p>
@@ -22063,7 +22248,7 @@
           <a:p>
             <a:fld id="{9650BA27-C1AA-FC4E-A90D-29775570A7B1}" type="datetime1">
               <a:rPr lang="en-US" smtClean="0"/>
-              <a:t>5/3/17</a:t>
+              <a:t>5/4/17</a:t>
             </a:fld>
             <a:endParaRPr lang="en-US"/>
           </a:p>
@@ -22378,7 +22563,7 @@
           <a:p>
             <a:fld id="{F595C32F-4FDD-1845-9DAD-BF783B30F4EA}" type="datetime1">
               <a:rPr lang="en-US" smtClean="0"/>
-              <a:t>5/3/17</a:t>
+              <a:t>5/4/17</a:t>
             </a:fld>
             <a:endParaRPr lang="en-US"/>
           </a:p>
@@ -22714,7 +22899,7 @@
           <a:p>
             <a:fld id="{7A593D67-D80B-D341-95C2-D8FD019BB686}" type="datetime1">
               <a:rPr lang="en-US" smtClean="0"/>
-              <a:t>5/3/17</a:t>
+              <a:t>5/4/17</a:t>
             </a:fld>
             <a:endParaRPr lang="en-US" dirty="0"/>
           </a:p>
@@ -23040,7 +23225,7 @@
           <a:p>
             <a:fld id="{26A447B6-DA76-2941-9271-7615FCF773C3}" type="datetime1">
               <a:rPr lang="en-US" smtClean="0"/>
-              <a:t>5/3/17</a:t>
+              <a:t>5/4/17</a:t>
             </a:fld>
             <a:endParaRPr lang="en-US"/>
           </a:p>
@@ -23392,7 +23577,7 @@
           <a:p>
             <a:fld id="{38B2C89D-A2C7-BC4F-80C2-CF46C745D9C4}" type="datetime1">
               <a:rPr lang="en-US" smtClean="0"/>
-              <a:t>5/3/17</a:t>
+              <a:t>5/4/17</a:t>
             </a:fld>
             <a:endParaRPr lang="en-US"/>
           </a:p>
@@ -24088,7 +24273,7 @@
           <a:p>
             <a:fld id="{EBDED0D2-C1DA-5148-BCD1-FD0E375E4368}" type="datetime1">
               <a:rPr lang="en-US" smtClean="0"/>
-              <a:t>5/3/17</a:t>
+              <a:t>5/4/17</a:t>
             </a:fld>
             <a:endParaRPr lang="en-US"/>
           </a:p>
@@ -24272,7 +24457,7 @@
           <a:p>
             <a:fld id="{58476822-42A8-164F-A773-7C6D2A6A81DB}" type="datetime1">
               <a:rPr lang="en-US" smtClean="0"/>
-              <a:t>5/3/17</a:t>
+              <a:t>5/4/17</a:t>
             </a:fld>
             <a:endParaRPr lang="en-US" dirty="0"/>
           </a:p>
@@ -24525,7 +24710,7 @@
           <a:p>
             <a:fld id="{743333A5-8F5B-BA46-B1A8-D091CAAF002B}" type="datetime1">
               <a:rPr lang="en-US" smtClean="0"/>
-              <a:t>5/3/17</a:t>
+              <a:t>5/4/17</a:t>
             </a:fld>
             <a:endParaRPr lang="en-US"/>
           </a:p>
@@ -25196,7 +25381,7 @@
           <a:p>
             <a:fld id="{AE89C334-26D2-F346-A763-FB59B0897930}" type="datetime1">
               <a:rPr lang="en-US" smtClean="0"/>
-              <a:t>5/3/17</a:t>
+              <a:t>5/4/17</a:t>
             </a:fld>
             <a:endParaRPr lang="en-US"/>
           </a:p>
@@ -25412,7 +25597,7 @@
           <a:p>
             <a:fld id="{406683BE-7CE6-C246-A895-91EACBC36081}" type="datetime1">
               <a:rPr lang="en-US" smtClean="0"/>
-              <a:t>5/3/17</a:t>
+              <a:t>5/4/17</a:t>
             </a:fld>
             <a:endParaRPr lang="en-US" dirty="0"/>
           </a:p>
@@ -25862,7 +26047,7 @@
           <a:p>
             <a:fld id="{0E391325-9FAD-3B48-ABBB-A2878079FE51}" type="datetime1">
               <a:rPr lang="en-US" smtClean="0"/>
-              <a:t>5/3/17</a:t>
+              <a:t>5/4/17</a:t>
             </a:fld>
             <a:endParaRPr lang="en-US"/>
           </a:p>
@@ -26376,7 +26561,7 @@
           <a:p>
             <a:fld id="{C4F2F9E0-2BB7-644A-A8C2-4F89A10BA621}" type="datetime1">
               <a:rPr lang="en-US" smtClean="0"/>
-              <a:t>5/3/17</a:t>
+              <a:t>5/4/17</a:t>
             </a:fld>
             <a:endParaRPr lang="en-US"/>
           </a:p>
@@ -26633,7 +26818,7 @@
           <a:p>
             <a:fld id="{9890B64F-BD66-014F-8385-76577B03EE8A}" type="datetime1">
               <a:rPr lang="en-US" smtClean="0"/>
-              <a:t>5/3/17</a:t>
+              <a:t>5/4/17</a:t>
             </a:fld>
             <a:endParaRPr lang="en-US"/>
           </a:p>
@@ -26816,7 +27001,7 @@
           <a:p>
             <a:fld id="{24EAC218-805B-5942-9D1C-1CAF707EFBDF}" type="datetime1">
               <a:rPr lang="en-US" smtClean="0"/>
-              <a:t>5/3/17</a:t>
+              <a:t>5/4/17</a:t>
             </a:fld>
             <a:endParaRPr lang="en-US" dirty="0"/>
           </a:p>
@@ -26940,44 +27125,178 @@
         </p:nvSpPr>
         <p:spPr/>
         <p:txBody>
-          <a:bodyPr/>
-          <a:lstStyle/>
-          <a:p>
-            <a:r>
-              <a:rPr lang="en-US" dirty="0" smtClean="0"/>
-              <a:t>NEVER EVER EVER EVER EVER EVER</a:t>
-            </a:r>
-          </a:p>
-          <a:p>
-            <a:r>
-              <a:rPr lang="en-US" dirty="0" smtClean="0"/>
-              <a:t>EVER EVER EVER EVER EVER EVER EVER EVER</a:t>
-            </a:r>
-          </a:p>
-          <a:p>
-            <a:r>
-              <a:rPr lang="en-US" dirty="0" smtClean="0"/>
-              <a:t>Run </a:t>
-            </a:r>
-            <a:r>
-              <a:rPr lang="en-US" dirty="0" err="1"/>
-              <a:t>M</a:t>
-            </a:r>
-            <a:r>
-              <a:rPr lang="en-US" dirty="0" err="1" smtClean="0"/>
-              <a:t>atlab</a:t>
-            </a:r>
-            <a:r>
-              <a:rPr lang="en-US" dirty="0" smtClean="0"/>
-              <a:t> from the command line without running an interactive job first</a:t>
-            </a:r>
-          </a:p>
-          <a:p>
-            <a:r>
-              <a:rPr lang="en-US" dirty="0" smtClean="0"/>
-              <a:t>BAD USER! </a:t>
-            </a:r>
-            <a:endParaRPr lang="en-US" dirty="0"/>
+          <a:bodyPr>
+            <a:normAutofit lnSpcReduction="10000"/>
+          </a:bodyPr>
+          <a:lstStyle/>
+          <a:p>
+            <a:r>
+              <a:rPr lang="en-US" dirty="0" smtClean="0"/>
+              <a:t>To do this, we are going to log out and log back in</a:t>
+            </a:r>
+          </a:p>
+          <a:p>
+            <a:pPr lvl="1"/>
+            <a:r>
+              <a:rPr lang="en-US" dirty="0" smtClean="0"/>
+              <a:t>Only necessary for demo</a:t>
+            </a:r>
+          </a:p>
+          <a:p>
+            <a:pPr lvl="1"/>
+            <a:r>
+              <a:rPr lang="en-US" dirty="0" smtClean="0"/>
+              <a:t>Need to add something to the sign in process</a:t>
+            </a:r>
+          </a:p>
+          <a:p>
+            <a:pPr marL="411480" lvl="1" indent="0">
+              <a:buNone/>
+            </a:pPr>
+            <a:endParaRPr lang="en-US" dirty="0" smtClean="0">
+              <a:latin typeface="Courier" charset="0"/>
+              <a:ea typeface="Courier" charset="0"/>
+              <a:cs typeface="Courier" charset="0"/>
+            </a:endParaRPr>
+          </a:p>
+          <a:p>
+            <a:r>
+              <a:rPr lang="en-US" dirty="0" smtClean="0">
+                <a:latin typeface="Helvetica Neue" charset="0"/>
+                <a:ea typeface="Helvetica Neue" charset="0"/>
+                <a:cs typeface="Helvetica Neue" charset="0"/>
+              </a:rPr>
+              <a:t>For Mac Users:</a:t>
+            </a:r>
+            <a:endParaRPr lang="en-US" dirty="0">
+              <a:latin typeface="Helvetica Neue" charset="0"/>
+              <a:ea typeface="Helvetica Neue" charset="0"/>
+              <a:cs typeface="Helvetica Neue" charset="0"/>
+            </a:endParaRPr>
+          </a:p>
+          <a:p>
+            <a:pPr marL="12700" lvl="1" indent="0">
+              <a:buNone/>
+            </a:pPr>
+            <a:r>
+              <a:rPr lang="en-US" dirty="0" smtClean="0">
+                <a:latin typeface="Courier" charset="0"/>
+                <a:ea typeface="Courier" charset="0"/>
+                <a:cs typeface="Courier" charset="0"/>
+              </a:rPr>
+              <a:t>	</a:t>
+            </a:r>
+            <a:r>
+              <a:rPr lang="en-US" dirty="0" err="1" smtClean="0">
+                <a:latin typeface="Courier" charset="0"/>
+                <a:ea typeface="Courier" charset="0"/>
+                <a:cs typeface="Courier" charset="0"/>
+              </a:rPr>
+              <a:t>ssh</a:t>
+            </a:r>
+            <a:r>
+              <a:rPr lang="en-US" dirty="0" smtClean="0">
+                <a:latin typeface="Courier" charset="0"/>
+                <a:ea typeface="Courier" charset="0"/>
+                <a:cs typeface="Courier" charset="0"/>
+              </a:rPr>
+              <a:t> -X </a:t>
+            </a:r>
+            <a:r>
+              <a:rPr lang="en-US" dirty="0" smtClean="0">
+                <a:latin typeface="Courier" charset="0"/>
+                <a:ea typeface="Courier" charset="0"/>
+                <a:cs typeface="Courier" charset="0"/>
+                <a:hlinkClick r:id="rId2"/>
+              </a:rPr>
+              <a:t>username@login.rc.colorado.edu</a:t>
+            </a:r>
+            <a:endParaRPr lang="en-US" dirty="0" smtClean="0">
+              <a:latin typeface="Courier" charset="0"/>
+              <a:ea typeface="Courier" charset="0"/>
+              <a:cs typeface="Courier" charset="0"/>
+            </a:endParaRPr>
+          </a:p>
+          <a:p>
+            <a:pPr marL="12700" lvl="1" indent="0">
+              <a:buNone/>
+            </a:pPr>
+            <a:endParaRPr lang="en-US" dirty="0">
+              <a:latin typeface="Courier" charset="0"/>
+              <a:ea typeface="Courier" charset="0"/>
+              <a:cs typeface="Courier" charset="0"/>
+            </a:endParaRPr>
+          </a:p>
+          <a:p>
+            <a:pPr marL="355600" lvl="1" indent="-238125">
+              <a:buClr>
+                <a:schemeClr val="accent1"/>
+              </a:buClr>
+            </a:pPr>
+            <a:r>
+              <a:rPr lang="en-US" sz="2400" dirty="0" smtClean="0">
+                <a:latin typeface="Helvetica Neue" charset="0"/>
+                <a:ea typeface="Helvetica Neue" charset="0"/>
+                <a:cs typeface="Helvetica Neue" charset="0"/>
+              </a:rPr>
+              <a:t>For Windows Users, must set up X-forwarding through your SSH client program</a:t>
+            </a:r>
+          </a:p>
+          <a:p>
+            <a:pPr marL="12700" lvl="1" indent="0">
+              <a:buNone/>
+            </a:pPr>
+            <a:endParaRPr lang="en-US" dirty="0">
+              <a:latin typeface="Courier" charset="0"/>
+              <a:ea typeface="Courier" charset="0"/>
+              <a:cs typeface="Courier" charset="0"/>
+            </a:endParaRPr>
+          </a:p>
+          <a:p>
+            <a:pPr marL="339725" indent="-222250"/>
+            <a:r>
+              <a:rPr lang="en-US" dirty="0" smtClean="0">
+                <a:latin typeface="Helvetica Neue" charset="0"/>
+                <a:ea typeface="Helvetica Neue" charset="0"/>
+                <a:cs typeface="Helvetica Neue" charset="0"/>
+              </a:rPr>
+              <a:t>Also must have an X-server package on your laptop</a:t>
+            </a:r>
+          </a:p>
+          <a:p>
+            <a:pPr lvl="1"/>
+            <a:r>
+              <a:rPr lang="en-US" dirty="0" err="1" smtClean="0">
+                <a:latin typeface="Helvetica Neue" charset="0"/>
+                <a:ea typeface="Helvetica Neue" charset="0"/>
+                <a:cs typeface="Helvetica Neue" charset="0"/>
+              </a:rPr>
+              <a:t>Xming</a:t>
+            </a:r>
+            <a:r>
+              <a:rPr lang="en-US" dirty="0" smtClean="0">
+                <a:latin typeface="Helvetica Neue" charset="0"/>
+                <a:ea typeface="Helvetica Neue" charset="0"/>
+                <a:cs typeface="Helvetica Neue" charset="0"/>
+              </a:rPr>
+              <a:t> for Windows or </a:t>
+            </a:r>
+            <a:r>
+              <a:rPr lang="en-US" dirty="0" err="1" smtClean="0">
+                <a:latin typeface="Helvetica Neue" charset="0"/>
+                <a:ea typeface="Helvetica Neue" charset="0"/>
+                <a:cs typeface="Helvetica Neue" charset="0"/>
+              </a:rPr>
+              <a:t>XQuartz</a:t>
+            </a:r>
+            <a:r>
+              <a:rPr lang="en-US" dirty="0" smtClean="0">
+                <a:latin typeface="Helvetica Neue" charset="0"/>
+                <a:ea typeface="Helvetica Neue" charset="0"/>
+                <a:cs typeface="Helvetica Neue" charset="0"/>
+              </a:rPr>
+              <a:t> for Mac</a:t>
+            </a:r>
           </a:p>
         </p:txBody>
       </p:sp>
@@ -26996,9 +27315,9 @@
           <a:bodyPr/>
           <a:lstStyle/>
           <a:p>
-            <a:fld id="{AB9B9C8A-8339-1843-AA8F-761CADDDACEE}" type="datetime1">
-              <a:rPr lang="en-US" smtClean="0"/>
-              <a:t>5/3/17</a:t>
+            <a:fld id="{E12727D1-4C82-404C-B300-E3C9ED3E7415}" type="datetime1">
+              <a:rPr lang="en-US" smtClean="0"/>
+              <a:t>5/4/17</a:t>
             </a:fld>
             <a:endParaRPr lang="en-US" dirty="0"/>
           </a:p>
@@ -27053,7 +27372,7 @@
     </p:spTree>
     <p:extLst>
       <p:ext uri="{BB962C8B-B14F-4D97-AF65-F5344CB8AC3E}">
-        <p14:creationId xmlns:p14="http://schemas.microsoft.com/office/powerpoint/2010/main" val="455056351"/>
+        <p14:creationId xmlns:p14="http://schemas.microsoft.com/office/powerpoint/2010/main" val="942824290"/>
       </p:ext>
     </p:extLst>
   </p:cSld>
@@ -27123,34 +27442,122 @@
         <p:spPr/>
         <p:txBody>
           <a:bodyPr>
-            <a:normAutofit lnSpcReduction="10000"/>
+            <a:normAutofit/>
           </a:bodyPr>
           <a:lstStyle/>
           <a:p>
             <a:r>
               <a:rPr lang="en-US" dirty="0" smtClean="0"/>
-              <a:t>To do this, we are going to log out and log back in</a:t>
-            </a:r>
-          </a:p>
-          <a:p>
-            <a:pPr lvl="1"/>
-            <a:r>
-              <a:rPr lang="en-US" dirty="0" smtClean="0"/>
-              <a:t>Only necessary for demo</a:t>
-            </a:r>
-          </a:p>
-          <a:p>
-            <a:pPr lvl="1"/>
-            <a:r>
-              <a:rPr lang="en-US" dirty="0" smtClean="0"/>
-              <a:t>Need to add something to the sign in process</a:t>
-            </a:r>
-          </a:p>
-          <a:p>
-            <a:pPr marL="411480" lvl="1" indent="0">
+              <a:t>To work with </a:t>
+            </a:r>
+            <a:r>
+              <a:rPr lang="en-US" dirty="0" err="1" smtClean="0"/>
+              <a:t>Matlab</a:t>
+            </a:r>
+            <a:r>
+              <a:rPr lang="en-US" dirty="0" smtClean="0"/>
+              <a:t> interactively, we’re going to request some time from the supercomputer</a:t>
+            </a:r>
+          </a:p>
+          <a:p>
+            <a:r>
+              <a:rPr lang="en-US" dirty="0" smtClean="0"/>
+              <a:t>When the resources become available then we will start up </a:t>
+            </a:r>
+            <a:r>
+              <a:rPr lang="en-US" dirty="0" err="1" smtClean="0"/>
+              <a:t>Matlab</a:t>
+            </a:r>
+            <a:endParaRPr lang="en-US" dirty="0" smtClean="0"/>
+          </a:p>
+          <a:p>
+            <a:r>
+              <a:rPr lang="en-US" dirty="0" smtClean="0"/>
+              <a:t>Commands to run:</a:t>
+            </a:r>
+          </a:p>
+          <a:p>
+            <a:pPr marL="114300" indent="0">
               <a:buNone/>
             </a:pPr>
-            <a:endParaRPr lang="en-US" dirty="0" smtClean="0">
+            <a:r>
+              <a:rPr lang="en-US" dirty="0" smtClean="0">
+                <a:latin typeface="Courier" charset="0"/>
+                <a:ea typeface="Courier" charset="0"/>
+                <a:cs typeface="Courier" charset="0"/>
+              </a:rPr>
+              <a:t>	module load </a:t>
+            </a:r>
+            <a:r>
+              <a:rPr lang="en-US" dirty="0" err="1" smtClean="0">
+                <a:latin typeface="Courier" charset="0"/>
+                <a:ea typeface="Courier" charset="0"/>
+                <a:cs typeface="Courier" charset="0"/>
+              </a:rPr>
+              <a:t>slurm</a:t>
+            </a:r>
+            <a:r>
+              <a:rPr lang="en-US" dirty="0" smtClean="0">
+                <a:latin typeface="Courier" charset="0"/>
+                <a:ea typeface="Courier" charset="0"/>
+                <a:cs typeface="Courier" charset="0"/>
+              </a:rPr>
+              <a:t>/summit</a:t>
+            </a:r>
+          </a:p>
+          <a:p>
+            <a:pPr marL="114300" indent="0">
+              <a:buNone/>
+            </a:pPr>
+            <a:r>
+              <a:rPr lang="en-US" sz="2200" dirty="0">
+                <a:latin typeface="Courier" charset="0"/>
+                <a:ea typeface="Courier" charset="0"/>
+                <a:cs typeface="Courier" charset="0"/>
+              </a:rPr>
+              <a:t>	</a:t>
+            </a:r>
+            <a:r>
+              <a:rPr lang="en-US" sz="2200" dirty="0" err="1" smtClean="0">
+                <a:latin typeface="Courier" charset="0"/>
+                <a:ea typeface="Courier" charset="0"/>
+                <a:cs typeface="Courier" charset="0"/>
+              </a:rPr>
+              <a:t>sinteractive</a:t>
+            </a:r>
+            <a:r>
+              <a:rPr lang="en-US" sz="2200" dirty="0" smtClean="0">
+                <a:latin typeface="Courier" charset="0"/>
+                <a:ea typeface="Courier" charset="0"/>
+                <a:cs typeface="Courier" charset="0"/>
+              </a:rPr>
+              <a:t> </a:t>
+            </a:r>
+            <a:r>
+              <a:rPr lang="en-US" sz="2200" dirty="0">
+                <a:latin typeface="Courier" charset="0"/>
+                <a:ea typeface="Courier" charset="0"/>
+                <a:cs typeface="Courier" charset="0"/>
+              </a:rPr>
+              <a:t>–-</a:t>
+            </a:r>
+            <a:r>
+              <a:rPr lang="en-US" sz="2200" dirty="0" smtClean="0">
+                <a:latin typeface="Courier" charset="0"/>
+                <a:ea typeface="Courier" charset="0"/>
+                <a:cs typeface="Courier" charset="0"/>
+              </a:rPr>
+              <a:t>reservation=</a:t>
+            </a:r>
+            <a:r>
+              <a:rPr lang="en-US" sz="2200" dirty="0" err="1" smtClean="0">
+                <a:latin typeface="Courier" charset="0"/>
+                <a:ea typeface="Courier" charset="0"/>
+                <a:cs typeface="Courier" charset="0"/>
+              </a:rPr>
+              <a:t>new_user</a:t>
+            </a:r>
+            <a:endParaRPr lang="en-US" sz="2200" dirty="0">
               <a:latin typeface="Courier" charset="0"/>
               <a:ea typeface="Courier" charset="0"/>
               <a:cs typeface="Courier" charset="0"/>
@@ -27158,142 +27565,82 @@
           </a:p>
           <a:p>
             <a:r>
-              <a:rPr lang="en-US" dirty="0" smtClean="0">
-                <a:latin typeface="Helvetica Neue" charset="0"/>
-                <a:ea typeface="Helvetica Neue" charset="0"/>
-                <a:cs typeface="Helvetica Neue" charset="0"/>
-              </a:rPr>
-              <a:t>For Mac Users:</a:t>
-            </a:r>
-            <a:endParaRPr lang="en-US" dirty="0">
-              <a:latin typeface="Helvetica Neue" charset="0"/>
-              <a:ea typeface="Helvetica Neue" charset="0"/>
-              <a:cs typeface="Helvetica Neue" charset="0"/>
-            </a:endParaRPr>
-          </a:p>
-          <a:p>
-            <a:pPr marL="12700" lvl="1" indent="0">
+              <a:rPr lang="en-US" dirty="0" smtClean="0"/>
+              <a:t>Once we receive a prompt, then:</a:t>
+            </a:r>
+          </a:p>
+          <a:p>
+            <a:pPr marL="114300" indent="0">
               <a:buNone/>
             </a:pPr>
             <a:r>
-              <a:rPr lang="en-US" dirty="0" smtClean="0">
+              <a:rPr lang="en-US" sz="2200" dirty="0">
+                <a:latin typeface="Courier New" charset="0"/>
+                <a:ea typeface="Courier New" charset="0"/>
+                <a:cs typeface="Courier New" charset="0"/>
+              </a:rPr>
+              <a:t>	</a:t>
+            </a:r>
+            <a:r>
+              <a:rPr lang="en-US" sz="2200" dirty="0" smtClean="0">
                 <a:latin typeface="Courier" charset="0"/>
                 <a:ea typeface="Courier" charset="0"/>
                 <a:cs typeface="Courier" charset="0"/>
               </a:rPr>
-              <a:t>	</a:t>
-            </a:r>
-            <a:r>
-              <a:rPr lang="en-US" dirty="0" err="1" smtClean="0">
+              <a:t>module load </a:t>
+            </a:r>
+            <a:r>
+              <a:rPr lang="en-US" sz="2200" dirty="0" err="1">
                 <a:latin typeface="Courier" charset="0"/>
                 <a:ea typeface="Courier" charset="0"/>
                 <a:cs typeface="Courier" charset="0"/>
               </a:rPr>
-              <a:t>ssh</a:t>
-            </a:r>
-            <a:r>
-              <a:rPr lang="en-US" dirty="0" smtClean="0">
-                <a:latin typeface="Courier" charset="0"/>
-                <a:ea typeface="Courier" charset="0"/>
-                <a:cs typeface="Courier" charset="0"/>
-              </a:rPr>
-              <a:t> -X </a:t>
-            </a:r>
-            <a:r>
-              <a:rPr lang="en-US" dirty="0" smtClean="0">
-                <a:latin typeface="Courier" charset="0"/>
-                <a:ea typeface="Courier" charset="0"/>
-                <a:cs typeface="Courier" charset="0"/>
-                <a:hlinkClick r:id="rId2"/>
-              </a:rPr>
-              <a:t>username@login.rc.colorado.edu</a:t>
-            </a:r>
-            <a:endParaRPr lang="en-US" dirty="0" smtClean="0">
+              <a:t>matlab</a:t>
+            </a:r>
+            <a:endParaRPr lang="en-US" sz="2200" dirty="0">
               <a:latin typeface="Courier" charset="0"/>
               <a:ea typeface="Courier" charset="0"/>
               <a:cs typeface="Courier" charset="0"/>
             </a:endParaRPr>
           </a:p>
           <a:p>
-            <a:pPr marL="12700" lvl="1" indent="0">
+            <a:pPr marL="114300" indent="0">
               <a:buNone/>
             </a:pPr>
-            <a:endParaRPr lang="en-US" dirty="0">
+            <a:r>
+              <a:rPr lang="en-US" sz="2200" dirty="0">
+                <a:latin typeface="Courier" charset="0"/>
+                <a:ea typeface="Courier" charset="0"/>
+                <a:cs typeface="Courier" charset="0"/>
+              </a:rPr>
+              <a:t>	</a:t>
+            </a:r>
+            <a:r>
+              <a:rPr lang="en-US" sz="2200" dirty="0" err="1">
+                <a:latin typeface="Courier" charset="0"/>
+                <a:ea typeface="Courier" charset="0"/>
+                <a:cs typeface="Courier" charset="0"/>
+              </a:rPr>
+              <a:t>matlab</a:t>
+            </a:r>
+            <a:endParaRPr lang="en-US" sz="2200" dirty="0">
               <a:latin typeface="Courier" charset="0"/>
               <a:ea typeface="Courier" charset="0"/>
               <a:cs typeface="Courier" charset="0"/>
             </a:endParaRPr>
           </a:p>
           <a:p>
-            <a:pPr marL="355600" lvl="1" indent="-238125">
-              <a:buClr>
-                <a:schemeClr val="accent1"/>
-              </a:buClr>
-            </a:pPr>
-            <a:r>
-              <a:rPr lang="en-US" sz="2400" dirty="0" smtClean="0">
+            <a:r>
+              <a:rPr lang="en-US" sz="2200" dirty="0">
                 <a:latin typeface="Helvetica Neue" charset="0"/>
                 <a:ea typeface="Helvetica Neue" charset="0"/>
                 <a:cs typeface="Helvetica Neue" charset="0"/>
               </a:rPr>
-              <a:t>For Windows Users, must set up X-forwarding through your SSH client program</a:t>
-            </a:r>
-          </a:p>
-          <a:p>
-            <a:pPr marL="12700" lvl="1" indent="0">
-              <a:buNone/>
-            </a:pPr>
-            <a:endParaRPr lang="en-US" dirty="0">
-              <a:latin typeface="Courier" charset="0"/>
-              <a:ea typeface="Courier" charset="0"/>
-              <a:cs typeface="Courier" charset="0"/>
-            </a:endParaRPr>
-          </a:p>
-          <a:p>
-            <a:pPr marL="339725" indent="-222250"/>
-            <a:r>
-              <a:rPr lang="en-US" dirty="0" smtClean="0">
-                <a:latin typeface="Helvetica Neue" charset="0"/>
-                <a:ea typeface="Helvetica Neue" charset="0"/>
-                <a:cs typeface="Helvetica Neue" charset="0"/>
-              </a:rPr>
-              <a:t>Also must have an X-server package on your laptop</a:t>
-            </a:r>
-          </a:p>
-          <a:p>
-            <a:pPr lvl="1"/>
-            <a:r>
-              <a:rPr lang="en-US" dirty="0" err="1" smtClean="0">
-                <a:latin typeface="Helvetica Neue" charset="0"/>
-                <a:ea typeface="Helvetica Neue" charset="0"/>
-                <a:cs typeface="Helvetica Neue" charset="0"/>
-              </a:rPr>
-              <a:t>Xming</a:t>
-            </a:r>
-            <a:r>
-              <a:rPr lang="en-US" dirty="0" smtClean="0">
-                <a:latin typeface="Helvetica Neue" charset="0"/>
-                <a:ea typeface="Helvetica Neue" charset="0"/>
-                <a:cs typeface="Helvetica Neue" charset="0"/>
-              </a:rPr>
-              <a:t> for Windows or </a:t>
-            </a:r>
-            <a:r>
-              <a:rPr lang="en-US" dirty="0" err="1" smtClean="0">
-                <a:latin typeface="Helvetica Neue" charset="0"/>
-                <a:ea typeface="Helvetica Neue" charset="0"/>
-                <a:cs typeface="Helvetica Neue" charset="0"/>
-              </a:rPr>
-              <a:t>XQuartz</a:t>
-            </a:r>
-            <a:r>
-              <a:rPr lang="en-US" dirty="0" smtClean="0">
-                <a:latin typeface="Helvetica Neue" charset="0"/>
-                <a:ea typeface="Helvetica Neue" charset="0"/>
-                <a:cs typeface="Helvetica Neue" charset="0"/>
-              </a:rPr>
-              <a:t> for Mac</a:t>
-            </a:r>
+              <a:t>Once we finish we must exit!</a:t>
+            </a:r>
+          </a:p>
+          <a:p>
+            <a:endParaRPr lang="en-US" dirty="0" smtClean="0"/>
           </a:p>
         </p:txBody>
       </p:sp>
@@ -27312,9 +27659,9 @@
           <a:bodyPr/>
           <a:lstStyle/>
           <a:p>
-            <a:fld id="{E12727D1-4C82-404C-B300-E3C9ED3E7415}" type="datetime1">
-              <a:rPr lang="en-US" smtClean="0"/>
-              <a:t>5/3/17</a:t>
+            <a:fld id="{F21DF42F-4BC7-1E4D-B4C7-33A7E30F56D4}" type="datetime1">
+              <a:rPr lang="en-US" smtClean="0"/>
+              <a:t>5/4/17</a:t>
             </a:fld>
             <a:endParaRPr lang="en-US" dirty="0"/>
           </a:p>
@@ -27369,7 +27716,7 @@
     </p:spTree>
     <p:extLst>
       <p:ext uri="{BB962C8B-B14F-4D97-AF65-F5344CB8AC3E}">
-        <p14:creationId xmlns:p14="http://schemas.microsoft.com/office/powerpoint/2010/main" val="942824290"/>
+        <p14:creationId xmlns:p14="http://schemas.microsoft.com/office/powerpoint/2010/main" val="1913494464"/>
       </p:ext>
     </p:extLst>
   </p:cSld>
@@ -27420,7 +27767,7 @@
           <a:p>
             <a:r>
               <a:rPr lang="en-US" dirty="0" smtClean="0"/>
-              <a:t>Interactive job</a:t>
+              <a:t>Questions?</a:t>
             </a:r>
             <a:endParaRPr lang="en-US" dirty="0"/>
           </a:p>
@@ -27445,32 +27792,34 @@
           <a:p>
             <a:r>
               <a:rPr lang="en-US" dirty="0" smtClean="0"/>
-              <a:t>To work with </a:t>
+              <a:t>Email </a:t>
+            </a:r>
+            <a:r>
+              <a:rPr lang="en-US" dirty="0" smtClean="0">
+                <a:hlinkClick r:id="rId2"/>
+              </a:rPr>
+              <a:t>rc-help@colorado.edu</a:t>
+            </a:r>
+            <a:endParaRPr lang="en-US" dirty="0" smtClean="0"/>
+          </a:p>
+          <a:p>
+            <a:r>
+              <a:rPr lang="en-US" dirty="0" smtClean="0"/>
+              <a:t>Twitter:  @</a:t>
             </a:r>
             <a:r>
               <a:rPr lang="en-US" dirty="0" err="1" smtClean="0"/>
-              <a:t>Matlab</a:t>
-            </a:r>
-            <a:r>
-              <a:rPr lang="en-US" dirty="0" smtClean="0"/>
-              <a:t> interactively, we’re going to request some time from the supercomputer</a:t>
-            </a:r>
-          </a:p>
-          <a:p>
-            <a:r>
-              <a:rPr lang="en-US" dirty="0" smtClean="0"/>
-              <a:t>When the resources become available then we will start up </a:t>
-            </a:r>
-            <a:r>
-              <a:rPr lang="en-US" dirty="0" err="1" smtClean="0"/>
-              <a:t>Matlab</a:t>
+              <a:t>CUBoulderRC</a:t>
             </a:r>
             <a:endParaRPr lang="en-US" dirty="0" smtClean="0"/>
           </a:p>
           <a:p>
-            <a:r>
-              <a:rPr lang="en-US" dirty="0" smtClean="0"/>
-              <a:t>Commands to run:</a:t>
+            <a:endParaRPr lang="en-US" dirty="0"/>
+          </a:p>
+          <a:p>
+            <a:r>
+              <a:rPr lang="en-US" dirty="0"/>
+              <a:t>Link to survey on this topic:  </a:t>
             </a:r>
           </a:p>
           <a:p>
@@ -27479,165 +27828,49 @@
             </a:pPr>
             <a:r>
               <a:rPr lang="en-US" dirty="0" smtClean="0">
-                <a:latin typeface="Courier" charset="0"/>
-                <a:ea typeface="Courier" charset="0"/>
-                <a:cs typeface="Courier" charset="0"/>
-              </a:rPr>
-              <a:t>	module load </a:t>
-            </a:r>
-            <a:r>
-              <a:rPr lang="en-US" dirty="0" err="1" smtClean="0">
-                <a:latin typeface="Courier" charset="0"/>
-                <a:ea typeface="Courier" charset="0"/>
-                <a:cs typeface="Courier" charset="0"/>
-              </a:rPr>
-              <a:t>slurm</a:t>
+                <a:hlinkClick r:id="rId3"/>
+              </a:rPr>
+              <a:t>http</a:t>
+            </a:r>
+            <a:r>
+              <a:rPr lang="en-US" dirty="0">
+                <a:hlinkClick r:id="rId3"/>
+              </a:rPr>
+              <a:t>://tinyurl.com/curc-survey16</a:t>
+            </a:r>
+            <a:r>
+              <a:rPr lang="en-US" dirty="0"/>
+              <a:t>  </a:t>
+            </a:r>
+          </a:p>
+          <a:p>
+            <a:endParaRPr lang="en-US" dirty="0" smtClean="0"/>
+          </a:p>
+          <a:p>
+            <a:endParaRPr lang="en-US" dirty="0"/>
+          </a:p>
+          <a:p>
+            <a:r>
+              <a:rPr lang="en-US" dirty="0"/>
+              <a:t>Slides: </a:t>
+            </a:r>
+            <a:r>
+              <a:rPr lang="en-US" dirty="0">
+                <a:hlinkClick r:id="rId4"/>
+              </a:rPr>
+              <a:t>https://</a:t>
             </a:r>
             <a:r>
               <a:rPr lang="en-US" dirty="0" smtClean="0">
-                <a:latin typeface="Courier" charset="0"/>
-                <a:ea typeface="Courier" charset="0"/>
-                <a:cs typeface="Courier" charset="0"/>
-              </a:rPr>
-              <a:t>/summit</a:t>
-            </a:r>
-          </a:p>
-          <a:p>
-            <a:pPr marL="114300" indent="0">
-              <a:buNone/>
-            </a:pPr>
-            <a:r>
-              <a:rPr lang="en-US" sz="2200" dirty="0">
-                <a:latin typeface="Courier" charset="0"/>
-                <a:ea typeface="Courier" charset="0"/>
-                <a:cs typeface="Courier" charset="0"/>
-              </a:rPr>
-              <a:t>	</a:t>
-            </a:r>
-            <a:r>
-              <a:rPr lang="en-US" sz="2200" dirty="0" err="1" smtClean="0">
-                <a:latin typeface="Courier" charset="0"/>
-                <a:ea typeface="Courier" charset="0"/>
-                <a:cs typeface="Courier" charset="0"/>
-              </a:rPr>
-              <a:t>sinteractive</a:t>
-            </a:r>
-            <a:r>
-              <a:rPr lang="en-US" sz="2200" dirty="0" smtClean="0">
-                <a:latin typeface="Courier" charset="0"/>
-                <a:ea typeface="Courier" charset="0"/>
-                <a:cs typeface="Courier" charset="0"/>
-              </a:rPr>
+                <a:hlinkClick r:id="rId4"/>
+              </a:rPr>
+              <a:t>github.com/ResearchComputing/New_User_Seminar</a:t>
+            </a:r>
+            <a:r>
+              <a:rPr lang="en-US" smtClean="0"/>
               <a:t> </a:t>
             </a:r>
-            <a:r>
-              <a:rPr lang="en-US" sz="2200" dirty="0">
-                <a:latin typeface="Courier" charset="0"/>
-                <a:ea typeface="Courier" charset="0"/>
-                <a:cs typeface="Courier" charset="0"/>
-              </a:rPr>
-              <a:t>–-</a:t>
-            </a:r>
-            <a:r>
-              <a:rPr lang="en-US" sz="2200" dirty="0" smtClean="0">
-                <a:latin typeface="Courier" charset="0"/>
-                <a:ea typeface="Courier" charset="0"/>
-                <a:cs typeface="Courier" charset="0"/>
-              </a:rPr>
-              <a:t>reservation=</a:t>
-            </a:r>
-            <a:r>
-              <a:rPr lang="en-US" sz="2200" dirty="0" err="1" smtClean="0">
-                <a:latin typeface="Courier" charset="0"/>
-                <a:ea typeface="Courier" charset="0"/>
-                <a:cs typeface="Courier" charset="0"/>
-              </a:rPr>
-              <a:t>new_user</a:t>
-            </a:r>
-            <a:endParaRPr lang="en-US" sz="2200" dirty="0">
-              <a:latin typeface="Courier" charset="0"/>
-              <a:ea typeface="Courier" charset="0"/>
-              <a:cs typeface="Courier" charset="0"/>
-            </a:endParaRPr>
-          </a:p>
-          <a:p>
-            <a:r>
-              <a:rPr lang="en-US" dirty="0" smtClean="0"/>
-              <a:t>Once we receive a prompt, then:</a:t>
-            </a:r>
-          </a:p>
-          <a:p>
-            <a:pPr marL="114300" indent="0">
-              <a:buNone/>
-            </a:pPr>
-            <a:r>
-              <a:rPr lang="en-US" sz="2200" dirty="0">
-                <a:latin typeface="Courier New" charset="0"/>
-                <a:ea typeface="Courier New" charset="0"/>
-                <a:cs typeface="Courier New" charset="0"/>
-              </a:rPr>
-              <a:t>	</a:t>
-            </a:r>
-            <a:r>
-              <a:rPr lang="en-US" sz="2200" dirty="0" smtClean="0">
-                <a:latin typeface="Courier" charset="0"/>
-                <a:ea typeface="Courier" charset="0"/>
-                <a:cs typeface="Courier" charset="0"/>
-              </a:rPr>
-              <a:t>module load </a:t>
-            </a:r>
-            <a:r>
-              <a:rPr lang="en-US" sz="2200" dirty="0" err="1">
-                <a:latin typeface="Courier" charset="0"/>
-                <a:ea typeface="Courier" charset="0"/>
-                <a:cs typeface="Courier" charset="0"/>
-              </a:rPr>
-              <a:t>matlab</a:t>
-            </a:r>
-            <a:endParaRPr lang="en-US" sz="2200" dirty="0">
-              <a:latin typeface="Courier" charset="0"/>
-              <a:ea typeface="Courier" charset="0"/>
-              <a:cs typeface="Courier" charset="0"/>
-            </a:endParaRPr>
-          </a:p>
-          <a:p>
-            <a:pPr marL="114300" indent="0">
-              <a:buNone/>
-            </a:pPr>
-            <a:r>
-              <a:rPr lang="en-US" sz="2200" dirty="0">
-                <a:latin typeface="Courier" charset="0"/>
-                <a:ea typeface="Courier" charset="0"/>
-                <a:cs typeface="Courier" charset="0"/>
-              </a:rPr>
-              <a:t>	</a:t>
-            </a:r>
-            <a:r>
-              <a:rPr lang="en-US" sz="2200" dirty="0" err="1">
-                <a:latin typeface="Courier" charset="0"/>
-                <a:ea typeface="Courier" charset="0"/>
-                <a:cs typeface="Courier" charset="0"/>
-              </a:rPr>
-              <a:t>matlab</a:t>
-            </a:r>
-            <a:endParaRPr lang="en-US" sz="2200" dirty="0">
-              <a:latin typeface="Courier" charset="0"/>
-              <a:ea typeface="Courier" charset="0"/>
-              <a:cs typeface="Courier" charset="0"/>
-            </a:endParaRPr>
-          </a:p>
-          <a:p>
-            <a:r>
-              <a:rPr lang="en-US" sz="2200" dirty="0">
-                <a:latin typeface="Helvetica Neue" charset="0"/>
-                <a:ea typeface="Helvetica Neue" charset="0"/>
-                <a:cs typeface="Helvetica Neue" charset="0"/>
-              </a:rPr>
-              <a:t>Once we finish we must exit!</a:t>
-            </a:r>
-          </a:p>
-          <a:p>
-            <a:endParaRPr lang="en-US" dirty="0" smtClean="0"/>
+            <a:endParaRPr lang="en-US" dirty="0"/>
           </a:p>
         </p:txBody>
       </p:sp>
@@ -27656,9 +27889,9 @@
           <a:bodyPr/>
           <a:lstStyle/>
           <a:p>
-            <a:fld id="{F21DF42F-4BC7-1E4D-B4C7-33A7E30F56D4}" type="datetime1">
-              <a:rPr lang="en-US" smtClean="0"/>
-              <a:t>5/3/17</a:t>
+            <a:fld id="{F176B5BB-6C1E-4446-A4B5-BF7D661481E8}" type="datetime1">
+              <a:rPr lang="en-US" smtClean="0"/>
+              <a:t>5/4/17</a:t>
             </a:fld>
             <a:endParaRPr lang="en-US" dirty="0"/>
           </a:p>
@@ -27705,448 +27938,6 @@
             <a:fld id="{02339CB1-0666-044B-8464-C41DC611290B}" type="slidenum">
               <a:rPr lang="en-US" smtClean="0"/>
               <a:t>56</a:t>
-            </a:fld>
-            <a:endParaRPr lang="en-US"/>
-          </a:p>
-        </p:txBody>
-      </p:sp>
-    </p:spTree>
-    <p:extLst>
-      <p:ext uri="{BB962C8B-B14F-4D97-AF65-F5344CB8AC3E}">
-        <p14:creationId xmlns:p14="http://schemas.microsoft.com/office/powerpoint/2010/main" val="1913494464"/>
-      </p:ext>
-    </p:extLst>
-  </p:cSld>
-  <p:clrMapOvr>
-    <a:masterClrMapping/>
-  </p:clrMapOvr>
-  <p:timing>
-    <p:tnLst>
-      <p:par>
-        <p:cTn id="1" dur="indefinite" restart="never" nodeType="tmRoot"/>
-      </p:par>
-    </p:tnLst>
-  </p:timing>
-</p:sld>
-</file>
-
-<file path=ppt/slides/slide57.xml><?xml version="1.0" encoding="utf-8"?>
-<p:sld xmlns:a="http://schemas.openxmlformats.org/drawingml/2006/main" xmlns:r="http://schemas.openxmlformats.org/officeDocument/2006/relationships" xmlns:p="http://schemas.openxmlformats.org/presentationml/2006/main">
-  <p:cSld>
-    <p:spTree>
-      <p:nvGrpSpPr>
-        <p:cNvPr id="1" name=""/>
-        <p:cNvGrpSpPr/>
-        <p:nvPr/>
-      </p:nvGrpSpPr>
-      <p:grpSpPr>
-        <a:xfrm>
-          <a:off x="0" y="0"/>
-          <a:ext cx="0" cy="0"/>
-          <a:chOff x="0" y="0"/>
-          <a:chExt cx="0" cy="0"/>
-        </a:xfrm>
-      </p:grpSpPr>
-      <p:sp>
-        <p:nvSpPr>
-          <p:cNvPr id="2" name="Title 1"/>
-          <p:cNvSpPr>
-            <a:spLocks noGrp="1"/>
-          </p:cNvSpPr>
-          <p:nvPr>
-            <p:ph type="title"/>
-          </p:nvPr>
-        </p:nvSpPr>
-        <p:spPr/>
-        <p:txBody>
-          <a:bodyPr/>
-          <a:lstStyle/>
-          <a:p>
-            <a:r>
-              <a:rPr lang="en-US" dirty="0" smtClean="0"/>
-              <a:t>Setting Up Globus</a:t>
-            </a:r>
-            <a:endParaRPr lang="en-US" dirty="0"/>
-          </a:p>
-        </p:txBody>
-      </p:sp>
-      <p:sp>
-        <p:nvSpPr>
-          <p:cNvPr id="3" name="Content Placeholder 2"/>
-          <p:cNvSpPr>
-            <a:spLocks noGrp="1"/>
-          </p:cNvSpPr>
-          <p:nvPr>
-            <p:ph idx="1"/>
-          </p:nvPr>
-        </p:nvSpPr>
-        <p:spPr/>
-        <p:txBody>
-          <a:bodyPr/>
-          <a:lstStyle/>
-          <a:p>
-            <a:r>
-              <a:rPr lang="en-US" dirty="0">
-                <a:cs typeface="Helvetica Neue"/>
-              </a:rPr>
-              <a:t>Create an account at </a:t>
-            </a:r>
-            <a:r>
-              <a:rPr lang="en-US" dirty="0" err="1">
-                <a:cs typeface="Helvetica Neue"/>
-              </a:rPr>
-              <a:t>Globus.org</a:t>
-            </a:r>
-            <a:endParaRPr lang="en-US" dirty="0">
-              <a:cs typeface="Helvetica Neue"/>
-            </a:endParaRPr>
-          </a:p>
-          <a:p>
-            <a:r>
-              <a:rPr lang="en-US" dirty="0">
-                <a:cs typeface="Helvetica Neue"/>
-              </a:rPr>
-              <a:t>Make your personal computer an endpoint</a:t>
-            </a:r>
-          </a:p>
-          <a:p>
-            <a:r>
-              <a:rPr lang="en-US" dirty="0">
-                <a:cs typeface="Helvetica Neue"/>
-              </a:rPr>
-              <a:t>Transfer data</a:t>
-            </a:r>
-          </a:p>
-          <a:p>
-            <a:pPr marL="342900" lvl="1">
-              <a:buClr>
-                <a:schemeClr val="accent1"/>
-              </a:buClr>
-            </a:pPr>
-            <a:r>
-              <a:rPr lang="en-US" dirty="0" smtClean="0">
-                <a:cs typeface="Helvetica Neue"/>
-                <a:hlinkClick r:id="rId2"/>
-              </a:rPr>
-              <a:t>www.globus.org</a:t>
-            </a:r>
-            <a:endParaRPr lang="en-US" dirty="0" smtClean="0">
-              <a:cs typeface="Helvetica Neue"/>
-            </a:endParaRPr>
-          </a:p>
-          <a:p>
-            <a:pPr marL="342900" lvl="1">
-              <a:buClr>
-                <a:schemeClr val="accent1"/>
-              </a:buClr>
-            </a:pPr>
-            <a:endParaRPr lang="en-US" dirty="0">
-              <a:cs typeface="Helvetica Neue"/>
-            </a:endParaRPr>
-          </a:p>
-          <a:p>
-            <a:pPr marL="342900" lvl="1">
-              <a:buClr>
-                <a:schemeClr val="accent1"/>
-              </a:buClr>
-            </a:pPr>
-            <a:endParaRPr lang="en-US" dirty="0" smtClean="0">
-              <a:cs typeface="Helvetica Neue"/>
-            </a:endParaRPr>
-          </a:p>
-        </p:txBody>
-      </p:sp>
-      <p:sp>
-        <p:nvSpPr>
-          <p:cNvPr id="4" name="Date Placeholder 3"/>
-          <p:cNvSpPr>
-            <a:spLocks noGrp="1"/>
-          </p:cNvSpPr>
-          <p:nvPr>
-            <p:ph type="dt" sz="half" idx="10"/>
-          </p:nvPr>
-        </p:nvSpPr>
-        <p:spPr/>
-        <p:txBody>
-          <a:bodyPr/>
-          <a:lstStyle/>
-          <a:p>
-            <a:fld id="{1638A253-D0BE-0C4F-8900-127DDEBDCF84}" type="datetime1">
-              <a:rPr lang="en-US" smtClean="0"/>
-              <a:t>5/3/17</a:t>
-            </a:fld>
-            <a:endParaRPr lang="en-US"/>
-          </a:p>
-        </p:txBody>
-      </p:sp>
-      <p:sp>
-        <p:nvSpPr>
-          <p:cNvPr id="5" name="Footer Placeholder 4"/>
-          <p:cNvSpPr>
-            <a:spLocks noGrp="1"/>
-          </p:cNvSpPr>
-          <p:nvPr>
-            <p:ph type="ftr" sz="quarter" idx="11"/>
-          </p:nvPr>
-        </p:nvSpPr>
-        <p:spPr/>
-        <p:txBody>
-          <a:bodyPr/>
-          <a:lstStyle/>
-          <a:p>
-            <a:r>
-              <a:rPr lang="en-US" smtClean="0"/>
-              <a:t>New User Seminar</a:t>
-            </a:r>
-            <a:endParaRPr lang="en-US"/>
-          </a:p>
-        </p:txBody>
-      </p:sp>
-      <p:sp>
-        <p:nvSpPr>
-          <p:cNvPr id="7" name="Slide Number Placeholder 6"/>
-          <p:cNvSpPr>
-            <a:spLocks noGrp="1"/>
-          </p:cNvSpPr>
-          <p:nvPr>
-            <p:ph type="sldNum" sz="quarter" idx="4"/>
-          </p:nvPr>
-        </p:nvSpPr>
-        <p:spPr/>
-        <p:txBody>
-          <a:bodyPr/>
-          <a:lstStyle/>
-          <a:p>
-            <a:fld id="{02339CB1-0666-044B-8464-C41DC611290B}" type="slidenum">
-              <a:rPr lang="en-US" smtClean="0"/>
-              <a:t>57</a:t>
-            </a:fld>
-            <a:endParaRPr lang="en-US"/>
-          </a:p>
-        </p:txBody>
-      </p:sp>
-    </p:spTree>
-    <p:extLst>
-      <p:ext uri="{BB962C8B-B14F-4D97-AF65-F5344CB8AC3E}">
-        <p14:creationId xmlns:p14="http://schemas.microsoft.com/office/powerpoint/2010/main" val="1408748772"/>
-      </p:ext>
-    </p:extLst>
-  </p:cSld>
-  <p:clrMapOvr>
-    <a:masterClrMapping/>
-  </p:clrMapOvr>
-</p:sld>
-</file>
-
-<file path=ppt/slides/slide58.xml><?xml version="1.0" encoding="utf-8"?>
-<p:sld xmlns:a="http://schemas.openxmlformats.org/drawingml/2006/main" xmlns:r="http://schemas.openxmlformats.org/officeDocument/2006/relationships" xmlns:p="http://schemas.openxmlformats.org/presentationml/2006/main">
-  <p:cSld>
-    <p:spTree>
-      <p:nvGrpSpPr>
-        <p:cNvPr id="1" name=""/>
-        <p:cNvGrpSpPr/>
-        <p:nvPr/>
-      </p:nvGrpSpPr>
-      <p:grpSpPr>
-        <a:xfrm>
-          <a:off x="0" y="0"/>
-          <a:ext cx="0" cy="0"/>
-          <a:chOff x="0" y="0"/>
-          <a:chExt cx="0" cy="0"/>
-        </a:xfrm>
-      </p:grpSpPr>
-      <p:sp>
-        <p:nvSpPr>
-          <p:cNvPr id="2" name="Title 1"/>
-          <p:cNvSpPr>
-            <a:spLocks noGrp="1"/>
-          </p:cNvSpPr>
-          <p:nvPr>
-            <p:ph type="title"/>
-          </p:nvPr>
-        </p:nvSpPr>
-        <p:spPr/>
-        <p:txBody>
-          <a:bodyPr/>
-          <a:lstStyle/>
-          <a:p>
-            <a:r>
-              <a:rPr lang="en-US" dirty="0" smtClean="0"/>
-              <a:t>Questions?</a:t>
-            </a:r>
-            <a:endParaRPr lang="en-US" dirty="0"/>
-          </a:p>
-        </p:txBody>
-      </p:sp>
-      <p:sp>
-        <p:nvSpPr>
-          <p:cNvPr id="3" name="Content Placeholder 2"/>
-          <p:cNvSpPr>
-            <a:spLocks noGrp="1"/>
-          </p:cNvSpPr>
-          <p:nvPr>
-            <p:ph idx="1"/>
-          </p:nvPr>
-        </p:nvSpPr>
-        <p:spPr/>
-        <p:txBody>
-          <a:bodyPr>
-            <a:normAutofit/>
-          </a:bodyPr>
-          <a:lstStyle/>
-          <a:p>
-            <a:r>
-              <a:rPr lang="en-US" dirty="0" smtClean="0"/>
-              <a:t>Email </a:t>
-            </a:r>
-            <a:r>
-              <a:rPr lang="en-US" dirty="0" smtClean="0">
-                <a:hlinkClick r:id="rId2"/>
-              </a:rPr>
-              <a:t>rc-help@colorado.edu</a:t>
-            </a:r>
-            <a:endParaRPr lang="en-US" dirty="0" smtClean="0"/>
-          </a:p>
-          <a:p>
-            <a:r>
-              <a:rPr lang="en-US" dirty="0" smtClean="0"/>
-              <a:t>Twitter:  @</a:t>
-            </a:r>
-            <a:r>
-              <a:rPr lang="en-US" dirty="0" err="1" smtClean="0"/>
-              <a:t>CUBoulderRC</a:t>
-            </a:r>
-            <a:endParaRPr lang="en-US" dirty="0" smtClean="0"/>
-          </a:p>
-          <a:p>
-            <a:endParaRPr lang="en-US" dirty="0"/>
-          </a:p>
-          <a:p>
-            <a:r>
-              <a:rPr lang="en-US" dirty="0"/>
-              <a:t>Link to survey on this topic:  </a:t>
-            </a:r>
-          </a:p>
-          <a:p>
-            <a:pPr marL="114300" indent="0">
-              <a:buNone/>
-            </a:pPr>
-            <a:r>
-              <a:rPr lang="en-US" dirty="0" smtClean="0">
-                <a:hlinkClick r:id="rId3"/>
-              </a:rPr>
-              <a:t>http</a:t>
-            </a:r>
-            <a:r>
-              <a:rPr lang="en-US" dirty="0">
-                <a:hlinkClick r:id="rId3"/>
-              </a:rPr>
-              <a:t>://tinyurl.com/curc-survey16</a:t>
-            </a:r>
-            <a:r>
-              <a:rPr lang="en-US" dirty="0"/>
-              <a:t>  </a:t>
-            </a:r>
-          </a:p>
-          <a:p>
-            <a:endParaRPr lang="en-US" dirty="0" smtClean="0"/>
-          </a:p>
-          <a:p>
-            <a:endParaRPr lang="en-US" dirty="0"/>
-          </a:p>
-          <a:p>
-            <a:r>
-              <a:rPr lang="en-US" dirty="0"/>
-              <a:t>Slides</a:t>
-            </a:r>
-            <a:r>
-              <a:rPr lang="en-US" dirty="0"/>
-              <a:t>: </a:t>
-            </a:r>
-            <a:r>
-              <a:rPr lang="en-US" dirty="0">
-                <a:hlinkClick r:id="rId4"/>
-              </a:rPr>
-              <a:t>https://</a:t>
-            </a:r>
-            <a:r>
-              <a:rPr lang="en-US" dirty="0" smtClean="0">
-                <a:hlinkClick r:id="rId4"/>
-              </a:rPr>
-              <a:t>github.com/ResearchComputing/New_User_Seminar</a:t>
-            </a:r>
-            <a:r>
-              <a:rPr lang="en-US" smtClean="0"/>
-              <a:t> </a:t>
-            </a:r>
-            <a:endParaRPr lang="en-US" dirty="0"/>
-          </a:p>
-        </p:txBody>
-      </p:sp>
-      <p:sp>
-        <p:nvSpPr>
-          <p:cNvPr id="4" name="Date Placeholder 3"/>
-          <p:cNvSpPr>
-            <a:spLocks noGrp="1"/>
-          </p:cNvSpPr>
-          <p:nvPr>
-            <p:ph type="dt" sz="half" idx="10"/>
-          </p:nvPr>
-        </p:nvSpPr>
-        <p:spPr/>
-        <p:txBody>
-          <a:bodyPr/>
-          <a:lstStyle/>
-          <a:p>
-            <a:fld id="{F176B5BB-6C1E-4446-A4B5-BF7D661481E8}" type="datetime1">
-              <a:rPr lang="en-US" smtClean="0"/>
-              <a:t>5/3/17</a:t>
-            </a:fld>
-            <a:endParaRPr lang="en-US" dirty="0"/>
-          </a:p>
-        </p:txBody>
-      </p:sp>
-      <p:sp>
-        <p:nvSpPr>
-          <p:cNvPr id="5" name="Footer Placeholder 4"/>
-          <p:cNvSpPr>
-            <a:spLocks noGrp="1"/>
-          </p:cNvSpPr>
-          <p:nvPr>
-            <p:ph type="ftr" sz="quarter" idx="11"/>
-          </p:nvPr>
-        </p:nvSpPr>
-        <p:spPr/>
-        <p:txBody>
-          <a:bodyPr/>
-          <a:lstStyle/>
-          <a:p>
-            <a:r>
-              <a:rPr lang="en-US" smtClean="0"/>
-              <a:t>New User Seminar</a:t>
-            </a:r>
-            <a:endParaRPr lang="en-US" dirty="0"/>
-          </a:p>
-        </p:txBody>
-      </p:sp>
-      <p:sp>
-        <p:nvSpPr>
-          <p:cNvPr id="7" name="Slide Number Placeholder 6"/>
-          <p:cNvSpPr>
-            <a:spLocks noGrp="1"/>
-          </p:cNvSpPr>
-          <p:nvPr>
-            <p:ph type="sldNum" sz="quarter" idx="4"/>
-          </p:nvPr>
-        </p:nvSpPr>
-        <p:spPr/>
-        <p:txBody>
-          <a:bodyPr/>
-          <a:lstStyle/>
-          <a:p>
-            <a:fld id="{02339CB1-0666-044B-8464-C41DC611290B}" type="slidenum">
-              <a:rPr lang="en-US" smtClean="0"/>
-              <a:t>58</a:t>
             </a:fld>
             <a:endParaRPr lang="en-US"/>
           </a:p>
@@ -28297,7 +28088,7 @@
           <a:p>
             <a:fld id="{2C3A7136-6CD9-1F44-BF87-1F02B022DD38}" type="datetime1">
               <a:rPr lang="en-US" smtClean="0"/>
-              <a:t>5/3/17</a:t>
+              <a:t>5/4/17</a:t>
             </a:fld>
             <a:endParaRPr lang="en-US"/>
           </a:p>
@@ -28525,7 +28316,7 @@
           <a:p>
             <a:fld id="{DD60739B-9381-D348-A54C-084428A1CE83}" type="datetime1">
               <a:rPr lang="en-US" smtClean="0"/>
-              <a:t>5/3/17</a:t>
+              <a:t>5/4/17</a:t>
             </a:fld>
             <a:endParaRPr lang="en-US"/>
           </a:p>
@@ -28587,6 +28378,13 @@
   <p:clrMapOvr>
     <a:masterClrMapping/>
   </p:clrMapOvr>
+  <p:timing>
+    <p:tnLst>
+      <p:par>
+        <p:cTn id="1" dur="indefinite" restart="never" nodeType="tmRoot"/>
+      </p:par>
+    </p:tnLst>
+  </p:timing>
 </p:sld>
 </file>
 
@@ -28752,7 +28550,7 @@
           <a:p>
             <a:fld id="{E4C2F9E9-0335-9F43-85CD-6D5AFF0B589E}" type="datetime1">
               <a:rPr lang="en-US" smtClean="0"/>
-              <a:t>5/3/17</a:t>
+              <a:t>5/4/17</a:t>
             </a:fld>
             <a:endParaRPr lang="en-US"/>
           </a:p>
@@ -28814,6 +28612,13 @@
   <p:clrMapOvr>
     <a:masterClrMapping/>
   </p:clrMapOvr>
+  <p:timing>
+    <p:tnLst>
+      <p:par>
+        <p:cTn id="1" dur="indefinite" restart="never" nodeType="tmRoot"/>
+      </p:par>
+    </p:tnLst>
+  </p:timing>
 </p:sld>
 </file>
 
@@ -28937,7 +28742,7 @@
           <a:p>
             <a:fld id="{CE5BD4CA-09B4-E54C-901B-62D7687F59E7}" type="datetime1">
               <a:rPr lang="en-US" smtClean="0"/>
-              <a:t>5/3/17</a:t>
+              <a:t>5/4/17</a:t>
             </a:fld>
             <a:endParaRPr lang="en-US"/>
           </a:p>
@@ -28999,6 +28804,13 @@
   <p:clrMapOvr>
     <a:masterClrMapping/>
   </p:clrMapOvr>
+  <p:timing>
+    <p:tnLst>
+      <p:par>
+        <p:cTn id="1" dur="indefinite" restart="never" nodeType="tmRoot"/>
+      </p:par>
+    </p:tnLst>
+  </p:timing>
 </p:sld>
 </file>
 

</xml_diff>

<commit_message>
Updated New User ppt
</commit_message>
<xml_diff>
--- a/rc_new_user_seminar_2017.pptx
+++ b/rc_new_user_seminar_2017.pptx
@@ -1492,14 +1492,14 @@
               <ma14:placeholderFlag xmlns:ma14="http://schemas.microsoft.com/office/mac/drawingml/2011/main" val="1"/>
             </a:ext>
             <a:ext uri="{909E8E84-426E-40dd-AFC4-6F175D3DCCD1}">
-              <a14:hiddenFill xmlns="" xmlns:a14="http://schemas.microsoft.com/office/drawing/2010/main">
+              <a14:hiddenFill xmlns:a14="http://schemas.microsoft.com/office/drawing/2010/main" xmlns="">
                 <a:solidFill>
                   <a:srgbClr val="FFFFFF"/>
                 </a:solidFill>
               </a14:hiddenFill>
             </a:ext>
             <a:ext uri="{91240B29-F687-4f45-9708-019B960494DF}">
-              <a14:hiddenLine xmlns="" xmlns:a14="http://schemas.microsoft.com/office/drawing/2010/main" w="9525">
+              <a14:hiddenLine xmlns:a14="http://schemas.microsoft.com/office/drawing/2010/main" xmlns="" w="9525">
                 <a:solidFill>
                   <a:srgbClr val="000000"/>
                 </a:solidFill>
@@ -1537,14 +1537,14 @@
           <a:ln/>
           <a:extLst>
             <a:ext uri="{909E8E84-426E-40dd-AFC4-6F175D3DCCD1}">
-              <a14:hiddenFill xmlns="" xmlns:a14="http://schemas.microsoft.com/office/drawing/2010/main">
+              <a14:hiddenFill xmlns:a14="http://schemas.microsoft.com/office/drawing/2010/main" xmlns="">
                 <a:solidFill>
                   <a:srgbClr val="FFFFFF"/>
                 </a:solidFill>
               </a14:hiddenFill>
             </a:ext>
             <a:ext uri="{91240B29-F687-4f45-9708-019B960494DF}">
-              <a14:hiddenLine xmlns="" xmlns:a14="http://schemas.microsoft.com/office/drawing/2010/main" w="9525">
+              <a14:hiddenLine xmlns:a14="http://schemas.microsoft.com/office/drawing/2010/main" xmlns="" w="9525">
                 <a:solidFill>
                   <a:srgbClr val="000000"/>
                 </a:solidFill>
@@ -10235,15 +10235,7 @@
                 <a:ea typeface="Courier" charset="0"/>
                 <a:cs typeface="Courier" charset="0"/>
               </a:rPr>
-              <a:t>load </a:t>
-            </a:r>
-            <a:r>
-              <a:rPr lang="en-US" b="1" smtClean="0">
-                <a:latin typeface="Courier" charset="0"/>
-                <a:ea typeface="Courier" charset="0"/>
-                <a:cs typeface="Courier" charset="0"/>
-              </a:rPr>
-              <a:t>R/3.3.0</a:t>
+              <a:t>load R/3.3.0</a:t>
             </a:r>
             <a:endParaRPr lang="en-US" b="1" dirty="0" smtClean="0">
               <a:latin typeface="Courier" charset="0"/>
@@ -19338,32 +19330,12 @@
             <a:pPr lvl="1"/>
             <a:r>
               <a:rPr lang="en-US" dirty="0" smtClean="0"/>
-              <a:t>Hint:  Requires two SBATCH options to do this – see link at top of this slide</a:t>
-            </a:r>
-          </a:p>
-          <a:p>
-            <a:pPr marL="571500" indent="-457200">
-              <a:buFont typeface="+mj-lt"/>
-              <a:buAutoNum type="arabicPeriod"/>
-            </a:pPr>
-            <a:r>
-              <a:rPr lang="en-US" dirty="0" smtClean="0"/>
-              <a:t>Use the </a:t>
-            </a:r>
-            <a:r>
-              <a:rPr lang="en-US" dirty="0" err="1" smtClean="0"/>
-              <a:t>new_user</a:t>
-            </a:r>
-            <a:r>
-              <a:rPr lang="en-US" dirty="0" smtClean="0"/>
-              <a:t> reservation</a:t>
-            </a:r>
-          </a:p>
-          <a:p>
-            <a:pPr marL="571500" indent="-457200">
-              <a:buFont typeface="+mj-lt"/>
-              <a:buAutoNum type="arabicPeriod"/>
-            </a:pPr>
+              <a:t>Hint:  Requires two SBATCH options to do this – see link at top of this </a:t>
+            </a:r>
+            <a:r>
+              <a:rPr lang="en-US" dirty="0" smtClean="0"/>
+              <a:t>slide</a:t>
+            </a:r>
             <a:endParaRPr lang="en-US" dirty="0"/>
           </a:p>
           <a:p>
@@ -19575,7 +19547,7 @@
         </p:spPr>
         <p:txBody>
           <a:bodyPr>
-            <a:normAutofit fontScale="85000" lnSpcReduction="20000"/>
+            <a:normAutofit fontScale="85000" lnSpcReduction="10000"/>
           </a:bodyPr>
           <a:lstStyle/>
           <a:p>
@@ -19815,35 +19787,6 @@
                 <a:cs typeface="Courier" charset="0"/>
               </a:rPr>
               <a:t>Email address to send to      </a:t>
-            </a:r>
-          </a:p>
-          <a:p>
-            <a:pPr marL="114300" indent="0">
-              <a:buNone/>
-            </a:pPr>
-            <a:r>
-              <a:rPr lang="en-US" sz="2000" dirty="0">
-                <a:latin typeface="Courier" charset="0"/>
-                <a:ea typeface="Courier" charset="0"/>
-                <a:cs typeface="Courier" charset="0"/>
-              </a:rPr>
-              <a:t>#SBATCH --reservation=</a:t>
-            </a:r>
-            <a:r>
-              <a:rPr lang="en-US" sz="2000" dirty="0" err="1">
-                <a:latin typeface="Courier" charset="0"/>
-                <a:ea typeface="Courier" charset="0"/>
-                <a:cs typeface="Courier" charset="0"/>
-              </a:rPr>
-              <a:t>new_user</a:t>
-            </a:r>
-            <a:r>
-              <a:rPr lang="en-US" sz="2000" dirty="0">
-                <a:latin typeface="Courier" charset="0"/>
-                <a:ea typeface="Courier" charset="0"/>
-                <a:cs typeface="Courier" charset="0"/>
-              </a:rPr>
-              <a:t>                  # Reservation name</a:t>
             </a:r>
           </a:p>
           <a:p>
@@ -20591,7 +20534,7 @@
         </p:spPr>
         <p:txBody>
           <a:bodyPr>
-            <a:normAutofit fontScale="92500" lnSpcReduction="20000"/>
+            <a:normAutofit fontScale="92500" lnSpcReduction="10000"/>
           </a:bodyPr>
           <a:lstStyle/>
           <a:p>
@@ -20795,35 +20738,6 @@
                 <a:cs typeface="Courier" charset="0"/>
               </a:rPr>
               <a:t>Output file name</a:t>
-            </a:r>
-          </a:p>
-          <a:p>
-            <a:pPr marL="114300" indent="0">
-              <a:buNone/>
-            </a:pPr>
-            <a:r>
-              <a:rPr lang="en-US" sz="2000" dirty="0">
-                <a:latin typeface="Courier" charset="0"/>
-                <a:ea typeface="Courier" charset="0"/>
-                <a:cs typeface="Courier" charset="0"/>
-              </a:rPr>
-              <a:t>#SBATCH --reservation=</a:t>
-            </a:r>
-            <a:r>
-              <a:rPr lang="en-US" sz="2000" dirty="0" err="1">
-                <a:latin typeface="Courier" charset="0"/>
-                <a:ea typeface="Courier" charset="0"/>
-                <a:cs typeface="Courier" charset="0"/>
-              </a:rPr>
-              <a:t>new_user</a:t>
-            </a:r>
-            <a:r>
-              <a:rPr lang="en-US" sz="2000" dirty="0">
-                <a:latin typeface="Courier" charset="0"/>
-                <a:ea typeface="Courier" charset="0"/>
-                <a:cs typeface="Courier" charset="0"/>
-              </a:rPr>
-              <a:t>          # Reservation name</a:t>
             </a:r>
           </a:p>
           <a:p>
@@ -21499,25 +21413,11 @@
             </a:pPr>
             <a:r>
               <a:rPr lang="en-US" dirty="0" smtClean="0"/>
-              <a:t>Use the </a:t>
-            </a:r>
-            <a:r>
-              <a:rPr lang="en-US" dirty="0" err="1" smtClean="0"/>
-              <a:t>new_user</a:t>
-            </a:r>
-            <a:r>
-              <a:rPr lang="en-US" dirty="0" smtClean="0"/>
-              <a:t> reservation</a:t>
-            </a:r>
-          </a:p>
-          <a:p>
-            <a:pPr marL="571500" indent="-457200">
-              <a:buFont typeface="+mj-lt"/>
-              <a:buAutoNum type="arabicPeriod"/>
-            </a:pPr>
-            <a:r>
-              <a:rPr lang="en-US" dirty="0" smtClean="0"/>
-              <a:t>Don’t forget to load the R module!  </a:t>
+              <a:t>Don’t </a:t>
+            </a:r>
+            <a:r>
+              <a:rPr lang="en-US" dirty="0" smtClean="0"/>
+              <a:t>forget to load the R module!  </a:t>
             </a:r>
             <a:endParaRPr lang="en-US" dirty="0"/>
           </a:p>
@@ -21946,7 +21846,7 @@
         </p:spPr>
         <p:txBody>
           <a:bodyPr>
-            <a:normAutofit fontScale="85000" lnSpcReduction="20000"/>
+            <a:normAutofit fontScale="85000" lnSpcReduction="10000"/>
           </a:bodyPr>
           <a:lstStyle/>
           <a:p>
@@ -22102,35 +22002,6 @@
                 <a:cs typeface="Courier" charset="0"/>
               </a:rPr>
               <a:t>                  # Output file name</a:t>
-            </a:r>
-          </a:p>
-          <a:p>
-            <a:pPr marL="114300" indent="0">
-              <a:buNone/>
-            </a:pPr>
-            <a:r>
-              <a:rPr lang="en-US" sz="1800" dirty="0">
-                <a:latin typeface="Courier" charset="0"/>
-                <a:ea typeface="Courier" charset="0"/>
-                <a:cs typeface="Courier" charset="0"/>
-              </a:rPr>
-              <a:t>###SBATCH --reservation=</a:t>
-            </a:r>
-            <a:r>
-              <a:rPr lang="en-US" sz="1800" dirty="0" err="1">
-                <a:latin typeface="Courier" charset="0"/>
-                <a:ea typeface="Courier" charset="0"/>
-                <a:cs typeface="Courier" charset="0"/>
-              </a:rPr>
-              <a:t>new_user</a:t>
-            </a:r>
-            <a:r>
-              <a:rPr lang="en-US" sz="1800" dirty="0">
-                <a:latin typeface="Courier" charset="0"/>
-                <a:ea typeface="Courier" charset="0"/>
-                <a:cs typeface="Courier" charset="0"/>
-              </a:rPr>
-              <a:t>                # Reservation name</a:t>
             </a:r>
           </a:p>
           <a:p>
@@ -23291,47 +23162,30 @@
               <a:t>sinteractive</a:t>
             </a:r>
             <a:r>
-              <a:rPr lang="en-US" sz="2200" dirty="0" smtClean="0">
+              <a:rPr lang="en-US" sz="2200" smtClean="0">
                 <a:latin typeface="Courier" charset="0"/>
                 <a:ea typeface="Courier" charset="0"/>
                 <a:cs typeface="Courier" charset="0"/>
               </a:rPr>
               <a:t> </a:t>
             </a:r>
-            <a:r>
-              <a:rPr lang="en-US" sz="2200" dirty="0">
-                <a:latin typeface="Courier" charset="0"/>
-                <a:ea typeface="Courier" charset="0"/>
-                <a:cs typeface="Courier" charset="0"/>
-              </a:rPr>
-              <a:t>–-</a:t>
-            </a:r>
-            <a:r>
-              <a:rPr lang="en-US" sz="2200" dirty="0" smtClean="0">
-                <a:latin typeface="Courier" charset="0"/>
-                <a:ea typeface="Courier" charset="0"/>
-                <a:cs typeface="Courier" charset="0"/>
-              </a:rPr>
-              <a:t>reservation=</a:t>
-            </a:r>
-            <a:r>
-              <a:rPr lang="en-US" sz="2200" dirty="0" err="1" smtClean="0">
-                <a:latin typeface="Courier" charset="0"/>
-                <a:ea typeface="Courier" charset="0"/>
-                <a:cs typeface="Courier" charset="0"/>
-              </a:rPr>
-              <a:t>new_user</a:t>
-            </a:r>
-            <a:endParaRPr lang="en-US" sz="2200" dirty="0">
+            <a:endParaRPr lang="en-US" sz="2200" smtClean="0">
               <a:latin typeface="Courier" charset="0"/>
               <a:ea typeface="Courier" charset="0"/>
               <a:cs typeface="Courier" charset="0"/>
             </a:endParaRPr>
           </a:p>
           <a:p>
-            <a:r>
-              <a:rPr lang="en-US" dirty="0" smtClean="0"/>
-              <a:t>Once we receive a prompt, then:</a:t>
+            <a:pPr marL="114300" indent="0">
+              <a:buNone/>
+            </a:pPr>
+            <a:r>
+              <a:rPr lang="en-US" smtClean="0"/>
+              <a:t>Once </a:t>
+            </a:r>
+            <a:r>
+              <a:rPr lang="en-US" dirty="0" smtClean="0"/>
+              <a:t>we receive a prompt, then:</a:t>
             </a:r>
           </a:p>
           <a:p>
@@ -24324,7 +24178,6 @@
               <a:rPr lang="en-US" dirty="0" smtClean="0"/>
               <a:t>Need XSEDE account and Duo access through XSEDE</a:t>
             </a:r>
-            <a:endParaRPr lang="en-US" dirty="0" smtClean="0"/>
           </a:p>
           <a:p>
             <a:pPr lvl="1"/>
@@ -24529,11 +24382,7 @@
             <a:pPr lvl="2"/>
             <a:r>
               <a:rPr lang="en-US" dirty="0" smtClean="0"/>
-              <a:t>Physical </a:t>
-            </a:r>
-            <a:r>
-              <a:rPr lang="en-US" dirty="0" smtClean="0"/>
-              <a:t>device</a:t>
+              <a:t>Physical device</a:t>
             </a:r>
             <a:endParaRPr lang="en-US" dirty="0"/>
           </a:p>

</xml_diff>

<commit_message>
Added more detail to sinteractive command
</commit_message>
<xml_diff>
--- a/rc_new_user_seminar_2017.pptx
+++ b/rc_new_user_seminar_2017.pptx
@@ -251,7 +251,7 @@
           <a:p>
             <a:fld id="{C649942D-A542-EE42-A1CF-1E4FFF53ED67}" type="datetimeFigureOut">
               <a:rPr lang="en-US" smtClean="0"/>
-              <a:t>10/23/17</a:t>
+              <a:t>11/20/17</a:t>
             </a:fld>
             <a:endParaRPr lang="en-US"/>
           </a:p>
@@ -2581,7 +2581,7 @@
           <a:p>
             <a:fld id="{ECD68DE7-8E14-F140-9BF8-7DF505A7EC71}" type="datetime1">
               <a:rPr lang="en-US" smtClean="0"/>
-              <a:t>10/23/17</a:t>
+              <a:t>11/20/17</a:t>
             </a:fld>
             <a:endParaRPr lang="en-US"/>
           </a:p>
@@ -2771,7 +2771,7 @@
           <a:p>
             <a:fld id="{1D9E6949-9996-6743-8CFF-FA3A56E13506}" type="datetime1">
               <a:rPr lang="en-US" smtClean="0"/>
-              <a:t>10/23/17</a:t>
+              <a:t>11/20/17</a:t>
             </a:fld>
             <a:endParaRPr lang="en-US"/>
           </a:p>
@@ -2971,7 +2971,7 @@
           <a:p>
             <a:fld id="{B889D5DF-D410-3845-BB2F-EEB43AAD8F50}" type="datetime1">
               <a:rPr lang="en-US" smtClean="0"/>
-              <a:t>10/23/17</a:t>
+              <a:t>11/20/17</a:t>
             </a:fld>
             <a:endParaRPr lang="en-US"/>
           </a:p>
@@ -3258,7 +3258,7 @@
           <a:p>
             <a:fld id="{150E7F26-8C30-8C48-992C-4605BCF373C1}" type="datetime1">
               <a:rPr lang="en-US" smtClean="0"/>
-              <a:t>10/23/17</a:t>
+              <a:t>11/20/17</a:t>
             </a:fld>
             <a:endParaRPr lang="en-US"/>
           </a:p>
@@ -3428,7 +3428,7 @@
           <a:p>
             <a:fld id="{043D7B85-D040-214F-9303-7FDDADF77F95}" type="datetime1">
               <a:rPr lang="en-US" smtClean="0"/>
-              <a:t>10/23/17</a:t>
+              <a:t>11/20/17</a:t>
             </a:fld>
             <a:endParaRPr lang="en-US"/>
           </a:p>
@@ -3694,7 +3694,7 @@
           <a:p>
             <a:fld id="{77B1075F-B81A-5940-A68D-45596C356335}" type="datetime1">
               <a:rPr lang="en-US" smtClean="0"/>
-              <a:t>10/23/17</a:t>
+              <a:t>11/20/17</a:t>
             </a:fld>
             <a:endParaRPr lang="en-US"/>
           </a:p>
@@ -4002,7 +4002,7 @@
           <a:p>
             <a:fld id="{39113FC0-C6F8-6E40-8D7A-F2A1A22961FE}" type="datetime1">
               <a:rPr lang="en-US" smtClean="0"/>
-              <a:t>10/23/17</a:t>
+              <a:t>11/20/17</a:t>
             </a:fld>
             <a:endParaRPr lang="en-US"/>
           </a:p>
@@ -4456,7 +4456,7 @@
           <a:p>
             <a:fld id="{37F32D73-5A99-464A-8594-B551FF72C9D9}" type="datetime1">
               <a:rPr lang="en-US" smtClean="0"/>
-              <a:t>10/23/17</a:t>
+              <a:t>11/20/17</a:t>
             </a:fld>
             <a:endParaRPr lang="en-US"/>
           </a:p>
@@ -4594,7 +4594,7 @@
           <a:p>
             <a:fld id="{E82BF7D7-27C3-CF45-B820-FC005A5F8688}" type="datetime1">
               <a:rPr lang="en-US" smtClean="0"/>
-              <a:t>10/23/17</a:t>
+              <a:t>11/20/17</a:t>
             </a:fld>
             <a:endParaRPr lang="en-US"/>
           </a:p>
@@ -4709,7 +4709,7 @@
           <a:p>
             <a:fld id="{9555053E-C274-C74C-A284-88F22C581203}" type="datetime1">
               <a:rPr lang="en-US" smtClean="0"/>
-              <a:t>10/23/17</a:t>
+              <a:t>11/20/17</a:t>
             </a:fld>
             <a:endParaRPr lang="en-US"/>
           </a:p>
@@ -4923,7 +4923,7 @@
           <a:p>
             <a:fld id="{7A689FF8-7D69-1D41-AF80-D980840BCB23}" type="datetime1">
               <a:rPr lang="en-US" smtClean="0"/>
-              <a:t>10/23/17</a:t>
+              <a:t>11/20/17</a:t>
             </a:fld>
             <a:endParaRPr lang="en-US"/>
           </a:p>
@@ -5266,7 +5266,7 @@
           <a:p>
             <a:fld id="{B2055EBF-49EC-E44B-96CA-4F8E3FBF2465}" type="datetime1">
               <a:rPr lang="en-US" smtClean="0"/>
-              <a:t>10/23/17</a:t>
+              <a:t>11/20/17</a:t>
             </a:fld>
             <a:endParaRPr lang="en-US"/>
           </a:p>
@@ -5629,7 +5629,7 @@
           <a:p>
             <a:fld id="{96D7D345-C39C-A44C-AF4E-9524445B1337}" type="datetime1">
               <a:rPr lang="en-US" smtClean="0"/>
-              <a:t>10/23/17</a:t>
+              <a:t>11/20/17</a:t>
             </a:fld>
             <a:endParaRPr lang="en-US"/>
           </a:p>
@@ -6222,7 +6222,7 @@
           <a:p>
             <a:fld id="{BD3E17D7-4415-0A45-8086-1E9B50478751}" type="datetime1">
               <a:rPr lang="en-US" smtClean="0"/>
-              <a:t>10/23/17</a:t>
+              <a:t>11/20/17</a:t>
             </a:fld>
             <a:endParaRPr lang="en-US" dirty="0"/>
           </a:p>
@@ -6404,7 +6404,7 @@
           <a:p>
             <a:fld id="{4676C52D-A00D-2248-AAC1-94BD55906AAC}" type="datetime1">
               <a:rPr lang="en-US" smtClean="0"/>
-              <a:t>10/23/17</a:t>
+              <a:t>11/20/17</a:t>
             </a:fld>
             <a:endParaRPr lang="en-US"/>
           </a:p>
@@ -6594,7 +6594,7 @@
           <a:p>
             <a:fld id="{446EC888-7CFD-C641-9F44-9678633359F5}" type="datetime1">
               <a:rPr lang="en-US" smtClean="0"/>
-              <a:t>10/23/17</a:t>
+              <a:t>11/20/17</a:t>
             </a:fld>
             <a:endParaRPr lang="en-US"/>
           </a:p>
@@ -6785,7 +6785,7 @@
           <a:p>
             <a:fld id="{9DCF056C-E28A-E84B-82B5-F09CA8CCF7AA}" type="datetime1">
               <a:rPr lang="en-US" smtClean="0"/>
-              <a:t>10/23/17</a:t>
+              <a:t>11/20/17</a:t>
             </a:fld>
             <a:endParaRPr lang="en-US" dirty="0"/>
           </a:p>
@@ -6986,7 +6986,7 @@
           <a:p>
             <a:fld id="{F20BFDB3-A603-BF47-BB0C-9DB4A86B14A1}" type="datetime1">
               <a:rPr lang="en-US" smtClean="0"/>
-              <a:t>10/23/17</a:t>
+              <a:t>11/20/17</a:t>
             </a:fld>
             <a:endParaRPr lang="en-US" dirty="0"/>
           </a:p>
@@ -7169,7 +7169,7 @@
           <a:p>
             <a:fld id="{C74A8494-43BC-5246-A5F8-7C026E3A2506}" type="datetime1">
               <a:rPr lang="en-US" smtClean="0"/>
-              <a:t>10/23/17</a:t>
+              <a:t>11/20/17</a:t>
             </a:fld>
             <a:endParaRPr lang="en-US" dirty="0"/>
           </a:p>
@@ -7360,7 +7360,7 @@
           <a:p>
             <a:fld id="{565D631E-63D9-2946-A4FB-64ADF73B9F46}" type="datetime1">
               <a:rPr lang="en-US" smtClean="0"/>
-              <a:t>10/23/17</a:t>
+              <a:t>11/20/17</a:t>
             </a:fld>
             <a:endParaRPr lang="en-US" dirty="0"/>
           </a:p>
@@ -7549,7 +7549,7 @@
           <a:p>
             <a:fld id="{D6A24DE9-2A38-9F4F-9441-F5E45DF3B582}" type="datetime1">
               <a:rPr lang="en-US" smtClean="0"/>
-              <a:t>10/23/17</a:t>
+              <a:t>11/20/17</a:t>
             </a:fld>
             <a:endParaRPr lang="en-US" dirty="0"/>
           </a:p>
@@ -7731,7 +7731,7 @@
           <a:p>
             <a:fld id="{14C7FEA5-DE78-1148-84A0-7BFCB44B4D67}" type="datetime1">
               <a:rPr lang="en-US" smtClean="0"/>
-              <a:t>10/23/17</a:t>
+              <a:t>11/20/17</a:t>
             </a:fld>
             <a:endParaRPr lang="en-US"/>
           </a:p>
@@ -8065,7 +8065,7 @@
           <a:p>
             <a:fld id="{8885B798-E31F-EF48-B899-212976AF87DE}" type="datetime1">
               <a:rPr lang="en-US" smtClean="0"/>
-              <a:t>10/23/17</a:t>
+              <a:t>11/20/17</a:t>
             </a:fld>
             <a:endParaRPr lang="en-US" dirty="0"/>
           </a:p>
@@ -8252,7 +8252,7 @@
           <a:p>
             <a:fld id="{BFB05F3F-E948-DD41-9031-1B2AF49AD76C}" type="datetime1">
               <a:rPr lang="en-US" smtClean="0"/>
-              <a:t>10/23/17</a:t>
+              <a:t>11/20/17</a:t>
             </a:fld>
             <a:endParaRPr lang="en-US"/>
           </a:p>
@@ -8472,7 +8472,7 @@
           <a:p>
             <a:fld id="{771A8861-859A-A949-A7D3-0A76732EE9EB}" type="datetime1">
               <a:rPr lang="en-US" smtClean="0"/>
-              <a:t>10/23/17</a:t>
+              <a:t>11/20/17</a:t>
             </a:fld>
             <a:endParaRPr lang="en-US" dirty="0"/>
           </a:p>
@@ -8629,7 +8629,7 @@
             <a:pPr lvl="1"/>
             <a:r>
               <a:rPr lang="en-US" dirty="0" smtClean="0"/>
-              <a:t>Script or code editing, minor compiling</a:t>
+              <a:t>Script or code editing</a:t>
             </a:r>
           </a:p>
           <a:p>
@@ -8691,7 +8691,7 @@
           <a:p>
             <a:fld id="{D5EAB504-1A42-5949-AE07-2AC2FB9C6C54}" type="datetime1">
               <a:rPr lang="en-US" smtClean="0"/>
-              <a:t>10/23/17</a:t>
+              <a:t>11/20/17</a:t>
             </a:fld>
             <a:endParaRPr lang="en-US" dirty="0"/>
           </a:p>
@@ -8928,7 +8928,7 @@
           <a:p>
             <a:fld id="{79168923-96D4-8249-9655-376DD4AC8146}" type="datetime1">
               <a:rPr lang="en-US" smtClean="0"/>
-              <a:t>10/23/17</a:t>
+              <a:t>11/20/17</a:t>
             </a:fld>
             <a:endParaRPr lang="en-US"/>
           </a:p>
@@ -9431,7 +9431,7 @@
           <a:p>
             <a:fld id="{F92F4056-9118-9A49-8EA1-59B389654B04}" type="datetime1">
               <a:rPr lang="en-US" smtClean="0"/>
-              <a:t>10/23/17</a:t>
+              <a:t>11/20/17</a:t>
             </a:fld>
             <a:endParaRPr lang="en-US"/>
           </a:p>
@@ -9659,7 +9659,7 @@
           <a:p>
             <a:fld id="{6A2AF87B-5DE4-7242-B926-81C627D286DE}" type="datetime1">
               <a:rPr lang="en-US" smtClean="0"/>
-              <a:t>10/23/17</a:t>
+              <a:t>11/20/17</a:t>
             </a:fld>
             <a:endParaRPr lang="en-US"/>
           </a:p>
@@ -9864,7 +9864,7 @@
           <a:p>
             <a:fld id="{C409689E-59C4-3149-BC30-04475534628F}" type="datetime1">
               <a:rPr lang="en-US" smtClean="0"/>
-              <a:t>10/23/17</a:t>
+              <a:t>11/20/17</a:t>
             </a:fld>
             <a:endParaRPr lang="en-US"/>
           </a:p>
@@ -10074,7 +10074,7 @@
           <a:p>
             <a:fld id="{A4F0CB77-59E8-AA4B-8AF0-F960A2371B83}" type="datetime1">
               <a:rPr lang="en-US" smtClean="0"/>
-              <a:t>10/23/17</a:t>
+              <a:t>11/20/17</a:t>
             </a:fld>
             <a:endParaRPr lang="en-US"/>
           </a:p>
@@ -10367,7 +10367,7 @@
           <a:p>
             <a:fld id="{2CB1BB01-A22C-0E44-AE14-9BA42F328388}" type="datetime1">
               <a:rPr lang="en-US" smtClean="0"/>
-              <a:t>10/23/17</a:t>
+              <a:t>11/20/17</a:t>
             </a:fld>
             <a:endParaRPr lang="en-US" dirty="0"/>
           </a:p>
@@ -10502,7 +10502,7 @@
           <a:p>
             <a:fld id="{EF2E92D6-81C2-2349-8DFB-1F1A7DD82F92}" type="datetime1">
               <a:rPr lang="en-US" smtClean="0"/>
-              <a:t>10/23/17</a:t>
+              <a:t>11/20/17</a:t>
             </a:fld>
             <a:endParaRPr lang="en-US"/>
           </a:p>
@@ -10705,7 +10705,7 @@
           <a:p>
             <a:fld id="{8C1A9D32-265E-194F-AF93-71B2043231E0}" type="datetime1">
               <a:rPr lang="en-US" smtClean="0"/>
-              <a:t>10/23/17</a:t>
+              <a:t>11/20/17</a:t>
             </a:fld>
             <a:endParaRPr lang="en-US"/>
           </a:p>
@@ -10931,7 +10931,7 @@
           <a:p>
             <a:fld id="{4ACF55D2-6E15-324D-A853-3288224DF348}" type="datetime1">
               <a:rPr lang="en-US" smtClean="0"/>
-              <a:t>10/23/17</a:t>
+              <a:t>11/20/17</a:t>
             </a:fld>
             <a:endParaRPr lang="en-US" dirty="0"/>
           </a:p>
@@ -11148,7 +11148,7 @@
           <a:p>
             <a:fld id="{2BF9B4AA-B499-8C4E-9B8E-811BDC42AB72}" type="datetime1">
               <a:rPr lang="en-US" smtClean="0"/>
-              <a:t>10/23/17</a:t>
+              <a:t>11/20/17</a:t>
             </a:fld>
             <a:endParaRPr lang="en-US"/>
           </a:p>
@@ -11373,7 +11373,7 @@
           <a:p>
             <a:fld id="{09667844-52C5-454C-91DA-DA641038CED4}" type="datetime1">
               <a:rPr lang="en-US" smtClean="0"/>
-              <a:t>10/23/17</a:t>
+              <a:t>11/20/17</a:t>
             </a:fld>
             <a:endParaRPr lang="en-US"/>
           </a:p>
@@ -11502,7 +11502,7 @@
           <a:p>
             <a:fld id="{D20DA3BF-08CB-8A4B-9523-EAB60681977A}" type="datetime1">
               <a:rPr lang="en-US" smtClean="0"/>
-              <a:t>10/23/17</a:t>
+              <a:t>11/20/17</a:t>
             </a:fld>
             <a:endParaRPr lang="en-US"/>
           </a:p>
@@ -13447,7 +13447,7 @@
           <a:p>
             <a:fld id="{A3C9C1BB-C1E4-004E-B76B-8C60A87CB160}" type="datetime1">
               <a:rPr lang="en-US" smtClean="0"/>
-              <a:t>10/23/17</a:t>
+              <a:t>11/20/17</a:t>
             </a:fld>
             <a:endParaRPr lang="en-US"/>
           </a:p>
@@ -15627,7 +15627,7 @@
           <a:p>
             <a:fld id="{D7C17083-DB9E-DF40-9FF1-3C3BBD3126F3}" type="datetime1">
               <a:rPr lang="en-US" smtClean="0"/>
-              <a:t>10/23/17</a:t>
+              <a:t>11/20/17</a:t>
             </a:fld>
             <a:endParaRPr lang="en-US" dirty="0"/>
           </a:p>
@@ -16148,7 +16148,7 @@
           <a:p>
             <a:fld id="{F1062F58-FDE1-BA4D-BB8C-2264A72B5428}" type="datetime1">
               <a:rPr lang="en-US" smtClean="0"/>
-              <a:t>10/23/17</a:t>
+              <a:t>11/20/17</a:t>
             </a:fld>
             <a:endParaRPr lang="en-US" dirty="0"/>
           </a:p>
@@ -16441,7 +16441,7 @@
           <a:p>
             <a:fld id="{57D010C4-F61A-344B-ACB4-6FFCD098ACFF}" type="datetime1">
               <a:rPr lang="en-US" smtClean="0"/>
-              <a:t>10/23/17</a:t>
+              <a:t>11/20/17</a:t>
             </a:fld>
             <a:endParaRPr lang="en-US"/>
           </a:p>
@@ -16677,7 +16677,7 @@
           <a:p>
             <a:fld id="{36D94695-4FE4-B74D-9FEF-603C469ABA33}" type="datetime1">
               <a:rPr lang="en-US" smtClean="0"/>
-              <a:t>10/23/17</a:t>
+              <a:t>11/20/17</a:t>
             </a:fld>
             <a:endParaRPr lang="en-US"/>
           </a:p>
@@ -16930,7 +16930,7 @@
           <a:p>
             <a:fld id="{A2DD7857-83C0-944C-808D-7EBD666BA1C5}" type="datetime1">
               <a:rPr lang="en-US" smtClean="0"/>
-              <a:t>10/23/17</a:t>
+              <a:t>11/20/17</a:t>
             </a:fld>
             <a:endParaRPr lang="en-US"/>
           </a:p>
@@ -17065,7 +17065,7 @@
           <a:p>
             <a:fld id="{D0F1EC55-3BF6-B94A-A8A8-ECF9B2E6E6A5}" type="datetime1">
               <a:rPr lang="en-US" smtClean="0"/>
-              <a:t>10/23/17</a:t>
+              <a:t>11/20/17</a:t>
             </a:fld>
             <a:endParaRPr lang="en-US" dirty="0"/>
           </a:p>
@@ -17292,25 +17292,6 @@
               <a:buFont typeface="+mj-lt"/>
               <a:buAutoNum type="arabicPeriod"/>
             </a:pPr>
-            <a:r>
-              <a:rPr lang="en-US" dirty="0" smtClean="0"/>
-              <a:t>Use the </a:t>
-            </a:r>
-            <a:r>
-              <a:rPr lang="en-US" dirty="0" err="1" smtClean="0"/>
-              <a:t>new_user</a:t>
-            </a:r>
-            <a:r>
-              <a:rPr lang="en-US" dirty="0" smtClean="0"/>
-              <a:t> reservation</a:t>
-            </a:r>
-          </a:p>
-          <a:p>
-            <a:pPr lvl="1"/>
-            <a:r>
-              <a:rPr lang="en-US" dirty="0" smtClean="0"/>
-              <a:t>This is only for this workshop</a:t>
-            </a:r>
             <a:endParaRPr lang="en-US" dirty="0"/>
           </a:p>
           <a:p>
@@ -17345,7 +17326,7 @@
           <a:p>
             <a:fld id="{50F15D87-D865-834D-8095-85B47E5D857D}" type="datetime1">
               <a:rPr lang="en-US" smtClean="0"/>
-              <a:t>10/23/17</a:t>
+              <a:t>11/20/17</a:t>
             </a:fld>
             <a:endParaRPr lang="en-US"/>
           </a:p>
@@ -17561,7 +17542,7 @@
           <a:p>
             <a:fld id="{157FD4B1-436B-5B42-B797-4F45D1B6B6A9}" type="datetime1">
               <a:rPr lang="en-US" smtClean="0"/>
-              <a:t>10/23/17</a:t>
+              <a:t>11/20/17</a:t>
             </a:fld>
             <a:endParaRPr lang="en-US" dirty="0"/>
           </a:p>
@@ -18053,7 +18034,7 @@
           <a:p>
             <a:fld id="{9650BA27-C1AA-FC4E-A90D-29775570A7B1}" type="datetime1">
               <a:rPr lang="en-US" smtClean="0"/>
-              <a:t>10/23/17</a:t>
+              <a:t>11/20/17</a:t>
             </a:fld>
             <a:endParaRPr lang="en-US"/>
           </a:p>
@@ -18368,7 +18349,7 @@
           <a:p>
             <a:fld id="{F595C32F-4FDD-1845-9DAD-BF783B30F4EA}" type="datetime1">
               <a:rPr lang="en-US" smtClean="0"/>
-              <a:t>10/23/17</a:t>
+              <a:t>11/20/17</a:t>
             </a:fld>
             <a:endParaRPr lang="en-US"/>
           </a:p>
@@ -18704,7 +18685,7 @@
           <a:p>
             <a:fld id="{7A593D67-D80B-D341-95C2-D8FD019BB686}" type="datetime1">
               <a:rPr lang="en-US" smtClean="0"/>
-              <a:t>10/23/17</a:t>
+              <a:t>11/20/17</a:t>
             </a:fld>
             <a:endParaRPr lang="en-US" dirty="0"/>
           </a:p>
@@ -19030,7 +19011,7 @@
           <a:p>
             <a:fld id="{26A447B6-DA76-2941-9271-7615FCF773C3}" type="datetime1">
               <a:rPr lang="en-US" smtClean="0"/>
-              <a:t>10/23/17</a:t>
+              <a:t>11/20/17</a:t>
             </a:fld>
             <a:endParaRPr lang="en-US"/>
           </a:p>
@@ -19330,11 +19311,7 @@
             <a:pPr lvl="1"/>
             <a:r>
               <a:rPr lang="en-US" dirty="0" smtClean="0"/>
-              <a:t>Hint:  Requires two SBATCH options to do this – see link at top of this </a:t>
-            </a:r>
-            <a:r>
-              <a:rPr lang="en-US" dirty="0" smtClean="0"/>
-              <a:t>slide</a:t>
+              <a:t>Hint:  Requires two SBATCH options to do this – see link at top of this slide</a:t>
             </a:r>
             <a:endParaRPr lang="en-US" dirty="0"/>
           </a:p>
@@ -19370,7 +19347,7 @@
           <a:p>
             <a:fld id="{38B2C89D-A2C7-BC4F-80C2-CF46C745D9C4}" type="datetime1">
               <a:rPr lang="en-US" smtClean="0"/>
-              <a:t>10/23/17</a:t>
+              <a:t>11/20/17</a:t>
             </a:fld>
             <a:endParaRPr lang="en-US"/>
           </a:p>
@@ -19962,7 +19939,7 @@
           <a:p>
             <a:fld id="{EBDED0D2-C1DA-5148-BCD1-FD0E375E4368}" type="datetime1">
               <a:rPr lang="en-US" smtClean="0"/>
-              <a:t>10/23/17</a:t>
+              <a:t>11/20/17</a:t>
             </a:fld>
             <a:endParaRPr lang="en-US"/>
           </a:p>
@@ -20105,7 +20082,15 @@
           <a:p>
             <a:r>
               <a:rPr lang="en-US" dirty="0" smtClean="0"/>
-              <a:t>We will run the batch script </a:t>
+              <a:t>We will run </a:t>
+            </a:r>
+            <a:r>
+              <a:rPr lang="en-US" smtClean="0"/>
+              <a:t>the bash </a:t>
+            </a:r>
+            <a:r>
+              <a:rPr lang="en-US" dirty="0" smtClean="0"/>
+              <a:t>script </a:t>
             </a:r>
             <a:r>
               <a:rPr lang="en-US" dirty="0" err="1" smtClean="0"/>
@@ -20146,7 +20131,7 @@
           <a:p>
             <a:fld id="{58476822-42A8-164F-A773-7C6D2A6A81DB}" type="datetime1">
               <a:rPr lang="en-US" smtClean="0"/>
-              <a:t>10/23/17</a:t>
+              <a:t>11/20/17</a:t>
             </a:fld>
             <a:endParaRPr lang="en-US" dirty="0"/>
           </a:p>
@@ -20399,7 +20384,7 @@
           <a:p>
             <a:fld id="{743333A5-8F5B-BA46-B1A8-D091CAAF002B}" type="datetime1">
               <a:rPr lang="en-US" smtClean="0"/>
-              <a:t>10/23/17</a:t>
+              <a:t>11/20/17</a:t>
             </a:fld>
             <a:endParaRPr lang="en-US"/>
           </a:p>
@@ -21041,7 +21026,7 @@
           <a:p>
             <a:fld id="{AE89C334-26D2-F346-A763-FB59B0897930}" type="datetime1">
               <a:rPr lang="en-US" smtClean="0"/>
-              <a:t>10/23/17</a:t>
+              <a:t>11/20/17</a:t>
             </a:fld>
             <a:endParaRPr lang="en-US"/>
           </a:p>
@@ -21326,7 +21311,7 @@
                 <a:ea typeface="Courier New" charset="0"/>
                 <a:cs typeface="Courier New" charset="0"/>
               </a:rPr>
-              <a:t>R_code.sh</a:t>
+              <a:t>R_program.R</a:t>
             </a:r>
             <a:endParaRPr lang="en-US" dirty="0" smtClean="0">
               <a:latin typeface="Courier New" charset="0"/>
@@ -21413,11 +21398,7 @@
             </a:pPr>
             <a:r>
               <a:rPr lang="en-US" dirty="0" smtClean="0"/>
-              <a:t>Don’t </a:t>
-            </a:r>
-            <a:r>
-              <a:rPr lang="en-US" dirty="0" smtClean="0"/>
-              <a:t>forget to load the R module!  </a:t>
+              <a:t>Don’t forget to load the R module!  </a:t>
             </a:r>
             <a:endParaRPr lang="en-US" dirty="0"/>
           </a:p>
@@ -21453,7 +21434,7 @@
           <a:p>
             <a:fld id="{0E391325-9FAD-3B48-ABBB-A2878079FE51}" type="datetime1">
               <a:rPr lang="en-US" smtClean="0"/>
-              <a:t>10/23/17</a:t>
+              <a:t>11/20/17</a:t>
             </a:fld>
             <a:endParaRPr lang="en-US"/>
           </a:p>
@@ -21688,7 +21669,7 @@
           <a:p>
             <a:fld id="{406683BE-7CE6-C246-A895-91EACBC36081}" type="datetime1">
               <a:rPr lang="en-US" smtClean="0"/>
-              <a:t>10/23/17</a:t>
+              <a:t>11/20/17</a:t>
             </a:fld>
             <a:endParaRPr lang="en-US" dirty="0"/>
           </a:p>
@@ -22197,7 +22178,7 @@
           <a:p>
             <a:fld id="{C4F2F9E0-2BB7-644A-A8C2-4F89A10BA621}" type="datetime1">
               <a:rPr lang="en-US" smtClean="0"/>
-              <a:t>10/23/17</a:t>
+              <a:t>11/20/17</a:t>
             </a:fld>
             <a:endParaRPr lang="en-US"/>
           </a:p>
@@ -22454,7 +22435,7 @@
           <a:p>
             <a:fld id="{9890B64F-BD66-014F-8385-76577B03EE8A}" type="datetime1">
               <a:rPr lang="en-US" smtClean="0"/>
-              <a:t>10/23/17</a:t>
+              <a:t>11/20/17</a:t>
             </a:fld>
             <a:endParaRPr lang="en-US"/>
           </a:p>
@@ -22637,7 +22618,7 @@
           <a:p>
             <a:fld id="{24EAC218-805B-5942-9D1C-1CAF707EFBDF}" type="datetime1">
               <a:rPr lang="en-US" smtClean="0"/>
-              <a:t>10/23/17</a:t>
+              <a:t>11/20/17</a:t>
             </a:fld>
             <a:endParaRPr lang="en-US" dirty="0"/>
           </a:p>
@@ -22953,7 +22934,7 @@
           <a:p>
             <a:fld id="{E12727D1-4C82-404C-B300-E3C9ED3E7415}" type="datetime1">
               <a:rPr lang="en-US" smtClean="0"/>
-              <a:t>10/23/17</a:t>
+              <a:t>11/20/17</a:t>
             </a:fld>
             <a:endParaRPr lang="en-US" dirty="0"/>
           </a:p>
@@ -23169,7 +23150,47 @@
               </a:rPr>
               <a:t> </a:t>
             </a:r>
-            <a:endParaRPr lang="en-US" sz="2200" smtClean="0">
+            <a:r>
+              <a:rPr lang="en-US" sz="2200" smtClean="0">
+                <a:latin typeface="Courier" charset="0"/>
+                <a:ea typeface="Courier" charset="0"/>
+                <a:cs typeface="Courier" charset="0"/>
+              </a:rPr>
+              <a:t>--</a:t>
+            </a:r>
+            <a:r>
+              <a:rPr lang="en-US" sz="2200" smtClean="0">
+                <a:latin typeface="Courier" charset="0"/>
+                <a:ea typeface="Courier" charset="0"/>
+                <a:cs typeface="Courier" charset="0"/>
+              </a:rPr>
+              <a:t>qos</a:t>
+            </a:r>
+            <a:r>
+              <a:rPr lang="en-US" sz="2200" dirty="0" smtClean="0">
+                <a:latin typeface="Courier" charset="0"/>
+                <a:ea typeface="Courier" charset="0"/>
+                <a:cs typeface="Courier" charset="0"/>
+              </a:rPr>
+              <a:t>=debug </a:t>
+            </a:r>
+            <a:r>
+              <a:rPr lang="en-US" sz="2200" dirty="0" smtClean="0">
+                <a:latin typeface="Courier" charset="0"/>
+                <a:ea typeface="Courier" charset="0"/>
+                <a:cs typeface="Courier" charset="0"/>
+              </a:rPr>
+              <a:t>--</a:t>
+            </a:r>
+            <a:r>
+              <a:rPr lang="en-US" sz="2200" dirty="0" smtClean="0">
+                <a:latin typeface="Courier" charset="0"/>
+                <a:ea typeface="Courier" charset="0"/>
+                <a:cs typeface="Courier" charset="0"/>
+              </a:rPr>
+              <a:t>time=00:05:00</a:t>
+            </a:r>
+            <a:endParaRPr lang="en-US" sz="2200" dirty="0" smtClean="0">
               <a:latin typeface="Courier" charset="0"/>
               <a:ea typeface="Courier" charset="0"/>
               <a:cs typeface="Courier" charset="0"/>
@@ -23180,12 +23201,8 @@
               <a:buNone/>
             </a:pPr>
             <a:r>
-              <a:rPr lang="en-US" smtClean="0"/>
-              <a:t>Once </a:t>
-            </a:r>
-            <a:r>
-              <a:rPr lang="en-US" dirty="0" smtClean="0"/>
-              <a:t>we receive a prompt, then:</a:t>
+              <a:rPr lang="en-US" dirty="0" smtClean="0"/>
+              <a:t>Once we receive a prompt, then:</a:t>
             </a:r>
           </a:p>
           <a:p>
@@ -23280,7 +23297,7 @@
           <a:p>
             <a:fld id="{F21DF42F-4BC7-1E4D-B4C7-33A7E30F56D4}" type="datetime1">
               <a:rPr lang="en-US" smtClean="0"/>
-              <a:t>10/23/17</a:t>
+              <a:t>11/20/17</a:t>
             </a:fld>
             <a:endParaRPr lang="en-US" dirty="0"/>
           </a:p>
@@ -23510,7 +23527,7 @@
           <a:p>
             <a:fld id="{F176B5BB-6C1E-4446-A4B5-BF7D661481E8}" type="datetime1">
               <a:rPr lang="en-US" smtClean="0"/>
-              <a:t>10/23/17</a:t>
+              <a:t>11/20/17</a:t>
             </a:fld>
             <a:endParaRPr lang="en-US" dirty="0"/>
           </a:p>
@@ -23712,7 +23729,7 @@
           <a:p>
             <a:fld id="{2C3A7136-6CD9-1F44-BF87-1F02B022DD38}" type="datetime1">
               <a:rPr lang="en-US" smtClean="0"/>
-              <a:t>10/23/17</a:t>
+              <a:t>11/20/17</a:t>
             </a:fld>
             <a:endParaRPr lang="en-US"/>
           </a:p>
@@ -23940,7 +23957,7 @@
           <a:p>
             <a:fld id="{DD60739B-9381-D348-A54C-084428A1CE83}" type="datetime1">
               <a:rPr lang="en-US" smtClean="0"/>
-              <a:t>10/23/17</a:t>
+              <a:t>11/20/17</a:t>
             </a:fld>
             <a:endParaRPr lang="en-US"/>
           </a:p>
@@ -24206,7 +24223,7 @@
           <a:p>
             <a:fld id="{E4C2F9E9-0335-9F43-85CD-6D5AFF0B589E}" type="datetime1">
               <a:rPr lang="en-US" smtClean="0"/>
-              <a:t>10/23/17</a:t>
+              <a:t>11/20/17</a:t>
             </a:fld>
             <a:endParaRPr lang="en-US"/>
           </a:p>
@@ -24405,7 +24422,7 @@
           <a:p>
             <a:fld id="{CE5BD4CA-09B4-E54C-901B-62D7687F59E7}" type="datetime1">
               <a:rPr lang="en-US" smtClean="0"/>
-              <a:t>10/23/17</a:t>
+              <a:t>11/20/17</a:t>
             </a:fld>
             <a:endParaRPr lang="en-US"/>
           </a:p>

</xml_diff>

<commit_message>
Added info on blanca qos
</commit_message>
<xml_diff>
--- a/rc_new_user_seminar_2017.pptx
+++ b/rc_new_user_seminar_2017.pptx
@@ -251,7 +251,7 @@
           <a:p>
             <a:fld id="{C649942D-A542-EE42-A1CF-1E4FFF53ED67}" type="datetimeFigureOut">
               <a:rPr lang="en-US" smtClean="0"/>
-              <a:t>11/20/17</a:t>
+              <a:t>12/7/17</a:t>
             </a:fld>
             <a:endParaRPr lang="en-US"/>
           </a:p>
@@ -1492,14 +1492,14 @@
               <ma14:placeholderFlag xmlns:ma14="http://schemas.microsoft.com/office/mac/drawingml/2011/main" val="1"/>
             </a:ext>
             <a:ext uri="{909E8E84-426E-40dd-AFC4-6F175D3DCCD1}">
-              <a14:hiddenFill xmlns:a14="http://schemas.microsoft.com/office/drawing/2010/main" xmlns="">
+              <a14:hiddenFill xmlns="" xmlns:a14="http://schemas.microsoft.com/office/drawing/2010/main">
                 <a:solidFill>
                   <a:srgbClr val="FFFFFF"/>
                 </a:solidFill>
               </a14:hiddenFill>
             </a:ext>
             <a:ext uri="{91240B29-F687-4f45-9708-019B960494DF}">
-              <a14:hiddenLine xmlns:a14="http://schemas.microsoft.com/office/drawing/2010/main" xmlns="" w="9525">
+              <a14:hiddenLine xmlns="" xmlns:a14="http://schemas.microsoft.com/office/drawing/2010/main" w="9525">
                 <a:solidFill>
                   <a:srgbClr val="000000"/>
                 </a:solidFill>
@@ -1537,14 +1537,14 @@
           <a:ln/>
           <a:extLst>
             <a:ext uri="{909E8E84-426E-40dd-AFC4-6F175D3DCCD1}">
-              <a14:hiddenFill xmlns:a14="http://schemas.microsoft.com/office/drawing/2010/main" xmlns="">
+              <a14:hiddenFill xmlns="" xmlns:a14="http://schemas.microsoft.com/office/drawing/2010/main">
                 <a:solidFill>
                   <a:srgbClr val="FFFFFF"/>
                 </a:solidFill>
               </a14:hiddenFill>
             </a:ext>
             <a:ext uri="{91240B29-F687-4f45-9708-019B960494DF}">
-              <a14:hiddenLine xmlns:a14="http://schemas.microsoft.com/office/drawing/2010/main" xmlns="" w="9525">
+              <a14:hiddenLine xmlns="" xmlns:a14="http://schemas.microsoft.com/office/drawing/2010/main" w="9525">
                 <a:solidFill>
                   <a:srgbClr val="000000"/>
                 </a:solidFill>
@@ -2581,7 +2581,7 @@
           <a:p>
             <a:fld id="{ECD68DE7-8E14-F140-9BF8-7DF505A7EC71}" type="datetime1">
               <a:rPr lang="en-US" smtClean="0"/>
-              <a:t>11/20/17</a:t>
+              <a:t>12/7/17</a:t>
             </a:fld>
             <a:endParaRPr lang="en-US"/>
           </a:p>
@@ -2771,7 +2771,7 @@
           <a:p>
             <a:fld id="{1D9E6949-9996-6743-8CFF-FA3A56E13506}" type="datetime1">
               <a:rPr lang="en-US" smtClean="0"/>
-              <a:t>11/20/17</a:t>
+              <a:t>12/7/17</a:t>
             </a:fld>
             <a:endParaRPr lang="en-US"/>
           </a:p>
@@ -2971,7 +2971,7 @@
           <a:p>
             <a:fld id="{B889D5DF-D410-3845-BB2F-EEB43AAD8F50}" type="datetime1">
               <a:rPr lang="en-US" smtClean="0"/>
-              <a:t>11/20/17</a:t>
+              <a:t>12/7/17</a:t>
             </a:fld>
             <a:endParaRPr lang="en-US"/>
           </a:p>
@@ -3258,7 +3258,7 @@
           <a:p>
             <a:fld id="{150E7F26-8C30-8C48-992C-4605BCF373C1}" type="datetime1">
               <a:rPr lang="en-US" smtClean="0"/>
-              <a:t>11/20/17</a:t>
+              <a:t>12/7/17</a:t>
             </a:fld>
             <a:endParaRPr lang="en-US"/>
           </a:p>
@@ -3428,7 +3428,7 @@
           <a:p>
             <a:fld id="{043D7B85-D040-214F-9303-7FDDADF77F95}" type="datetime1">
               <a:rPr lang="en-US" smtClean="0"/>
-              <a:t>11/20/17</a:t>
+              <a:t>12/7/17</a:t>
             </a:fld>
             <a:endParaRPr lang="en-US"/>
           </a:p>
@@ -3694,7 +3694,7 @@
           <a:p>
             <a:fld id="{77B1075F-B81A-5940-A68D-45596C356335}" type="datetime1">
               <a:rPr lang="en-US" smtClean="0"/>
-              <a:t>11/20/17</a:t>
+              <a:t>12/7/17</a:t>
             </a:fld>
             <a:endParaRPr lang="en-US"/>
           </a:p>
@@ -4002,7 +4002,7 @@
           <a:p>
             <a:fld id="{39113FC0-C6F8-6E40-8D7A-F2A1A22961FE}" type="datetime1">
               <a:rPr lang="en-US" smtClean="0"/>
-              <a:t>11/20/17</a:t>
+              <a:t>12/7/17</a:t>
             </a:fld>
             <a:endParaRPr lang="en-US"/>
           </a:p>
@@ -4456,7 +4456,7 @@
           <a:p>
             <a:fld id="{37F32D73-5A99-464A-8594-B551FF72C9D9}" type="datetime1">
               <a:rPr lang="en-US" smtClean="0"/>
-              <a:t>11/20/17</a:t>
+              <a:t>12/7/17</a:t>
             </a:fld>
             <a:endParaRPr lang="en-US"/>
           </a:p>
@@ -4594,7 +4594,7 @@
           <a:p>
             <a:fld id="{E82BF7D7-27C3-CF45-B820-FC005A5F8688}" type="datetime1">
               <a:rPr lang="en-US" smtClean="0"/>
-              <a:t>11/20/17</a:t>
+              <a:t>12/7/17</a:t>
             </a:fld>
             <a:endParaRPr lang="en-US"/>
           </a:p>
@@ -4709,7 +4709,7 @@
           <a:p>
             <a:fld id="{9555053E-C274-C74C-A284-88F22C581203}" type="datetime1">
               <a:rPr lang="en-US" smtClean="0"/>
-              <a:t>11/20/17</a:t>
+              <a:t>12/7/17</a:t>
             </a:fld>
             <a:endParaRPr lang="en-US"/>
           </a:p>
@@ -4923,7 +4923,7 @@
           <a:p>
             <a:fld id="{7A689FF8-7D69-1D41-AF80-D980840BCB23}" type="datetime1">
               <a:rPr lang="en-US" smtClean="0"/>
-              <a:t>11/20/17</a:t>
+              <a:t>12/7/17</a:t>
             </a:fld>
             <a:endParaRPr lang="en-US"/>
           </a:p>
@@ -5266,7 +5266,7 @@
           <a:p>
             <a:fld id="{B2055EBF-49EC-E44B-96CA-4F8E3FBF2465}" type="datetime1">
               <a:rPr lang="en-US" smtClean="0"/>
-              <a:t>11/20/17</a:t>
+              <a:t>12/7/17</a:t>
             </a:fld>
             <a:endParaRPr lang="en-US"/>
           </a:p>
@@ -5629,7 +5629,7 @@
           <a:p>
             <a:fld id="{96D7D345-C39C-A44C-AF4E-9524445B1337}" type="datetime1">
               <a:rPr lang="en-US" smtClean="0"/>
-              <a:t>11/20/17</a:t>
+              <a:t>12/7/17</a:t>
             </a:fld>
             <a:endParaRPr lang="en-US"/>
           </a:p>
@@ -6222,7 +6222,7 @@
           <a:p>
             <a:fld id="{BD3E17D7-4415-0A45-8086-1E9B50478751}" type="datetime1">
               <a:rPr lang="en-US" smtClean="0"/>
-              <a:t>11/20/17</a:t>
+              <a:t>12/7/17</a:t>
             </a:fld>
             <a:endParaRPr lang="en-US" dirty="0"/>
           </a:p>
@@ -6404,7 +6404,7 @@
           <a:p>
             <a:fld id="{4676C52D-A00D-2248-AAC1-94BD55906AAC}" type="datetime1">
               <a:rPr lang="en-US" smtClean="0"/>
-              <a:t>11/20/17</a:t>
+              <a:t>12/7/17</a:t>
             </a:fld>
             <a:endParaRPr lang="en-US"/>
           </a:p>
@@ -6594,7 +6594,7 @@
           <a:p>
             <a:fld id="{446EC888-7CFD-C641-9F44-9678633359F5}" type="datetime1">
               <a:rPr lang="en-US" smtClean="0"/>
-              <a:t>11/20/17</a:t>
+              <a:t>12/7/17</a:t>
             </a:fld>
             <a:endParaRPr lang="en-US"/>
           </a:p>
@@ -6785,7 +6785,7 @@
           <a:p>
             <a:fld id="{9DCF056C-E28A-E84B-82B5-F09CA8CCF7AA}" type="datetime1">
               <a:rPr lang="en-US" smtClean="0"/>
-              <a:t>11/20/17</a:t>
+              <a:t>12/7/17</a:t>
             </a:fld>
             <a:endParaRPr lang="en-US" dirty="0"/>
           </a:p>
@@ -6986,7 +6986,7 @@
           <a:p>
             <a:fld id="{F20BFDB3-A603-BF47-BB0C-9DB4A86B14A1}" type="datetime1">
               <a:rPr lang="en-US" smtClean="0"/>
-              <a:t>11/20/17</a:t>
+              <a:t>12/7/17</a:t>
             </a:fld>
             <a:endParaRPr lang="en-US" dirty="0"/>
           </a:p>
@@ -7169,7 +7169,7 @@
           <a:p>
             <a:fld id="{C74A8494-43BC-5246-A5F8-7C026E3A2506}" type="datetime1">
               <a:rPr lang="en-US" smtClean="0"/>
-              <a:t>11/20/17</a:t>
+              <a:t>12/7/17</a:t>
             </a:fld>
             <a:endParaRPr lang="en-US" dirty="0"/>
           </a:p>
@@ -7360,7 +7360,7 @@
           <a:p>
             <a:fld id="{565D631E-63D9-2946-A4FB-64ADF73B9F46}" type="datetime1">
               <a:rPr lang="en-US" smtClean="0"/>
-              <a:t>11/20/17</a:t>
+              <a:t>12/7/17</a:t>
             </a:fld>
             <a:endParaRPr lang="en-US" dirty="0"/>
           </a:p>
@@ -7549,7 +7549,7 @@
           <a:p>
             <a:fld id="{D6A24DE9-2A38-9F4F-9441-F5E45DF3B582}" type="datetime1">
               <a:rPr lang="en-US" smtClean="0"/>
-              <a:t>11/20/17</a:t>
+              <a:t>12/7/17</a:t>
             </a:fld>
             <a:endParaRPr lang="en-US" dirty="0"/>
           </a:p>
@@ -7731,7 +7731,7 @@
           <a:p>
             <a:fld id="{14C7FEA5-DE78-1148-84A0-7BFCB44B4D67}" type="datetime1">
               <a:rPr lang="en-US" smtClean="0"/>
-              <a:t>11/20/17</a:t>
+              <a:t>12/7/17</a:t>
             </a:fld>
             <a:endParaRPr lang="en-US"/>
           </a:p>
@@ -8065,7 +8065,7 @@
           <a:p>
             <a:fld id="{8885B798-E31F-EF48-B899-212976AF87DE}" type="datetime1">
               <a:rPr lang="en-US" smtClean="0"/>
-              <a:t>11/20/17</a:t>
+              <a:t>12/7/17</a:t>
             </a:fld>
             <a:endParaRPr lang="en-US" dirty="0"/>
           </a:p>
@@ -8252,7 +8252,7 @@
           <a:p>
             <a:fld id="{BFB05F3F-E948-DD41-9031-1B2AF49AD76C}" type="datetime1">
               <a:rPr lang="en-US" smtClean="0"/>
-              <a:t>11/20/17</a:t>
+              <a:t>12/7/17</a:t>
             </a:fld>
             <a:endParaRPr lang="en-US"/>
           </a:p>
@@ -8472,7 +8472,7 @@
           <a:p>
             <a:fld id="{771A8861-859A-A949-A7D3-0A76732EE9EB}" type="datetime1">
               <a:rPr lang="en-US" smtClean="0"/>
-              <a:t>11/20/17</a:t>
+              <a:t>12/7/17</a:t>
             </a:fld>
             <a:endParaRPr lang="en-US" dirty="0"/>
           </a:p>
@@ -8691,7 +8691,7 @@
           <a:p>
             <a:fld id="{D5EAB504-1A42-5949-AE07-2AC2FB9C6C54}" type="datetime1">
               <a:rPr lang="en-US" smtClean="0"/>
-              <a:t>11/20/17</a:t>
+              <a:t>12/7/17</a:t>
             </a:fld>
             <a:endParaRPr lang="en-US" dirty="0"/>
           </a:p>
@@ -8928,7 +8928,7 @@
           <a:p>
             <a:fld id="{79168923-96D4-8249-9655-376DD4AC8146}" type="datetime1">
               <a:rPr lang="en-US" smtClean="0"/>
-              <a:t>11/20/17</a:t>
+              <a:t>12/7/17</a:t>
             </a:fld>
             <a:endParaRPr lang="en-US"/>
           </a:p>
@@ -9431,7 +9431,7 @@
           <a:p>
             <a:fld id="{F92F4056-9118-9A49-8EA1-59B389654B04}" type="datetime1">
               <a:rPr lang="en-US" smtClean="0"/>
-              <a:t>11/20/17</a:t>
+              <a:t>12/7/17</a:t>
             </a:fld>
             <a:endParaRPr lang="en-US"/>
           </a:p>
@@ -9659,7 +9659,7 @@
           <a:p>
             <a:fld id="{6A2AF87B-5DE4-7242-B926-81C627D286DE}" type="datetime1">
               <a:rPr lang="en-US" smtClean="0"/>
-              <a:t>11/20/17</a:t>
+              <a:t>12/7/17</a:t>
             </a:fld>
             <a:endParaRPr lang="en-US"/>
           </a:p>
@@ -9864,7 +9864,7 @@
           <a:p>
             <a:fld id="{C409689E-59C4-3149-BC30-04475534628F}" type="datetime1">
               <a:rPr lang="en-US" smtClean="0"/>
-              <a:t>11/20/17</a:t>
+              <a:t>12/7/17</a:t>
             </a:fld>
             <a:endParaRPr lang="en-US"/>
           </a:p>
@@ -10074,7 +10074,7 @@
           <a:p>
             <a:fld id="{A4F0CB77-59E8-AA4B-8AF0-F960A2371B83}" type="datetime1">
               <a:rPr lang="en-US" smtClean="0"/>
-              <a:t>11/20/17</a:t>
+              <a:t>12/7/17</a:t>
             </a:fld>
             <a:endParaRPr lang="en-US"/>
           </a:p>
@@ -10367,7 +10367,7 @@
           <a:p>
             <a:fld id="{2CB1BB01-A22C-0E44-AE14-9BA42F328388}" type="datetime1">
               <a:rPr lang="en-US" smtClean="0"/>
-              <a:t>11/20/17</a:t>
+              <a:t>12/7/17</a:t>
             </a:fld>
             <a:endParaRPr lang="en-US" dirty="0"/>
           </a:p>
@@ -10502,7 +10502,7 @@
           <a:p>
             <a:fld id="{EF2E92D6-81C2-2349-8DFB-1F1A7DD82F92}" type="datetime1">
               <a:rPr lang="en-US" smtClean="0"/>
-              <a:t>11/20/17</a:t>
+              <a:t>12/7/17</a:t>
             </a:fld>
             <a:endParaRPr lang="en-US"/>
           </a:p>
@@ -10705,7 +10705,7 @@
           <a:p>
             <a:fld id="{8C1A9D32-265E-194F-AF93-71B2043231E0}" type="datetime1">
               <a:rPr lang="en-US" smtClean="0"/>
-              <a:t>11/20/17</a:t>
+              <a:t>12/7/17</a:t>
             </a:fld>
             <a:endParaRPr lang="en-US"/>
           </a:p>
@@ -10931,7 +10931,7 @@
           <a:p>
             <a:fld id="{4ACF55D2-6E15-324D-A853-3288224DF348}" type="datetime1">
               <a:rPr lang="en-US" smtClean="0"/>
-              <a:t>11/20/17</a:t>
+              <a:t>12/7/17</a:t>
             </a:fld>
             <a:endParaRPr lang="en-US" dirty="0"/>
           </a:p>
@@ -11148,7 +11148,7 @@
           <a:p>
             <a:fld id="{2BF9B4AA-B499-8C4E-9B8E-811BDC42AB72}" type="datetime1">
               <a:rPr lang="en-US" smtClean="0"/>
-              <a:t>11/20/17</a:t>
+              <a:t>12/7/17</a:t>
             </a:fld>
             <a:endParaRPr lang="en-US"/>
           </a:p>
@@ -11373,7 +11373,7 @@
           <a:p>
             <a:fld id="{09667844-52C5-454C-91DA-DA641038CED4}" type="datetime1">
               <a:rPr lang="en-US" smtClean="0"/>
-              <a:t>11/20/17</a:t>
+              <a:t>12/7/17</a:t>
             </a:fld>
             <a:endParaRPr lang="en-US"/>
           </a:p>
@@ -11502,7 +11502,7 @@
           <a:p>
             <a:fld id="{D20DA3BF-08CB-8A4B-9523-EAB60681977A}" type="datetime1">
               <a:rPr lang="en-US" smtClean="0"/>
-              <a:t>11/20/17</a:t>
+              <a:t>12/7/17</a:t>
             </a:fld>
             <a:endParaRPr lang="en-US"/>
           </a:p>
@@ -13447,7 +13447,7 @@
           <a:p>
             <a:fld id="{A3C9C1BB-C1E4-004E-B76B-8C60A87CB160}" type="datetime1">
               <a:rPr lang="en-US" smtClean="0"/>
-              <a:t>11/20/17</a:t>
+              <a:t>12/7/17</a:t>
             </a:fld>
             <a:endParaRPr lang="en-US"/>
           </a:p>
@@ -15627,7 +15627,7 @@
           <a:p>
             <a:fld id="{D7C17083-DB9E-DF40-9FF1-3C3BBD3126F3}" type="datetime1">
               <a:rPr lang="en-US" smtClean="0"/>
-              <a:t>11/20/17</a:t>
+              <a:t>12/7/17</a:t>
             </a:fld>
             <a:endParaRPr lang="en-US" dirty="0"/>
           </a:p>
@@ -16148,7 +16148,7 @@
           <a:p>
             <a:fld id="{F1062F58-FDE1-BA4D-BB8C-2264A72B5428}" type="datetime1">
               <a:rPr lang="en-US" smtClean="0"/>
-              <a:t>11/20/17</a:t>
+              <a:t>12/7/17</a:t>
             </a:fld>
             <a:endParaRPr lang="en-US" dirty="0"/>
           </a:p>
@@ -16441,7 +16441,7 @@
           <a:p>
             <a:fld id="{57D010C4-F61A-344B-ACB4-6FFCD098ACFF}" type="datetime1">
               <a:rPr lang="en-US" smtClean="0"/>
-              <a:t>11/20/17</a:t>
+              <a:t>12/7/17</a:t>
             </a:fld>
             <a:endParaRPr lang="en-US"/>
           </a:p>
@@ -16565,7 +16565,9 @@
         </p:nvSpPr>
         <p:spPr/>
         <p:txBody>
-          <a:bodyPr/>
+          <a:bodyPr>
+            <a:normAutofit fontScale="92500" lnSpcReduction="10000"/>
+          </a:bodyPr>
           <a:lstStyle/>
           <a:p>
             <a:r>
@@ -16634,12 +16636,177 @@
               </a:rPr>
               <a:t>blanca</a:t>
             </a:r>
+            <a:endParaRPr lang="en-US" dirty="0" smtClean="0">
+              <a:latin typeface="Courier" charset="0"/>
+              <a:ea typeface="Courier" charset="0"/>
+              <a:cs typeface="Courier" charset="0"/>
+            </a:endParaRPr>
+          </a:p>
+          <a:p>
+            <a:pPr marL="114300" indent="0">
+              <a:buNone/>
+            </a:pPr>
+            <a:endParaRPr lang="en-US" dirty="0">
+              <a:latin typeface="Courier" charset="0"/>
+              <a:ea typeface="Courier" charset="0"/>
+              <a:cs typeface="Courier" charset="0"/>
+            </a:endParaRPr>
+          </a:p>
+          <a:p>
+            <a:pPr marL="114300" indent="0">
+              <a:buNone/>
+            </a:pPr>
+            <a:r>
+              <a:rPr lang="en-US" dirty="0">
+                <a:latin typeface="Courier" charset="0"/>
+                <a:ea typeface="Courier" charset="0"/>
+                <a:cs typeface="Courier" charset="0"/>
+              </a:rPr>
+              <a:t> </a:t>
+            </a:r>
+            <a:r>
+              <a:rPr lang="en-US" dirty="0" smtClean="0">
+                <a:latin typeface="Helvetica Neue" charset="0"/>
+                <a:ea typeface="Helvetica Neue" charset="0"/>
+                <a:cs typeface="Helvetica Neue" charset="0"/>
+              </a:rPr>
+              <a:t>Use</a:t>
+            </a:r>
+            <a:r>
+              <a:rPr lang="en-US" dirty="0" smtClean="0">
+                <a:latin typeface="Courier" charset="0"/>
+                <a:ea typeface="Courier" charset="0"/>
+                <a:cs typeface="Courier" charset="0"/>
+              </a:rPr>
+              <a:t> --</a:t>
+            </a:r>
+            <a:r>
+              <a:rPr lang="en-US" dirty="0" err="1" smtClean="0">
+                <a:latin typeface="Courier" charset="0"/>
+                <a:ea typeface="Courier" charset="0"/>
+                <a:cs typeface="Courier" charset="0"/>
+              </a:rPr>
+              <a:t>qos</a:t>
+            </a:r>
+            <a:r>
+              <a:rPr lang="en-US" dirty="0" smtClean="0">
+                <a:latin typeface="Courier" charset="0"/>
+                <a:ea typeface="Courier" charset="0"/>
+                <a:cs typeface="Courier" charset="0"/>
+              </a:rPr>
+              <a:t>=</a:t>
+            </a:r>
+            <a:r>
+              <a:rPr lang="en-US" dirty="0" err="1" smtClean="0">
+                <a:latin typeface="Courier" charset="0"/>
+                <a:ea typeface="Courier" charset="0"/>
+                <a:cs typeface="Courier" charset="0"/>
+              </a:rPr>
+              <a:t>blanca</a:t>
+            </a:r>
+            <a:r>
+              <a:rPr lang="en-US" dirty="0" smtClean="0">
+                <a:latin typeface="Courier" charset="0"/>
+                <a:ea typeface="Courier" charset="0"/>
+                <a:cs typeface="Courier" charset="0"/>
+              </a:rPr>
+              <a:t>-</a:t>
+            </a:r>
+            <a:r>
+              <a:rPr lang="en-US" smtClean="0">
+                <a:latin typeface="Courier" charset="0"/>
+                <a:ea typeface="Courier" charset="0"/>
+                <a:cs typeface="Courier" charset="0"/>
+              </a:rPr>
+              <a:t>&lt;group-identifier&gt; </a:t>
+            </a:r>
+            <a:r>
+              <a:rPr lang="en-US" dirty="0" smtClean="0">
+                <a:latin typeface="Helvetica Neue" charset="0"/>
+                <a:ea typeface="Helvetica Neue" charset="0"/>
+                <a:cs typeface="Helvetica Neue" charset="0"/>
+              </a:rPr>
+              <a:t>for high priority access</a:t>
+            </a:r>
+          </a:p>
+          <a:p>
+            <a:pPr marL="114300" indent="0">
+              <a:buNone/>
+            </a:pPr>
+            <a:r>
+              <a:rPr lang="en-US" dirty="0" smtClean="0">
+                <a:latin typeface="Courier" charset="0"/>
+                <a:ea typeface="Courier" charset="0"/>
+                <a:cs typeface="Courier" charset="0"/>
+              </a:rPr>
+              <a:t>     </a:t>
+            </a:r>
+            <a:r>
+              <a:rPr lang="en-US" dirty="0" smtClean="0">
+                <a:latin typeface="Courier" charset="0"/>
+                <a:ea typeface="Courier" charset="0"/>
+                <a:cs typeface="Courier" charset="0"/>
+              </a:rPr>
+              <a:t>--</a:t>
+            </a:r>
+            <a:r>
+              <a:rPr lang="en-US" dirty="0" err="1" smtClean="0">
+                <a:latin typeface="Courier" charset="0"/>
+                <a:ea typeface="Courier" charset="0"/>
+                <a:cs typeface="Courier" charset="0"/>
+              </a:rPr>
+              <a:t>q</a:t>
+            </a:r>
+            <a:r>
+              <a:rPr lang="en-US" dirty="0" err="1" smtClean="0">
+                <a:latin typeface="Courier" charset="0"/>
+                <a:ea typeface="Courier" charset="0"/>
+                <a:cs typeface="Courier" charset="0"/>
+              </a:rPr>
+              <a:t>os</a:t>
+            </a:r>
+            <a:r>
+              <a:rPr lang="en-US" dirty="0">
+                <a:latin typeface="Courier" charset="0"/>
+                <a:ea typeface="Courier" charset="0"/>
+                <a:cs typeface="Courier" charset="0"/>
+              </a:rPr>
+              <a:t>=</a:t>
+            </a:r>
+            <a:r>
+              <a:rPr lang="en-US" dirty="0" err="1" smtClean="0">
+                <a:latin typeface="Courier" charset="0"/>
+                <a:ea typeface="Courier" charset="0"/>
+                <a:cs typeface="Courier" charset="0"/>
+              </a:rPr>
+              <a:t>blanca</a:t>
+            </a:r>
+            <a:r>
+              <a:rPr lang="en-US" dirty="0" smtClean="0">
+                <a:latin typeface="Courier" charset="0"/>
+                <a:ea typeface="Courier" charset="0"/>
+                <a:cs typeface="Courier" charset="0"/>
+              </a:rPr>
+              <a:t> </a:t>
+            </a:r>
+            <a:r>
+              <a:rPr lang="en-US" dirty="0" smtClean="0">
+                <a:latin typeface="Helvetica Neue" charset="0"/>
+                <a:ea typeface="Helvetica Neue" charset="0"/>
+                <a:cs typeface="Helvetica Neue" charset="0"/>
+              </a:rPr>
+              <a:t>for low-priority access</a:t>
+            </a:r>
+            <a:endParaRPr lang="en-US" dirty="0" smtClean="0">
+              <a:latin typeface="Helvetica Neue" charset="0"/>
+              <a:ea typeface="Helvetica Neue" charset="0"/>
+              <a:cs typeface="Helvetica Neue" charset="0"/>
+            </a:endParaRPr>
+          </a:p>
+          <a:p>
             <a:endParaRPr lang="en-US" dirty="0" smtClean="0"/>
           </a:p>
           <a:p>
-            <a:endParaRPr lang="en-US" dirty="0" smtClean="0"/>
-          </a:p>
-          <a:p>
             <a:r>
               <a:rPr lang="en-US" dirty="0" smtClean="0"/>
               <a:t>Only certain users have access to Blanca – paid service</a:t>
@@ -16677,7 +16844,7 @@
           <a:p>
             <a:fld id="{36D94695-4FE4-B74D-9FEF-603C469ABA33}" type="datetime1">
               <a:rPr lang="en-US" smtClean="0"/>
-              <a:t>11/20/17</a:t>
+              <a:t>12/7/17</a:t>
             </a:fld>
             <a:endParaRPr lang="en-US"/>
           </a:p>
@@ -16930,7 +17097,7 @@
           <a:p>
             <a:fld id="{A2DD7857-83C0-944C-808D-7EBD666BA1C5}" type="datetime1">
               <a:rPr lang="en-US" smtClean="0"/>
-              <a:t>11/20/17</a:t>
+              <a:t>12/7/17</a:t>
             </a:fld>
             <a:endParaRPr lang="en-US"/>
           </a:p>
@@ -17065,7 +17232,7 @@
           <a:p>
             <a:fld id="{D0F1EC55-3BF6-B94A-A8A8-ECF9B2E6E6A5}" type="datetime1">
               <a:rPr lang="en-US" smtClean="0"/>
-              <a:t>11/20/17</a:t>
+              <a:t>12/7/17</a:t>
             </a:fld>
             <a:endParaRPr lang="en-US" dirty="0"/>
           </a:p>
@@ -17326,7 +17493,7 @@
           <a:p>
             <a:fld id="{50F15D87-D865-834D-8095-85B47E5D857D}" type="datetime1">
               <a:rPr lang="en-US" smtClean="0"/>
-              <a:t>11/20/17</a:t>
+              <a:t>12/7/17</a:t>
             </a:fld>
             <a:endParaRPr lang="en-US"/>
           </a:p>
@@ -17542,7 +17709,7 @@
           <a:p>
             <a:fld id="{157FD4B1-436B-5B42-B797-4F45D1B6B6A9}" type="datetime1">
               <a:rPr lang="en-US" smtClean="0"/>
-              <a:t>11/20/17</a:t>
+              <a:t>12/7/17</a:t>
             </a:fld>
             <a:endParaRPr lang="en-US" dirty="0"/>
           </a:p>
@@ -18034,7 +18201,7 @@
           <a:p>
             <a:fld id="{9650BA27-C1AA-FC4E-A90D-29775570A7B1}" type="datetime1">
               <a:rPr lang="en-US" smtClean="0"/>
-              <a:t>11/20/17</a:t>
+              <a:t>12/7/17</a:t>
             </a:fld>
             <a:endParaRPr lang="en-US"/>
           </a:p>
@@ -18349,7 +18516,7 @@
           <a:p>
             <a:fld id="{F595C32F-4FDD-1845-9DAD-BF783B30F4EA}" type="datetime1">
               <a:rPr lang="en-US" smtClean="0"/>
-              <a:t>11/20/17</a:t>
+              <a:t>12/7/17</a:t>
             </a:fld>
             <a:endParaRPr lang="en-US"/>
           </a:p>
@@ -18685,7 +18852,7 @@
           <a:p>
             <a:fld id="{7A593D67-D80B-D341-95C2-D8FD019BB686}" type="datetime1">
               <a:rPr lang="en-US" smtClean="0"/>
-              <a:t>11/20/17</a:t>
+              <a:t>12/7/17</a:t>
             </a:fld>
             <a:endParaRPr lang="en-US" dirty="0"/>
           </a:p>
@@ -19011,7 +19178,7 @@
           <a:p>
             <a:fld id="{26A447B6-DA76-2941-9271-7615FCF773C3}" type="datetime1">
               <a:rPr lang="en-US" smtClean="0"/>
-              <a:t>11/20/17</a:t>
+              <a:t>12/7/17</a:t>
             </a:fld>
             <a:endParaRPr lang="en-US"/>
           </a:p>
@@ -19347,7 +19514,7 @@
           <a:p>
             <a:fld id="{38B2C89D-A2C7-BC4F-80C2-CF46C745D9C4}" type="datetime1">
               <a:rPr lang="en-US" smtClean="0"/>
-              <a:t>11/20/17</a:t>
+              <a:t>12/7/17</a:t>
             </a:fld>
             <a:endParaRPr lang="en-US"/>
           </a:p>
@@ -19939,7 +20106,7 @@
           <a:p>
             <a:fld id="{EBDED0D2-C1DA-5148-BCD1-FD0E375E4368}" type="datetime1">
               <a:rPr lang="en-US" smtClean="0"/>
-              <a:t>11/20/17</a:t>
+              <a:t>12/7/17</a:t>
             </a:fld>
             <a:endParaRPr lang="en-US"/>
           </a:p>
@@ -20131,7 +20298,7 @@
           <a:p>
             <a:fld id="{58476822-42A8-164F-A773-7C6D2A6A81DB}" type="datetime1">
               <a:rPr lang="en-US" smtClean="0"/>
-              <a:t>11/20/17</a:t>
+              <a:t>12/7/17</a:t>
             </a:fld>
             <a:endParaRPr lang="en-US" dirty="0"/>
           </a:p>
@@ -20384,7 +20551,7 @@
           <a:p>
             <a:fld id="{743333A5-8F5B-BA46-B1A8-D091CAAF002B}" type="datetime1">
               <a:rPr lang="en-US" smtClean="0"/>
-              <a:t>11/20/17</a:t>
+              <a:t>12/7/17</a:t>
             </a:fld>
             <a:endParaRPr lang="en-US"/>
           </a:p>
@@ -21026,7 +21193,7 @@
           <a:p>
             <a:fld id="{AE89C334-26D2-F346-A763-FB59B0897930}" type="datetime1">
               <a:rPr lang="en-US" smtClean="0"/>
-              <a:t>11/20/17</a:t>
+              <a:t>12/7/17</a:t>
             </a:fld>
             <a:endParaRPr lang="en-US"/>
           </a:p>
@@ -21434,7 +21601,7 @@
           <a:p>
             <a:fld id="{0E391325-9FAD-3B48-ABBB-A2878079FE51}" type="datetime1">
               <a:rPr lang="en-US" smtClean="0"/>
-              <a:t>11/20/17</a:t>
+              <a:t>12/7/17</a:t>
             </a:fld>
             <a:endParaRPr lang="en-US"/>
           </a:p>
@@ -21669,7 +21836,7 @@
           <a:p>
             <a:fld id="{406683BE-7CE6-C246-A895-91EACBC36081}" type="datetime1">
               <a:rPr lang="en-US" smtClean="0"/>
-              <a:t>11/20/17</a:t>
+              <a:t>12/7/17</a:t>
             </a:fld>
             <a:endParaRPr lang="en-US" dirty="0"/>
           </a:p>
@@ -22178,7 +22345,7 @@
           <a:p>
             <a:fld id="{C4F2F9E0-2BB7-644A-A8C2-4F89A10BA621}" type="datetime1">
               <a:rPr lang="en-US" smtClean="0"/>
-              <a:t>11/20/17</a:t>
+              <a:t>12/7/17</a:t>
             </a:fld>
             <a:endParaRPr lang="en-US"/>
           </a:p>
@@ -22435,7 +22602,7 @@
           <a:p>
             <a:fld id="{9890B64F-BD66-014F-8385-76577B03EE8A}" type="datetime1">
               <a:rPr lang="en-US" smtClean="0"/>
-              <a:t>11/20/17</a:t>
+              <a:t>12/7/17</a:t>
             </a:fld>
             <a:endParaRPr lang="en-US"/>
           </a:p>
@@ -22618,7 +22785,7 @@
           <a:p>
             <a:fld id="{24EAC218-805B-5942-9D1C-1CAF707EFBDF}" type="datetime1">
               <a:rPr lang="en-US" smtClean="0"/>
-              <a:t>11/20/17</a:t>
+              <a:t>12/7/17</a:t>
             </a:fld>
             <a:endParaRPr lang="en-US" dirty="0"/>
           </a:p>
@@ -22934,7 +23101,7 @@
           <a:p>
             <a:fld id="{E12727D1-4C82-404C-B300-E3C9ED3E7415}" type="datetime1">
               <a:rPr lang="en-US" smtClean="0"/>
-              <a:t>11/20/17</a:t>
+              <a:t>12/7/17</a:t>
             </a:fld>
             <a:endParaRPr lang="en-US" dirty="0"/>
           </a:p>
@@ -23148,23 +23315,7 @@
                 <a:ea typeface="Courier" charset="0"/>
                 <a:cs typeface="Courier" charset="0"/>
               </a:rPr>
-              <a:t> </a:t>
-            </a:r>
-            <a:r>
-              <a:rPr lang="en-US" sz="2200" smtClean="0">
-                <a:latin typeface="Courier" charset="0"/>
-                <a:ea typeface="Courier" charset="0"/>
-                <a:cs typeface="Courier" charset="0"/>
-              </a:rPr>
-              <a:t>--</a:t>
-            </a:r>
-            <a:r>
-              <a:rPr lang="en-US" sz="2200" smtClean="0">
-                <a:latin typeface="Courier" charset="0"/>
-                <a:ea typeface="Courier" charset="0"/>
-                <a:cs typeface="Courier" charset="0"/>
-              </a:rPr>
-              <a:t>qos</a:t>
+              <a:t> --qos</a:t>
             </a:r>
             <a:r>
               <a:rPr lang="en-US" sz="2200" dirty="0" smtClean="0">
@@ -23172,29 +23323,8 @@
                 <a:ea typeface="Courier" charset="0"/>
                 <a:cs typeface="Courier" charset="0"/>
               </a:rPr>
-              <a:t>=debug </a:t>
-            </a:r>
-            <a:r>
-              <a:rPr lang="en-US" sz="2200" dirty="0" smtClean="0">
-                <a:latin typeface="Courier" charset="0"/>
-                <a:ea typeface="Courier" charset="0"/>
-                <a:cs typeface="Courier" charset="0"/>
-              </a:rPr>
-              <a:t>--</a:t>
-            </a:r>
-            <a:r>
-              <a:rPr lang="en-US" sz="2200" dirty="0" smtClean="0">
-                <a:latin typeface="Courier" charset="0"/>
-                <a:ea typeface="Courier" charset="0"/>
-                <a:cs typeface="Courier" charset="0"/>
-              </a:rPr>
-              <a:t>time=00:05:00</a:t>
-            </a:r>
-            <a:endParaRPr lang="en-US" sz="2200" dirty="0" smtClean="0">
-              <a:latin typeface="Courier" charset="0"/>
-              <a:ea typeface="Courier" charset="0"/>
-              <a:cs typeface="Courier" charset="0"/>
-            </a:endParaRPr>
+              <a:t>=debug --time=00:05:00</a:t>
+            </a:r>
           </a:p>
           <a:p>
             <a:pPr marL="114300" indent="0">
@@ -23297,7 +23427,7 @@
           <a:p>
             <a:fld id="{F21DF42F-4BC7-1E4D-B4C7-33A7E30F56D4}" type="datetime1">
               <a:rPr lang="en-US" smtClean="0"/>
-              <a:t>11/20/17</a:t>
+              <a:t>12/7/17</a:t>
             </a:fld>
             <a:endParaRPr lang="en-US" dirty="0"/>
           </a:p>
@@ -23527,7 +23657,7 @@
           <a:p>
             <a:fld id="{F176B5BB-6C1E-4446-A4B5-BF7D661481E8}" type="datetime1">
               <a:rPr lang="en-US" smtClean="0"/>
-              <a:t>11/20/17</a:t>
+              <a:t>12/7/17</a:t>
             </a:fld>
             <a:endParaRPr lang="en-US" dirty="0"/>
           </a:p>
@@ -23729,7 +23859,7 @@
           <a:p>
             <a:fld id="{2C3A7136-6CD9-1F44-BF87-1F02B022DD38}" type="datetime1">
               <a:rPr lang="en-US" smtClean="0"/>
-              <a:t>11/20/17</a:t>
+              <a:t>12/7/17</a:t>
             </a:fld>
             <a:endParaRPr lang="en-US"/>
           </a:p>
@@ -23957,7 +24087,7 @@
           <a:p>
             <a:fld id="{DD60739B-9381-D348-A54C-084428A1CE83}" type="datetime1">
               <a:rPr lang="en-US" smtClean="0"/>
-              <a:t>11/20/17</a:t>
+              <a:t>12/7/17</a:t>
             </a:fld>
             <a:endParaRPr lang="en-US"/>
           </a:p>
@@ -24223,7 +24353,7 @@
           <a:p>
             <a:fld id="{E4C2F9E9-0335-9F43-85CD-6D5AFF0B589E}" type="datetime1">
               <a:rPr lang="en-US" smtClean="0"/>
-              <a:t>11/20/17</a:t>
+              <a:t>12/7/17</a:t>
             </a:fld>
             <a:endParaRPr lang="en-US"/>
           </a:p>
@@ -24422,7 +24552,7 @@
           <a:p>
             <a:fld id="{CE5BD4CA-09B4-E54C-901B-62D7687F59E7}" type="datetime1">
               <a:rPr lang="en-US" smtClean="0"/>
-              <a:t>11/20/17</a:t>
+              <a:t>12/7/17</a:t>
             </a:fld>
             <a:endParaRPr lang="en-US"/>
           </a:p>

</xml_diff>